<commit_message>
Small change at PowerPoint
</commit_message>
<xml_diff>
--- a/doc/Workshop2015_Webperformance_thomas.pptx
+++ b/doc/Workshop2015_Webperformance_thomas.pptx
@@ -1242,6 +1242,13 @@
         </dgm:presLayoutVars>
       </dgm:prSet>
       <dgm:spPr/>
+      <dgm:t>
+        <a:bodyPr/>
+        <a:lstStyle/>
+        <a:p>
+          <a:endParaRPr lang="de-DE"/>
+        </a:p>
+      </dgm:t>
     </dgm:pt>
     <dgm:pt modelId="{BA65FB55-BCA6-470B-9555-A5F8174C6A80}" type="pres">
       <dgm:prSet presAssocID="{5196642E-1B3E-4E49-A2CB-59462D35CFC8}" presName="vertOne" presStyleCnt="0"/>
@@ -1465,23 +1472,23 @@
     </dgm:pt>
   </dgm:ptLst>
   <dgm:cxnLst>
-    <dgm:cxn modelId="{B63851FE-96FF-45D6-B2B9-E571F737C9CE}" type="presOf" srcId="{8FCA2399-3047-42AC-8552-804A022BB44B}" destId="{6389D3C0-C1B2-45D8-B94D-37CD57F3EFFB}" srcOrd="0" destOrd="0" presId="urn:microsoft.com/office/officeart/2005/8/layout/hierarchy4"/>
     <dgm:cxn modelId="{249B80FB-5A6C-4E4C-B511-41E66BABFF16}" srcId="{B482FC19-CC89-4441-BC15-6EC2B11C07BE}" destId="{91964A02-6E62-402E-9E61-1C60969505AB}" srcOrd="0" destOrd="0" parTransId="{23B0BB3D-5BBD-477D-B937-476A3D2091DE}" sibTransId="{D94A9E29-1D4B-44FA-A768-23A2BE78C41D}"/>
+    <dgm:cxn modelId="{45F45352-0CBF-40AA-8C3F-FD8C4A1EA9D8}" type="presOf" srcId="{9BD15604-521D-4DDA-981F-B6D031280EDD}" destId="{2266A9A1-FF82-4ADC-829F-5C4ECE66B720}" srcOrd="0" destOrd="0" presId="urn:microsoft.com/office/officeart/2005/8/layout/hierarchy4"/>
+    <dgm:cxn modelId="{5384B595-2A56-4465-BB17-C2EC1A7B4010}" srcId="{F02D8030-6DB0-4B72-966D-FF6456FF9761}" destId="{8FCA2399-3047-42AC-8552-804A022BB44B}" srcOrd="0" destOrd="0" parTransId="{41BBF36D-C781-43A0-AC54-EFC34281F828}" sibTransId="{C5424CE0-F4C9-47F0-B72F-A0FFEFE4D768}"/>
+    <dgm:cxn modelId="{0AB960D9-6999-457C-8782-D31B688279EB}" srcId="{F66D0EDD-F0BE-4E0A-B9F2-CE6FEDE4FAB8}" destId="{9BD15604-521D-4DDA-981F-B6D031280EDD}" srcOrd="1" destOrd="0" parTransId="{F9F1A26F-2049-48FA-B34F-BA515E45C7CA}" sibTransId="{C60A9180-B8C0-4DF9-A2E0-2B12BEDF6258}"/>
     <dgm:cxn modelId="{F1992A1E-820A-4CD4-840B-55A255F74979}" type="presOf" srcId="{5196642E-1B3E-4E49-A2CB-59462D35CFC8}" destId="{B51F714F-FDDD-45E1-8FD2-756C1D00E66E}" srcOrd="0" destOrd="0" presId="urn:microsoft.com/office/officeart/2005/8/layout/hierarchy4"/>
-    <dgm:cxn modelId="{45F45352-0CBF-40AA-8C3F-FD8C4A1EA9D8}" type="presOf" srcId="{9BD15604-521D-4DDA-981F-B6D031280EDD}" destId="{2266A9A1-FF82-4ADC-829F-5C4ECE66B720}" srcOrd="0" destOrd="0" presId="urn:microsoft.com/office/officeart/2005/8/layout/hierarchy4"/>
-    <dgm:cxn modelId="{0AB960D9-6999-457C-8782-D31B688279EB}" srcId="{F66D0EDD-F0BE-4E0A-B9F2-CE6FEDE4FAB8}" destId="{9BD15604-521D-4DDA-981F-B6D031280EDD}" srcOrd="1" destOrd="0" parTransId="{F9F1A26F-2049-48FA-B34F-BA515E45C7CA}" sibTransId="{C60A9180-B8C0-4DF9-A2E0-2B12BEDF6258}"/>
-    <dgm:cxn modelId="{DE33198A-CF5B-4C67-A8BC-23421AF72AE4}" type="presOf" srcId="{F66D0EDD-F0BE-4E0A-B9F2-CE6FEDE4FAB8}" destId="{6C73CA49-7A14-4B70-8FDA-986E50401E01}" srcOrd="0" destOrd="0" presId="urn:microsoft.com/office/officeart/2005/8/layout/hierarchy4"/>
+    <dgm:cxn modelId="{0BD545F6-DC3F-4137-BC2C-28B2B0F47232}" srcId="{8FCA2399-3047-42AC-8552-804A022BB44B}" destId="{696C7831-2F98-41DA-BF7A-8A65EFB27309}" srcOrd="0" destOrd="0" parTransId="{8181531D-2C4C-4317-B6D4-B52897B88BD5}" sibTransId="{C46985EE-F0DB-45BB-81B1-0AA763A8F3F8}"/>
+    <dgm:cxn modelId="{A6624416-3C19-4442-8C1E-822FE0A07137}" type="presOf" srcId="{B482FC19-CC89-4441-BC15-6EC2B11C07BE}" destId="{5669A38B-3668-4BCB-A156-1DDA91D3FA94}" srcOrd="0" destOrd="0" presId="urn:microsoft.com/office/officeart/2005/8/layout/hierarchy4"/>
+    <dgm:cxn modelId="{142F73EA-6966-4B5C-96AD-B61F43BAED2A}" srcId="{9BD15604-521D-4DDA-981F-B6D031280EDD}" destId="{F02D8030-6DB0-4B72-966D-FF6456FF9761}" srcOrd="0" destOrd="0" parTransId="{441B3C19-1791-4309-B5BB-8C5E41842B9B}" sibTransId="{0D5F6790-BD10-4D82-A09B-19B4CAED98B5}"/>
     <dgm:cxn modelId="{CB2455AE-F6B3-489D-A58A-DD3747A377EB}" srcId="{91964A02-6E62-402E-9E61-1C60969505AB}" destId="{34C8F986-1D40-458E-9EE2-9FC53D881C07}" srcOrd="0" destOrd="0" parTransId="{D7902292-3899-4E9D-8D21-3E46654C4D0D}" sibTransId="{057D8260-8369-4BD6-8C91-FFFFF6B343FC}"/>
     <dgm:cxn modelId="{2976AA01-0C1E-43F3-BDCD-C47EB8482113}" type="presOf" srcId="{34C8F986-1D40-458E-9EE2-9FC53D881C07}" destId="{43406364-91E4-41E0-95F5-5A3F6094DEB4}" srcOrd="0" destOrd="0" presId="urn:microsoft.com/office/officeart/2005/8/layout/hierarchy4"/>
+    <dgm:cxn modelId="{8265B4DA-8E15-4983-A98C-E3498876A755}" type="presOf" srcId="{696C7831-2F98-41DA-BF7A-8A65EFB27309}" destId="{8B59E647-2B5D-427C-963C-B1FBB73B5A7F}" srcOrd="0" destOrd="0" presId="urn:microsoft.com/office/officeart/2005/8/layout/hierarchy4"/>
+    <dgm:cxn modelId="{DE33198A-CF5B-4C67-A8BC-23421AF72AE4}" type="presOf" srcId="{F66D0EDD-F0BE-4E0A-B9F2-CE6FEDE4FAB8}" destId="{6C73CA49-7A14-4B70-8FDA-986E50401E01}" srcOrd="0" destOrd="0" presId="urn:microsoft.com/office/officeart/2005/8/layout/hierarchy4"/>
+    <dgm:cxn modelId="{B63851FE-96FF-45D6-B2B9-E571F737C9CE}" type="presOf" srcId="{8FCA2399-3047-42AC-8552-804A022BB44B}" destId="{6389D3C0-C1B2-45D8-B94D-37CD57F3EFFB}" srcOrd="0" destOrd="0" presId="urn:microsoft.com/office/officeart/2005/8/layout/hierarchy4"/>
+    <dgm:cxn modelId="{7124E362-1223-4DA7-9E58-473D133A2F7F}" srcId="{F66D0EDD-F0BE-4E0A-B9F2-CE6FEDE4FAB8}" destId="{5196642E-1B3E-4E49-A2CB-59462D35CFC8}" srcOrd="0" destOrd="0" parTransId="{4C2BCEED-B679-4D25-A9BD-58A68B558EB3}" sibTransId="{F84C237E-8092-49DC-8C06-CE5EE59661A8}"/>
+    <dgm:cxn modelId="{E3A8F8D4-3296-4B41-BC7B-5B81010BF09E}" type="presOf" srcId="{F02D8030-6DB0-4B72-966D-FF6456FF9761}" destId="{9D2FA627-40EA-4C6F-8524-ABE3185D25B9}" srcOrd="0" destOrd="0" presId="urn:microsoft.com/office/officeart/2005/8/layout/hierarchy4"/>
+    <dgm:cxn modelId="{A789880E-F79E-4DD8-ACBA-3F24CBE2AE30}" type="presOf" srcId="{91964A02-6E62-402E-9E61-1C60969505AB}" destId="{EBA216B7-D99C-4CA1-997D-DD06F3F97BE7}" srcOrd="0" destOrd="0" presId="urn:microsoft.com/office/officeart/2005/8/layout/hierarchy4"/>
     <dgm:cxn modelId="{FA3D035F-E160-4E4F-BE2B-A1C4051B1C60}" srcId="{5196642E-1B3E-4E49-A2CB-59462D35CFC8}" destId="{B482FC19-CC89-4441-BC15-6EC2B11C07BE}" srcOrd="0" destOrd="0" parTransId="{1924CE64-3988-43F0-A470-84ED83C15E9B}" sibTransId="{B1B6FD1A-93A6-4F31-AB20-AF35CE0D674D}"/>
-    <dgm:cxn modelId="{7124E362-1223-4DA7-9E58-473D133A2F7F}" srcId="{F66D0EDD-F0BE-4E0A-B9F2-CE6FEDE4FAB8}" destId="{5196642E-1B3E-4E49-A2CB-59462D35CFC8}" srcOrd="0" destOrd="0" parTransId="{4C2BCEED-B679-4D25-A9BD-58A68B558EB3}" sibTransId="{F84C237E-8092-49DC-8C06-CE5EE59661A8}"/>
-    <dgm:cxn modelId="{A789880E-F79E-4DD8-ACBA-3F24CBE2AE30}" type="presOf" srcId="{91964A02-6E62-402E-9E61-1C60969505AB}" destId="{EBA216B7-D99C-4CA1-997D-DD06F3F97BE7}" srcOrd="0" destOrd="0" presId="urn:microsoft.com/office/officeart/2005/8/layout/hierarchy4"/>
-    <dgm:cxn modelId="{8265B4DA-8E15-4983-A98C-E3498876A755}" type="presOf" srcId="{696C7831-2F98-41DA-BF7A-8A65EFB27309}" destId="{8B59E647-2B5D-427C-963C-B1FBB73B5A7F}" srcOrd="0" destOrd="0" presId="urn:microsoft.com/office/officeart/2005/8/layout/hierarchy4"/>
-    <dgm:cxn modelId="{E3A8F8D4-3296-4B41-BC7B-5B81010BF09E}" type="presOf" srcId="{F02D8030-6DB0-4B72-966D-FF6456FF9761}" destId="{9D2FA627-40EA-4C6F-8524-ABE3185D25B9}" srcOrd="0" destOrd="0" presId="urn:microsoft.com/office/officeart/2005/8/layout/hierarchy4"/>
-    <dgm:cxn modelId="{A6624416-3C19-4442-8C1E-822FE0A07137}" type="presOf" srcId="{B482FC19-CC89-4441-BC15-6EC2B11C07BE}" destId="{5669A38B-3668-4BCB-A156-1DDA91D3FA94}" srcOrd="0" destOrd="0" presId="urn:microsoft.com/office/officeart/2005/8/layout/hierarchy4"/>
-    <dgm:cxn modelId="{142F73EA-6966-4B5C-96AD-B61F43BAED2A}" srcId="{9BD15604-521D-4DDA-981F-B6D031280EDD}" destId="{F02D8030-6DB0-4B72-966D-FF6456FF9761}" srcOrd="0" destOrd="0" parTransId="{441B3C19-1791-4309-B5BB-8C5E41842B9B}" sibTransId="{0D5F6790-BD10-4D82-A09B-19B4CAED98B5}"/>
-    <dgm:cxn modelId="{5384B595-2A56-4465-BB17-C2EC1A7B4010}" srcId="{F02D8030-6DB0-4B72-966D-FF6456FF9761}" destId="{8FCA2399-3047-42AC-8552-804A022BB44B}" srcOrd="0" destOrd="0" parTransId="{41BBF36D-C781-43A0-AC54-EFC34281F828}" sibTransId="{C5424CE0-F4C9-47F0-B72F-A0FFEFE4D768}"/>
-    <dgm:cxn modelId="{0BD545F6-DC3F-4137-BC2C-28B2B0F47232}" srcId="{8FCA2399-3047-42AC-8552-804A022BB44B}" destId="{696C7831-2F98-41DA-BF7A-8A65EFB27309}" srcOrd="0" destOrd="0" parTransId="{8181531D-2C4C-4317-B6D4-B52897B88BD5}" sibTransId="{C46985EE-F0DB-45BB-81B1-0AA763A8F3F8}"/>
     <dgm:cxn modelId="{0F3F35D3-1021-410B-A7E1-A0F9D263E27E}" type="presParOf" srcId="{6C73CA49-7A14-4B70-8FDA-986E50401E01}" destId="{BA65FB55-BCA6-470B-9555-A5F8174C6A80}" srcOrd="0" destOrd="0" presId="urn:microsoft.com/office/officeart/2005/8/layout/hierarchy4"/>
     <dgm:cxn modelId="{995505A1-6A34-418A-A6BF-D096147BEDA1}" type="presParOf" srcId="{BA65FB55-BCA6-470B-9555-A5F8174C6A80}" destId="{B51F714F-FDDD-45E1-8FD2-756C1D00E66E}" srcOrd="0" destOrd="0" presId="urn:microsoft.com/office/officeart/2005/8/layout/hierarchy4"/>
     <dgm:cxn modelId="{D8F3C355-A8B6-495E-B417-1364FC13C4A6}" type="presParOf" srcId="{BA65FB55-BCA6-470B-9555-A5F8174C6A80}" destId="{F1EC7A3F-0DFA-4F38-B673-DCC71CF471FD}" srcOrd="1" destOrd="0" presId="urn:microsoft.com/office/officeart/2005/8/layout/hierarchy4"/>
@@ -3866,7 +3873,7 @@
           <a:p>
             <a:fld id="{63907722-5B79-4E7A-BBE9-199156961409}" type="datetimeFigureOut">
               <a:rPr lang="de-DE" smtClean="0"/>
-              <a:t>17.03.2015</a:t>
+              <a:t>18.03.2015</a:t>
             </a:fld>
             <a:endParaRPr lang="de-DE"/>
           </a:p>
@@ -13256,7 +13263,6 @@
               <a:rPr lang="de-DE" dirty="0"/>
               <a:t> anderen Bilder werden erst anschließend nachgeladen.</a:t>
             </a:r>
-            <a:endParaRPr lang="de-DE" dirty="0"/>
           </a:p>
         </p:txBody>
       </p:sp>
@@ -13676,11 +13682,6 @@
               </a:rPr>
               <a:t> Bereich</a:t>
             </a:r>
-            <a:endParaRPr lang="de-DE" sz="1600" dirty="0" smtClean="0">
-              <a:solidFill>
-                <a:schemeClr val="tx1"/>
-              </a:solidFill>
-            </a:endParaRPr>
           </a:p>
         </p:txBody>
       </p:sp>
@@ -13804,11 +13805,6 @@
               </a:rPr>
               <a:t>Bilder in diesem Bereich werden direkt geladen</a:t>
             </a:r>
-            <a:endParaRPr lang="de-DE" sz="1200" dirty="0" smtClean="0">
-              <a:solidFill>
-                <a:schemeClr val="tx1"/>
-              </a:solidFill>
-            </a:endParaRPr>
           </a:p>
         </p:txBody>
       </p:sp>
@@ -15259,11 +15255,6 @@
               </a:rPr>
               <a:t>Ladezeiten ohne Optimierung</a:t>
             </a:r>
-            <a:endParaRPr lang="de-DE" sz="1600" dirty="0" smtClean="0">
-              <a:solidFill>
-                <a:schemeClr val="tx1"/>
-              </a:solidFill>
-            </a:endParaRPr>
           </a:p>
         </p:txBody>
       </p:sp>
@@ -15454,21 +15445,8 @@
                   <a:schemeClr val="tx1"/>
                 </a:solidFill>
               </a:rPr>
-              <a:t>Blaue Linie zeigt </a:t>
+              <a:t>Blaue Linie zeigt Zeit bis Website bereit steht</a:t>
             </a:r>
-            <a:r>
-              <a:rPr lang="de-DE" sz="1600" dirty="0" smtClean="0">
-                <a:solidFill>
-                  <a:schemeClr val="tx1"/>
-                </a:solidFill>
-              </a:rPr>
-              <a:t>Zeit bis Website bereit steht</a:t>
-            </a:r>
-            <a:endParaRPr lang="de-DE" sz="1600" dirty="0" smtClean="0">
-              <a:solidFill>
-                <a:schemeClr val="tx1"/>
-              </a:solidFill>
-            </a:endParaRPr>
           </a:p>
         </p:txBody>
       </p:sp>
@@ -19424,11 +19402,6 @@
               </a:rPr>
               <a:t>spritesheet.png</a:t>
             </a:r>
-            <a:endParaRPr lang="de-DE" sz="1000" i="1" dirty="0" smtClean="0">
-              <a:solidFill>
-                <a:schemeClr val="tx1"/>
-              </a:solidFill>
-            </a:endParaRPr>
           </a:p>
         </p:txBody>
       </p:sp>
@@ -19990,11 +19963,6 @@
               </a:rPr>
               <a:t>“</a:t>
             </a:r>
-            <a:endParaRPr lang="de-DE" sz="1200" dirty="0" smtClean="0">
-              <a:solidFill>
-                <a:schemeClr val="tx1"/>
-              </a:solidFill>
-            </a:endParaRPr>
           </a:p>
         </p:txBody>
       </p:sp>
@@ -20067,11 +20035,6 @@
               </a:rPr>
               <a:t> zu sehen…</a:t>
             </a:r>
-            <a:endParaRPr lang="de-DE" sz="1200" dirty="0" smtClean="0">
-              <a:solidFill>
-                <a:schemeClr val="tx1"/>
-              </a:solidFill>
-            </a:endParaRPr>
           </a:p>
         </p:txBody>
       </p:sp>
@@ -21651,13 +21614,13 @@
   <p:clrMapOvr>
     <a:masterClrMapping/>
   </p:clrMapOvr>
-  <mc:AlternateContent xmlns:mc="http://schemas.openxmlformats.org/markup-compatibility/2006">
-    <mc:Choice xmlns:p14="http://schemas.microsoft.com/office/powerpoint/2010/main" Requires="p14">
+  <mc:AlternateContent xmlns:mc="http://schemas.openxmlformats.org/markup-compatibility/2006" xmlns:p14="http://schemas.microsoft.com/office/powerpoint/2010/main">
+    <mc:Choice Requires="p14">
       <p:transition spd="med" p14:dur="700">
         <p:fade/>
       </p:transition>
     </mc:Choice>
-    <mc:Fallback>
+    <mc:Fallback xmlns="">
       <p:transition spd="med">
         <p:fade/>
       </p:transition>
@@ -22223,11 +22186,6 @@
               </a:rPr>
               <a:t>-20%</a:t>
             </a:r>
-            <a:endParaRPr lang="de-DE" sz="1600" dirty="0" smtClean="0">
-              <a:solidFill>
-                <a:schemeClr val="tx1"/>
-              </a:solidFill>
-            </a:endParaRPr>
           </a:p>
         </p:txBody>
       </p:sp>
@@ -22277,14 +22235,41 @@
                             </p:stCondLst>
                             <p:childTnLst>
                               <p:par>
-                                <p:cTn id="5" presetID="42" presetClass="path" presetSubtype="0" decel="100000" fill="hold" nodeType="withEffect">
+                                <p:cTn id="5" presetID="1" presetClass="entr" presetSubtype="0" fill="hold" nodeType="withEffect">
+                                  <p:stCondLst>
+                                    <p:cond delay="0"/>
+                                  </p:stCondLst>
+                                  <p:childTnLst>
+                                    <p:set>
+                                      <p:cBhvr>
+                                        <p:cTn id="6" dur="1" fill="hold">
+                                          <p:stCondLst>
+                                            <p:cond delay="0"/>
+                                          </p:stCondLst>
+                                        </p:cTn>
+                                        <p:tgtEl>
+                                          <p:spTgt spid="3074"/>
+                                        </p:tgtEl>
+                                        <p:attrNameLst>
+                                          <p:attrName>style.visibility</p:attrName>
+                                        </p:attrNameLst>
+                                      </p:cBhvr>
+                                      <p:to>
+                                        <p:strVal val="visible"/>
+                                      </p:to>
+                                    </p:set>
+                                  </p:childTnLst>
+                                </p:cTn>
+                              </p:par>
+                              <p:par>
+                                <p:cTn id="7" presetID="42" presetClass="path" presetSubtype="0" decel="100000" fill="hold" nodeType="withEffect">
                                   <p:stCondLst>
                                     <p:cond delay="0"/>
                                   </p:stCondLst>
                                   <p:childTnLst>
                                     <p:animMotion origin="layout" path="M 0.35452 0.60602 L 0.35452 0.00741 " pathEditMode="relative" rAng="0" ptsTypes="AA">
                                       <p:cBhvr>
-                                        <p:cTn id="6" dur="300" fill="hold"/>
+                                        <p:cTn id="8" dur="300" fill="hold"/>
                                         <p:tgtEl>
                                           <p:spTgt spid="3074"/>
                                         </p:tgtEl>
@@ -22305,26 +22290,26 @@
                     </p:cTn>
                   </p:par>
                   <p:par>
-                    <p:cTn id="7" fill="hold">
+                    <p:cTn id="9" fill="hold">
                       <p:stCondLst>
                         <p:cond delay="indefinite"/>
                       </p:stCondLst>
                       <p:childTnLst>
                         <p:par>
-                          <p:cTn id="8" fill="hold">
+                          <p:cTn id="10" fill="hold">
                             <p:stCondLst>
                               <p:cond delay="0"/>
                             </p:stCondLst>
                             <p:childTnLst>
                               <p:par>
-                                <p:cTn id="9" presetID="2" presetClass="entr" presetSubtype="2" decel="100000" fill="hold" grpId="0" nodeType="clickEffect">
+                                <p:cTn id="11" presetID="2" presetClass="entr" presetSubtype="2" decel="100000" fill="hold" grpId="0" nodeType="clickEffect">
                                   <p:stCondLst>
                                     <p:cond delay="0"/>
                                   </p:stCondLst>
                                   <p:childTnLst>
                                     <p:set>
                                       <p:cBhvr>
-                                        <p:cTn id="10" dur="1" fill="hold">
+                                        <p:cTn id="12" dur="1" fill="hold">
                                           <p:stCondLst>
                                             <p:cond delay="0"/>
                                           </p:stCondLst>
@@ -22342,7 +22327,7 @@
                                     </p:set>
                                     <p:anim calcmode="lin" valueType="num">
                                       <p:cBhvr additive="base">
-                                        <p:cTn id="11" dur="300" fill="hold"/>
+                                        <p:cTn id="13" dur="300" fill="hold"/>
                                         <p:tgtEl>
                                           <p:spTgt spid="13"/>
                                         </p:tgtEl>
@@ -22365,7 +22350,7 @@
                                     </p:anim>
                                     <p:anim calcmode="lin" valueType="num">
                                       <p:cBhvr additive="base">
-                                        <p:cTn id="12" dur="300" fill="hold"/>
+                                        <p:cTn id="14" dur="300" fill="hold"/>
                                         <p:tgtEl>
                                           <p:spTgt spid="13"/>
                                         </p:tgtEl>
@@ -22390,14 +22375,14 @@
                                 </p:cTn>
                               </p:par>
                               <p:par>
-                                <p:cTn id="13" presetID="42" presetClass="path" presetSubtype="0" decel="100000" fill="hold" nodeType="withEffect">
+                                <p:cTn id="15" presetID="42" presetClass="path" presetSubtype="0" decel="100000" fill="hold" nodeType="withEffect">
                                   <p:stCondLst>
                                     <p:cond delay="0"/>
                                   </p:stCondLst>
                                   <p:childTnLst>
                                     <p:animMotion origin="layout" path="M -4.72222E-6 1.48148E-6 L 0.35452 0.0074 " pathEditMode="relative" rAng="0" ptsTypes="AA">
                                       <p:cBhvr>
-                                        <p:cTn id="14" dur="300" spd="-100000" fill="hold"/>
+                                        <p:cTn id="16" dur="300" spd="-100000" fill="hold"/>
                                         <p:tgtEl>
                                           <p:spTgt spid="3074"/>
                                         </p:tgtEl>
@@ -22412,14 +22397,14 @@
                                 </p:cTn>
                               </p:par>
                               <p:par>
-                                <p:cTn id="15" presetID="2" presetClass="entr" presetSubtype="2" decel="100000" fill="hold" nodeType="withEffect">
+                                <p:cTn id="17" presetID="2" presetClass="entr" presetSubtype="2" decel="100000" fill="hold" nodeType="withEffect">
                                   <p:stCondLst>
                                     <p:cond delay="0"/>
                                   </p:stCondLst>
                                   <p:childTnLst>
                                     <p:set>
                                       <p:cBhvr>
-                                        <p:cTn id="16" dur="1" fill="hold">
+                                        <p:cTn id="18" dur="1" fill="hold">
                                           <p:stCondLst>
                                             <p:cond delay="0"/>
                                           </p:stCondLst>
@@ -22437,7 +22422,7 @@
                                     </p:set>
                                     <p:anim calcmode="lin" valueType="num">
                                       <p:cBhvr additive="base">
-                                        <p:cTn id="17" dur="300" fill="hold"/>
+                                        <p:cTn id="19" dur="300" fill="hold"/>
                                         <p:tgtEl>
                                           <p:spTgt spid="3075"/>
                                         </p:tgtEl>
@@ -22460,7 +22445,7 @@
                                     </p:anim>
                                     <p:anim calcmode="lin" valueType="num">
                                       <p:cBhvr additive="base">
-                                        <p:cTn id="18" dur="300" fill="hold"/>
+                                        <p:cTn id="20" dur="300" fill="hold"/>
                                         <p:tgtEl>
                                           <p:spTgt spid="3075"/>
                                         </p:tgtEl>
@@ -22491,26 +22476,26 @@
                     </p:cTn>
                   </p:par>
                   <p:par>
-                    <p:cTn id="19" fill="hold">
+                    <p:cTn id="21" fill="hold">
                       <p:stCondLst>
                         <p:cond delay="indefinite"/>
                       </p:stCondLst>
                       <p:childTnLst>
                         <p:par>
-                          <p:cTn id="20" fill="hold">
+                          <p:cTn id="22" fill="hold">
                             <p:stCondLst>
                               <p:cond delay="0"/>
                             </p:stCondLst>
                             <p:childTnLst>
                               <p:par>
-                                <p:cTn id="21" presetID="2" presetClass="entr" presetSubtype="2" decel="100000" fill="hold" grpId="0" nodeType="clickEffect">
+                                <p:cTn id="23" presetID="2" presetClass="entr" presetSubtype="2" decel="100000" fill="hold" grpId="0" nodeType="clickEffect">
                                   <p:stCondLst>
                                     <p:cond delay="0"/>
                                   </p:stCondLst>
                                   <p:childTnLst>
                                     <p:set>
                                       <p:cBhvr>
-                                        <p:cTn id="22" dur="1" fill="hold">
+                                        <p:cTn id="24" dur="1" fill="hold">
                                           <p:stCondLst>
                                             <p:cond delay="0"/>
                                           </p:stCondLst>
@@ -22528,7 +22513,7 @@
                                     </p:set>
                                     <p:anim calcmode="lin" valueType="num">
                                       <p:cBhvr additive="base">
-                                        <p:cTn id="23" dur="300" fill="hold"/>
+                                        <p:cTn id="25" dur="300" fill="hold"/>
                                         <p:tgtEl>
                                           <p:spTgt spid="19"/>
                                         </p:tgtEl>
@@ -22551,7 +22536,7 @@
                                     </p:anim>
                                     <p:anim calcmode="lin" valueType="num">
                                       <p:cBhvr additive="base">
-                                        <p:cTn id="24" dur="300" fill="hold"/>
+                                        <p:cTn id="26" dur="300" fill="hold"/>
                                         <p:tgtEl>
                                           <p:spTgt spid="19"/>
                                         </p:tgtEl>
@@ -22576,14 +22561,14 @@
                                 </p:cTn>
                               </p:par>
                               <p:par>
-                                <p:cTn id="25" presetID="2" presetClass="entr" presetSubtype="2" decel="100000" fill="hold" grpId="0" nodeType="withEffect">
+                                <p:cTn id="27" presetID="2" presetClass="entr" presetSubtype="2" decel="100000" fill="hold" grpId="0" nodeType="withEffect">
                                   <p:stCondLst>
                                     <p:cond delay="0"/>
                                   </p:stCondLst>
                                   <p:childTnLst>
                                     <p:set>
                                       <p:cBhvr>
-                                        <p:cTn id="26" dur="1" fill="hold">
+                                        <p:cTn id="28" dur="1" fill="hold">
                                           <p:stCondLst>
                                             <p:cond delay="0"/>
                                           </p:stCondLst>
@@ -22601,7 +22586,7 @@
                                     </p:set>
                                     <p:anim calcmode="lin" valueType="num">
                                       <p:cBhvr additive="base">
-                                        <p:cTn id="27" dur="300" fill="hold"/>
+                                        <p:cTn id="29" dur="300" fill="hold"/>
                                         <p:tgtEl>
                                           <p:spTgt spid="17"/>
                                         </p:tgtEl>
@@ -22624,7 +22609,7 @@
                                     </p:anim>
                                     <p:anim calcmode="lin" valueType="num">
                                       <p:cBhvr additive="base">
-                                        <p:cTn id="28" dur="300" fill="hold"/>
+                                        <p:cTn id="30" dur="300" fill="hold"/>
                                         <p:tgtEl>
                                           <p:spTgt spid="17"/>
                                         </p:tgtEl>
@@ -22649,14 +22634,14 @@
                                 </p:cTn>
                               </p:par>
                               <p:par>
-                                <p:cTn id="29" presetID="2" presetClass="entr" presetSubtype="2" decel="100000" fill="hold" grpId="0" nodeType="withEffect">
+                                <p:cTn id="31" presetID="2" presetClass="entr" presetSubtype="2" decel="100000" fill="hold" grpId="0" nodeType="withEffect">
                                   <p:stCondLst>
                                     <p:cond delay="0"/>
                                   </p:stCondLst>
                                   <p:childTnLst>
                                     <p:set>
                                       <p:cBhvr>
-                                        <p:cTn id="30" dur="1" fill="hold">
+                                        <p:cTn id="32" dur="1" fill="hold">
                                           <p:stCondLst>
                                             <p:cond delay="0"/>
                                           </p:stCondLst>
@@ -22674,7 +22659,7 @@
                                     </p:set>
                                     <p:anim calcmode="lin" valueType="num">
                                       <p:cBhvr additive="base">
-                                        <p:cTn id="31" dur="300" fill="hold"/>
+                                        <p:cTn id="33" dur="300" fill="hold"/>
                                         <p:tgtEl>
                                           <p:spTgt spid="14"/>
                                         </p:tgtEl>
@@ -22697,7 +22682,7 @@
                                     </p:anim>
                                     <p:anim calcmode="lin" valueType="num">
                                       <p:cBhvr additive="base">
-                                        <p:cTn id="32" dur="300" fill="hold"/>
+                                        <p:cTn id="34" dur="300" fill="hold"/>
                                         <p:tgtEl>
                                           <p:spTgt spid="14"/>
                                         </p:tgtEl>
@@ -22976,13 +22961,13 @@
   <p:clrMapOvr>
     <a:masterClrMapping/>
   </p:clrMapOvr>
-  <mc:AlternateContent xmlns:mc="http://schemas.openxmlformats.org/markup-compatibility/2006">
-    <mc:Choice xmlns:p14="http://schemas.microsoft.com/office/powerpoint/2010/main" Requires="p14">
+  <mc:AlternateContent xmlns:mc="http://schemas.openxmlformats.org/markup-compatibility/2006" xmlns:p14="http://schemas.microsoft.com/office/powerpoint/2010/main">
+    <mc:Choice Requires="p14">
       <p:transition spd="med" p14:dur="700">
         <p:fade/>
       </p:transition>
     </mc:Choice>
-    <mc:Fallback>
+    <mc:Fallback xmlns="">
       <p:transition spd="med">
         <p:fade/>
       </p:transition>

</xml_diff>

<commit_message>
Folie für FontAwesome eingebaut
</commit_message>
<xml_diff>
--- a/doc/Workshop2015_Webperformance_thomas.pptx
+++ b/doc/Workshop2015_Webperformance_thomas.pptx
@@ -5,14 +5,15 @@
     <p:sldMasterId id="2147483762" r:id="rId1"/>
   </p:sldMasterIdLst>
   <p:notesMasterIdLst>
-    <p:notesMasterId r:id="rId7"/>
+    <p:notesMasterId r:id="rId8"/>
   </p:notesMasterIdLst>
   <p:sldIdLst>
     <p:sldId id="259" r:id="rId2"/>
     <p:sldId id="260" r:id="rId3"/>
-    <p:sldId id="261" r:id="rId4"/>
-    <p:sldId id="262" r:id="rId5"/>
-    <p:sldId id="263" r:id="rId6"/>
+    <p:sldId id="264" r:id="rId4"/>
+    <p:sldId id="261" r:id="rId5"/>
+    <p:sldId id="262" r:id="rId6"/>
+    <p:sldId id="263" r:id="rId7"/>
   </p:sldIdLst>
   <p:sldSz cx="9144000" cy="6858000" type="screen4x3"/>
   <p:notesSz cx="6797675" cy="9926638"/>
@@ -3873,7 +3874,7 @@
           <a:p>
             <a:fld id="{63907722-5B79-4E7A-BBE9-199156961409}" type="datetimeFigureOut">
               <a:rPr lang="de-DE" smtClean="0"/>
-              <a:t>18.03.2015</a:t>
+              <a:t>27.04.2015</a:t>
             </a:fld>
             <a:endParaRPr lang="de-DE"/>
           </a:p>
@@ -4291,6 +4292,90 @@
             <a:fld id="{E2310F1F-3D49-41D8-A938-C5163B68A510}" type="slidenum">
               <a:rPr lang="de-DE" smtClean="0"/>
               <a:t>2</a:t>
+            </a:fld>
+            <a:endParaRPr lang="de-DE"/>
+          </a:p>
+        </p:txBody>
+      </p:sp>
+    </p:spTree>
+    <p:extLst>
+      <p:ext uri="{BB962C8B-B14F-4D97-AF65-F5344CB8AC3E}">
+        <p14:creationId xmlns:p14="http://schemas.microsoft.com/office/powerpoint/2010/main" val="1650761550"/>
+      </p:ext>
+    </p:extLst>
+  </p:cSld>
+  <p:clrMapOvr>
+    <a:masterClrMapping/>
+  </p:clrMapOvr>
+</p:notes>
+</file>
+
+<file path=ppt/notesSlides/notesSlide3.xml><?xml version="1.0" encoding="utf-8"?>
+<p:notes xmlns:a="http://schemas.openxmlformats.org/drawingml/2006/main" xmlns:r="http://schemas.openxmlformats.org/officeDocument/2006/relationships" xmlns:p="http://schemas.openxmlformats.org/presentationml/2006/main">
+  <p:cSld>
+    <p:spTree>
+      <p:nvGrpSpPr>
+        <p:cNvPr id="1" name=""/>
+        <p:cNvGrpSpPr/>
+        <p:nvPr/>
+      </p:nvGrpSpPr>
+      <p:grpSpPr>
+        <a:xfrm>
+          <a:off x="0" y="0"/>
+          <a:ext cx="0" cy="0"/>
+          <a:chOff x="0" y="0"/>
+          <a:chExt cx="0" cy="0"/>
+        </a:xfrm>
+      </p:grpSpPr>
+      <p:sp>
+        <p:nvSpPr>
+          <p:cNvPr id="2" name="Folienbildplatzhalter 1"/>
+          <p:cNvSpPr>
+            <a:spLocks noGrp="1" noRot="1" noChangeAspect="1"/>
+          </p:cNvSpPr>
+          <p:nvPr>
+            <p:ph type="sldImg"/>
+          </p:nvPr>
+        </p:nvSpPr>
+        <p:spPr/>
+      </p:sp>
+      <p:sp>
+        <p:nvSpPr>
+          <p:cNvPr id="3" name="Notizenplatzhalter 2"/>
+          <p:cNvSpPr>
+            <a:spLocks noGrp="1"/>
+          </p:cNvSpPr>
+          <p:nvPr>
+            <p:ph type="body" idx="1"/>
+          </p:nvPr>
+        </p:nvSpPr>
+        <p:spPr/>
+        <p:txBody>
+          <a:bodyPr/>
+          <a:lstStyle/>
+          <a:p>
+            <a:endParaRPr lang="de-DE" dirty="0"/>
+          </a:p>
+        </p:txBody>
+      </p:sp>
+      <p:sp>
+        <p:nvSpPr>
+          <p:cNvPr id="4" name="Foliennummernplatzhalter 3"/>
+          <p:cNvSpPr>
+            <a:spLocks noGrp="1"/>
+          </p:cNvSpPr>
+          <p:nvPr>
+            <p:ph type="sldNum" sz="quarter" idx="10"/>
+          </p:nvPr>
+        </p:nvSpPr>
+        <p:spPr/>
+        <p:txBody>
+          <a:bodyPr/>
+          <a:lstStyle/>
+          <a:p>
+            <a:fld id="{E2310F1F-3D49-41D8-A938-C5163B68A510}" type="slidenum">
+              <a:rPr lang="de-DE" smtClean="0"/>
+              <a:t>3</a:t>
             </a:fld>
             <a:endParaRPr lang="de-DE"/>
           </a:p>
@@ -13611,7 +13696,9 @@
           <a:prstGeom prst="rect">
             <a:avLst/>
           </a:prstGeom>
-          <a:ln/>
+          <a:ln>
+            <a:noFill/>
+          </a:ln>
         </p:spPr>
         <p:style>
           <a:lnRef idx="2">
@@ -19371,7 +19458,9 @@
           <a:prstGeom prst="rect">
             <a:avLst/>
           </a:prstGeom>
-          <a:ln/>
+          <a:ln>
+            <a:noFill/>
+          </a:ln>
         </p:spPr>
         <p:style>
           <a:lnRef idx="2">
@@ -21234,6 +21323,4270 @@
 </file>
 
 <file path=ppt/slides/slide3.xml><?xml version="1.0" encoding="utf-8"?>
+<p:sld xmlns:a="http://schemas.openxmlformats.org/drawingml/2006/main" xmlns:r="http://schemas.openxmlformats.org/officeDocument/2006/relationships" xmlns:p="http://schemas.openxmlformats.org/presentationml/2006/main">
+  <p:cSld>
+    <p:spTree>
+      <p:nvGrpSpPr>
+        <p:cNvPr id="1" name=""/>
+        <p:cNvGrpSpPr/>
+        <p:nvPr/>
+      </p:nvGrpSpPr>
+      <p:grpSpPr>
+        <a:xfrm>
+          <a:off x="0" y="0"/>
+          <a:ext cx="0" cy="0"/>
+          <a:chOff x="0" y="0"/>
+          <a:chExt cx="0" cy="0"/>
+        </a:xfrm>
+      </p:grpSpPr>
+      <p:sp>
+        <p:nvSpPr>
+          <p:cNvPr id="117" name="Rechteck 116"/>
+          <p:cNvSpPr/>
+          <p:nvPr/>
+        </p:nvSpPr>
+        <p:spPr>
+          <a:xfrm>
+            <a:off x="2255208" y="1775778"/>
+            <a:ext cx="6888792" cy="5082221"/>
+          </a:xfrm>
+          <a:prstGeom prst="rect">
+            <a:avLst/>
+          </a:prstGeom>
+          <a:solidFill>
+            <a:schemeClr val="accent1">
+              <a:lumMod val="20000"/>
+              <a:lumOff val="80000"/>
+            </a:schemeClr>
+          </a:solidFill>
+          <a:ln>
+            <a:noFill/>
+          </a:ln>
+        </p:spPr>
+        <p:style>
+          <a:lnRef idx="2">
+            <a:schemeClr val="accent1">
+              <a:shade val="50000"/>
+            </a:schemeClr>
+          </a:lnRef>
+          <a:fillRef idx="1">
+            <a:schemeClr val="accent1"/>
+          </a:fillRef>
+          <a:effectRef idx="0">
+            <a:schemeClr val="accent1"/>
+          </a:effectRef>
+          <a:fontRef idx="minor">
+            <a:schemeClr val="lt1"/>
+          </a:fontRef>
+        </p:style>
+        <p:txBody>
+          <a:bodyPr lIns="72000" rIns="72000" rtlCol="0" anchor="ctr"/>
+          <a:lstStyle/>
+          <a:p>
+            <a:pPr algn="ctr"/>
+            <a:endParaRPr lang="de-DE" sz="1600" dirty="0" smtClean="0">
+              <a:solidFill>
+                <a:schemeClr val="tx1"/>
+              </a:solidFill>
+            </a:endParaRPr>
+          </a:p>
+        </p:txBody>
+      </p:sp>
+      <p:sp>
+        <p:nvSpPr>
+          <p:cNvPr id="2049" name="Rechteck 2048"/>
+          <p:cNvSpPr/>
+          <p:nvPr/>
+        </p:nvSpPr>
+        <p:spPr>
+          <a:xfrm>
+            <a:off x="0" y="1775778"/>
+            <a:ext cx="2267744" cy="5082221"/>
+          </a:xfrm>
+          <a:prstGeom prst="rect">
+            <a:avLst/>
+          </a:prstGeom>
+          <a:solidFill>
+            <a:schemeClr val="accent5">
+              <a:lumMod val="20000"/>
+              <a:lumOff val="80000"/>
+            </a:schemeClr>
+          </a:solidFill>
+          <a:ln>
+            <a:noFill/>
+          </a:ln>
+        </p:spPr>
+        <p:style>
+          <a:lnRef idx="2">
+            <a:schemeClr val="accent1">
+              <a:shade val="50000"/>
+            </a:schemeClr>
+          </a:lnRef>
+          <a:fillRef idx="1">
+            <a:schemeClr val="accent1"/>
+          </a:fillRef>
+          <a:effectRef idx="0">
+            <a:schemeClr val="accent1"/>
+          </a:effectRef>
+          <a:fontRef idx="minor">
+            <a:schemeClr val="lt1"/>
+          </a:fontRef>
+        </p:style>
+        <p:txBody>
+          <a:bodyPr lIns="72000" rIns="72000" rtlCol="0" anchor="ctr"/>
+          <a:lstStyle/>
+          <a:p>
+            <a:pPr algn="ctr"/>
+            <a:endParaRPr lang="de-DE" sz="1600" dirty="0" smtClean="0">
+              <a:solidFill>
+                <a:schemeClr val="tx1"/>
+              </a:solidFill>
+            </a:endParaRPr>
+          </a:p>
+        </p:txBody>
+      </p:sp>
+      <p:sp>
+        <p:nvSpPr>
+          <p:cNvPr id="6" name="Datumsplatzhalter 5"/>
+          <p:cNvSpPr>
+            <a:spLocks noGrp="1"/>
+          </p:cNvSpPr>
+          <p:nvPr>
+            <p:ph type="dt" sz="half" idx="15"/>
+          </p:nvPr>
+        </p:nvSpPr>
+        <p:spPr/>
+        <p:txBody>
+          <a:bodyPr/>
+          <a:lstStyle/>
+          <a:p>
+            <a:pPr>
+              <a:buClr>
+                <a:schemeClr val="tx2"/>
+              </a:buClr>
+              <a:buSzPct val="100000"/>
+              <a:buFont typeface="Wingdings" pitchFamily="2" charset="2"/>
+              <a:buNone/>
+            </a:pPr>
+            <a:r>
+              <a:rPr lang="de-DE" smtClean="0"/>
+              <a:t>© iteratec | Datum</a:t>
+            </a:r>
+            <a:endParaRPr lang="de-DE" dirty="0"/>
+          </a:p>
+        </p:txBody>
+      </p:sp>
+      <p:sp>
+        <p:nvSpPr>
+          <p:cNvPr id="7" name="Fußzeilenplatzhalter 6"/>
+          <p:cNvSpPr>
+            <a:spLocks noGrp="1"/>
+          </p:cNvSpPr>
+          <p:nvPr>
+            <p:ph type="ftr" sz="quarter" idx="16"/>
+          </p:nvPr>
+        </p:nvSpPr>
+        <p:spPr/>
+        <p:txBody>
+          <a:bodyPr/>
+          <a:lstStyle/>
+          <a:p>
+            <a:pPr algn="ctr">
+              <a:buClr>
+                <a:schemeClr val="tx2"/>
+              </a:buClr>
+              <a:buSzPct val="100000"/>
+              <a:buFont typeface="Wingdings" pitchFamily="2" charset="2"/>
+              <a:buNone/>
+            </a:pPr>
+            <a:r>
+              <a:rPr lang="de-DE" dirty="0" smtClean="0"/>
+              <a:t>Optional: Präsentationstitel</a:t>
+            </a:r>
+            <a:endParaRPr lang="de-DE" dirty="0"/>
+          </a:p>
+        </p:txBody>
+      </p:sp>
+      <p:pic>
+        <p:nvPicPr>
+          <p:cNvPr id="2050" name="Picture 2"/>
+          <p:cNvPicPr>
+            <a:picLocks noChangeAspect="1" noChangeArrowheads="1"/>
+          </p:cNvPicPr>
+          <p:nvPr/>
+        </p:nvPicPr>
+        <p:blipFill>
+          <a:blip r:embed="rId3" cstate="print">
+            <a:extLst>
+              <a:ext uri="{28A0092B-C50C-407E-A947-70E740481C1C}">
+                <a14:useLocalDpi xmlns:a14="http://schemas.microsoft.com/office/drawing/2010/main" val="0"/>
+              </a:ext>
+            </a:extLst>
+          </a:blip>
+          <a:stretch>
+            <a:fillRect/>
+          </a:stretch>
+        </p:blipFill>
+        <p:spPr bwMode="auto">
+          <a:xfrm>
+            <a:off x="3779912" y="2179955"/>
+            <a:ext cx="1629656" cy="3625309"/>
+          </a:xfrm>
+          <a:prstGeom prst="rect">
+            <a:avLst/>
+          </a:prstGeom>
+          <a:noFill/>
+          <a:ln>
+            <a:noFill/>
+          </a:ln>
+          <a:extLst>
+            <a:ext uri="{909E8E84-426E-40DD-AFC4-6F175D3DCCD1}">
+              <a14:hiddenFill xmlns:a14="http://schemas.microsoft.com/office/drawing/2010/main">
+                <a:solidFill>
+                  <a:schemeClr val="accent1"/>
+                </a:solidFill>
+              </a14:hiddenFill>
+            </a:ext>
+            <a:ext uri="{91240B29-F687-4F45-9708-019B960494DF}">
+              <a14:hiddenLine xmlns:a14="http://schemas.microsoft.com/office/drawing/2010/main" w="9525">
+                <a:solidFill>
+                  <a:schemeClr val="tx1"/>
+                </a:solidFill>
+                <a:miter lim="800000"/>
+                <a:headEnd/>
+                <a:tailEnd/>
+              </a14:hiddenLine>
+            </a:ext>
+          </a:extLst>
+        </p:spPr>
+      </p:pic>
+      <p:sp>
+        <p:nvSpPr>
+          <p:cNvPr id="106" name="Rechteck 105"/>
+          <p:cNvSpPr/>
+          <p:nvPr/>
+        </p:nvSpPr>
+        <p:spPr>
+          <a:xfrm>
+            <a:off x="9756576" y="-2177575"/>
+            <a:ext cx="6877664" cy="4808456"/>
+          </a:xfrm>
+          <a:prstGeom prst="rect">
+            <a:avLst/>
+          </a:prstGeom>
+          <a:solidFill>
+            <a:schemeClr val="bg1"/>
+          </a:solidFill>
+          <a:ln>
+            <a:noFill/>
+          </a:ln>
+        </p:spPr>
+        <p:style>
+          <a:lnRef idx="2">
+            <a:schemeClr val="accent1">
+              <a:shade val="50000"/>
+            </a:schemeClr>
+          </a:lnRef>
+          <a:fillRef idx="1">
+            <a:schemeClr val="accent1"/>
+          </a:fillRef>
+          <a:effectRef idx="0">
+            <a:schemeClr val="accent1"/>
+          </a:effectRef>
+          <a:fontRef idx="minor">
+            <a:schemeClr val="lt1"/>
+          </a:fontRef>
+        </p:style>
+        <p:txBody>
+          <a:bodyPr lIns="72000" rIns="72000" rtlCol="0" anchor="ctr"/>
+          <a:lstStyle/>
+          <a:p>
+            <a:pPr algn="ctr"/>
+            <a:endParaRPr lang="de-DE" sz="1600" dirty="0" smtClean="0">
+              <a:solidFill>
+                <a:schemeClr val="tx1"/>
+              </a:solidFill>
+            </a:endParaRPr>
+          </a:p>
+        </p:txBody>
+      </p:sp>
+      <p:sp>
+        <p:nvSpPr>
+          <p:cNvPr id="2048" name="Rechteck 2047"/>
+          <p:cNvSpPr/>
+          <p:nvPr/>
+        </p:nvSpPr>
+        <p:spPr>
+          <a:xfrm>
+            <a:off x="9756576" y="-170711"/>
+            <a:ext cx="6876256" cy="359351"/>
+          </a:xfrm>
+          <a:prstGeom prst="rect">
+            <a:avLst/>
+          </a:prstGeom>
+          <a:noFill/>
+          <a:ln>
+            <a:noFill/>
+          </a:ln>
+        </p:spPr>
+        <p:style>
+          <a:lnRef idx="2">
+            <a:schemeClr val="accent1">
+              <a:shade val="50000"/>
+            </a:schemeClr>
+          </a:lnRef>
+          <a:fillRef idx="1">
+            <a:schemeClr val="accent1"/>
+          </a:fillRef>
+          <a:effectRef idx="0">
+            <a:schemeClr val="accent1"/>
+          </a:effectRef>
+          <a:fontRef idx="minor">
+            <a:schemeClr val="lt1"/>
+          </a:fontRef>
+        </p:style>
+        <p:txBody>
+          <a:bodyPr lIns="72000" rIns="72000" rtlCol="0" anchor="ctr"/>
+          <a:lstStyle/>
+          <a:p>
+            <a:pPr algn="ctr"/>
+            <a:r>
+              <a:rPr lang="de-DE" sz="1600" b="1" dirty="0" smtClean="0">
+                <a:solidFill>
+                  <a:schemeClr val="tx1"/>
+                </a:solidFill>
+              </a:rPr>
+              <a:t>Die Optimierung im </a:t>
+            </a:r>
+            <a:r>
+              <a:rPr lang="de-DE" sz="1600" b="1" dirty="0" err="1" smtClean="0">
+                <a:solidFill>
+                  <a:schemeClr val="tx1"/>
+                </a:solidFill>
+              </a:rPr>
+              <a:t>OpenSpeedMonitor</a:t>
+            </a:r>
+            <a:endParaRPr lang="de-DE" sz="1600" b="1" dirty="0" smtClean="0">
+              <a:solidFill>
+                <a:schemeClr val="tx1"/>
+              </a:solidFill>
+            </a:endParaRPr>
+          </a:p>
+        </p:txBody>
+      </p:sp>
+      <p:sp>
+        <p:nvSpPr>
+          <p:cNvPr id="107" name="Textplatzhalter 3"/>
+          <p:cNvSpPr>
+            <a:spLocks noGrp="1"/>
+          </p:cNvSpPr>
+          <p:nvPr>
+            <p:ph type="body" sz="quarter" idx="14"/>
+          </p:nvPr>
+        </p:nvSpPr>
+        <p:spPr>
+          <a:xfrm>
+            <a:off x="17923427" y="7809354"/>
+            <a:ext cx="842690" cy="342900"/>
+          </a:xfrm>
+        </p:spPr>
+        <p:txBody>
+          <a:bodyPr/>
+          <a:lstStyle/>
+          <a:p>
+            <a:endParaRPr lang="de-DE" dirty="0"/>
+          </a:p>
+        </p:txBody>
+      </p:sp>
+      <p:sp>
+        <p:nvSpPr>
+          <p:cNvPr id="108" name="Rechteck 107"/>
+          <p:cNvSpPr/>
+          <p:nvPr/>
+        </p:nvSpPr>
+        <p:spPr>
+          <a:xfrm>
+            <a:off x="10320105" y="5304172"/>
+            <a:ext cx="6880248" cy="5111093"/>
+          </a:xfrm>
+          <a:prstGeom prst="rect">
+            <a:avLst/>
+          </a:prstGeom>
+          <a:solidFill>
+            <a:schemeClr val="accent6"/>
+          </a:solidFill>
+          <a:ln>
+            <a:noFill/>
+          </a:ln>
+        </p:spPr>
+        <p:style>
+          <a:lnRef idx="2">
+            <a:schemeClr val="accent1">
+              <a:shade val="50000"/>
+            </a:schemeClr>
+          </a:lnRef>
+          <a:fillRef idx="1">
+            <a:schemeClr val="accent1"/>
+          </a:fillRef>
+          <a:effectRef idx="0">
+            <a:schemeClr val="accent1"/>
+          </a:effectRef>
+          <a:fontRef idx="minor">
+            <a:schemeClr val="lt1"/>
+          </a:fontRef>
+        </p:style>
+        <p:txBody>
+          <a:bodyPr lIns="72000" rIns="72000" rtlCol="0" anchor="ctr"/>
+          <a:lstStyle/>
+          <a:p>
+            <a:pPr algn="ctr"/>
+            <a:endParaRPr lang="de-DE" sz="1600" dirty="0" smtClean="0">
+              <a:solidFill>
+                <a:schemeClr val="tx1"/>
+              </a:solidFill>
+            </a:endParaRPr>
+          </a:p>
+        </p:txBody>
+      </p:sp>
+      <p:sp>
+        <p:nvSpPr>
+          <p:cNvPr id="123" name="Geschweifte Klammer rechts 122"/>
+          <p:cNvSpPr/>
+          <p:nvPr/>
+        </p:nvSpPr>
+        <p:spPr>
+          <a:xfrm>
+            <a:off x="11595439" y="6381328"/>
+            <a:ext cx="177362" cy="2304256"/>
+          </a:xfrm>
+          <a:prstGeom prst="rightBrace">
+            <a:avLst/>
+          </a:prstGeom>
+          <a:ln w="19050">
+            <a:solidFill>
+              <a:schemeClr val="tx2"/>
+            </a:solidFill>
+            <a:tailEnd type="arrow"/>
+          </a:ln>
+        </p:spPr>
+        <p:style>
+          <a:lnRef idx="1">
+            <a:schemeClr val="accent1"/>
+          </a:lnRef>
+          <a:fillRef idx="0">
+            <a:schemeClr val="accent1"/>
+          </a:fillRef>
+          <a:effectRef idx="0">
+            <a:schemeClr val="accent1"/>
+          </a:effectRef>
+          <a:fontRef idx="minor">
+            <a:schemeClr val="tx1"/>
+          </a:fontRef>
+        </p:style>
+        <p:txBody>
+          <a:bodyPr rtlCol="0" anchor="ctr"/>
+          <a:lstStyle/>
+          <a:p>
+            <a:pPr algn="ctr"/>
+            <a:endParaRPr lang="de-DE"/>
+          </a:p>
+        </p:txBody>
+      </p:sp>
+      <p:cxnSp>
+        <p:nvCxnSpPr>
+          <p:cNvPr id="124" name="Gerade Verbindung mit Pfeil 123"/>
+          <p:cNvCxnSpPr>
+            <a:stCxn id="123" idx="1"/>
+          </p:cNvCxnSpPr>
+          <p:nvPr/>
+        </p:nvCxnSpPr>
+        <p:spPr>
+          <a:xfrm>
+            <a:off x="11772801" y="7533456"/>
+            <a:ext cx="4176464" cy="0"/>
+          </a:xfrm>
+          <a:prstGeom prst="straightConnector1">
+            <a:avLst/>
+          </a:prstGeom>
+          <a:ln w="19050">
+            <a:solidFill>
+              <a:schemeClr val="tx2"/>
+            </a:solidFill>
+            <a:tailEnd type="arrow"/>
+          </a:ln>
+        </p:spPr>
+        <p:style>
+          <a:lnRef idx="1">
+            <a:schemeClr val="accent1"/>
+          </a:lnRef>
+          <a:fillRef idx="0">
+            <a:schemeClr val="accent1"/>
+          </a:fillRef>
+          <a:effectRef idx="0">
+            <a:schemeClr val="accent1"/>
+          </a:effectRef>
+          <a:fontRef idx="minor">
+            <a:schemeClr val="tx1"/>
+          </a:fontRef>
+        </p:style>
+      </p:cxnSp>
+      <p:sp>
+        <p:nvSpPr>
+          <p:cNvPr id="127" name="Rechteck 126"/>
+          <p:cNvSpPr/>
+          <p:nvPr/>
+        </p:nvSpPr>
+        <p:spPr>
+          <a:xfrm>
+            <a:off x="11713796" y="7030146"/>
+            <a:ext cx="4176464" cy="216024"/>
+          </a:xfrm>
+          <a:prstGeom prst="rect">
+            <a:avLst/>
+          </a:prstGeom>
+          <a:solidFill>
+            <a:schemeClr val="accent1">
+              <a:lumMod val="20000"/>
+              <a:lumOff val="80000"/>
+            </a:schemeClr>
+          </a:solidFill>
+          <a:ln>
+            <a:noFill/>
+          </a:ln>
+        </p:spPr>
+        <p:style>
+          <a:lnRef idx="2">
+            <a:schemeClr val="accent1">
+              <a:shade val="50000"/>
+            </a:schemeClr>
+          </a:lnRef>
+          <a:fillRef idx="1">
+            <a:schemeClr val="accent1"/>
+          </a:fillRef>
+          <a:effectRef idx="0">
+            <a:schemeClr val="accent1"/>
+          </a:effectRef>
+          <a:fontRef idx="minor">
+            <a:schemeClr val="lt1"/>
+          </a:fontRef>
+        </p:style>
+        <p:txBody>
+          <a:bodyPr lIns="72000" rIns="72000" rtlCol="0" anchor="ctr"/>
+          <a:lstStyle/>
+          <a:p>
+            <a:pPr algn="ctr"/>
+            <a:r>
+              <a:rPr lang="de-DE" sz="1200" dirty="0" smtClean="0">
+                <a:solidFill>
+                  <a:schemeClr val="tx1"/>
+                </a:solidFill>
+              </a:rPr>
+              <a:t>Im </a:t>
+            </a:r>
+            <a:r>
+              <a:rPr lang="de-DE" sz="1200" dirty="0" err="1" smtClean="0">
+                <a:solidFill>
+                  <a:schemeClr val="tx1"/>
+                </a:solidFill>
+              </a:rPr>
+              <a:t>OpenSpeedMonitor</a:t>
+            </a:r>
+            <a:r>
+              <a:rPr lang="de-DE" sz="1200" dirty="0" smtClean="0">
+                <a:solidFill>
+                  <a:schemeClr val="tx1"/>
+                </a:solidFill>
+              </a:rPr>
+              <a:t> zu sehen…</a:t>
+            </a:r>
+          </a:p>
+        </p:txBody>
+      </p:sp>
+      <p:cxnSp>
+        <p:nvCxnSpPr>
+          <p:cNvPr id="44" name="Gerade Verbindung mit Pfeil 43"/>
+          <p:cNvCxnSpPr>
+            <a:stCxn id="64" idx="3"/>
+            <a:endCxn id="47" idx="1"/>
+          </p:cNvCxnSpPr>
+          <p:nvPr/>
+        </p:nvCxnSpPr>
+        <p:spPr>
+          <a:xfrm>
+            <a:off x="4067944" y="2000472"/>
+            <a:ext cx="1152128" cy="307646"/>
+          </a:xfrm>
+          <a:prstGeom prst="straightConnector1">
+            <a:avLst/>
+          </a:prstGeom>
+          <a:ln w="28575">
+            <a:solidFill>
+              <a:srgbClr val="1D9C72"/>
+            </a:solidFill>
+            <a:tailEnd type="arrow"/>
+          </a:ln>
+        </p:spPr>
+        <p:style>
+          <a:lnRef idx="1">
+            <a:schemeClr val="dk1"/>
+          </a:lnRef>
+          <a:fillRef idx="0">
+            <a:schemeClr val="dk1"/>
+          </a:fillRef>
+          <a:effectRef idx="0">
+            <a:schemeClr val="dk1"/>
+          </a:effectRef>
+          <a:fontRef idx="minor">
+            <a:schemeClr val="tx1"/>
+          </a:fontRef>
+        </p:style>
+      </p:cxnSp>
+      <p:cxnSp>
+        <p:nvCxnSpPr>
+          <p:cNvPr id="45" name="Gerade Verbindung mit Pfeil 44"/>
+          <p:cNvCxnSpPr>
+            <a:stCxn id="64" idx="2"/>
+            <a:endCxn id="48" idx="3"/>
+          </p:cNvCxnSpPr>
+          <p:nvPr/>
+        </p:nvCxnSpPr>
+        <p:spPr>
+          <a:xfrm>
+            <a:off x="3527884" y="2096852"/>
+            <a:ext cx="396044" cy="455903"/>
+          </a:xfrm>
+          <a:prstGeom prst="straightConnector1">
+            <a:avLst/>
+          </a:prstGeom>
+          <a:ln w="28575">
+            <a:solidFill>
+              <a:srgbClr val="1D9C72"/>
+            </a:solidFill>
+            <a:tailEnd type="arrow"/>
+          </a:ln>
+        </p:spPr>
+        <p:style>
+          <a:lnRef idx="1">
+            <a:schemeClr val="dk1"/>
+          </a:lnRef>
+          <a:fillRef idx="0">
+            <a:schemeClr val="dk1"/>
+          </a:fillRef>
+          <a:effectRef idx="0">
+            <a:schemeClr val="dk1"/>
+          </a:effectRef>
+          <a:fontRef idx="minor">
+            <a:schemeClr val="tx1"/>
+          </a:fontRef>
+        </p:style>
+      </p:cxnSp>
+      <p:cxnSp>
+        <p:nvCxnSpPr>
+          <p:cNvPr id="46" name="Gerade Verbindung mit Pfeil 45"/>
+          <p:cNvCxnSpPr>
+            <a:stCxn id="64" idx="3"/>
+            <a:endCxn id="49" idx="1"/>
+          </p:cNvCxnSpPr>
+          <p:nvPr/>
+        </p:nvCxnSpPr>
+        <p:spPr>
+          <a:xfrm>
+            <a:off x="4067944" y="2000472"/>
+            <a:ext cx="1152128" cy="544891"/>
+          </a:xfrm>
+          <a:prstGeom prst="straightConnector1">
+            <a:avLst/>
+          </a:prstGeom>
+          <a:ln w="28575">
+            <a:solidFill>
+              <a:srgbClr val="1D9C72"/>
+            </a:solidFill>
+            <a:tailEnd type="arrow"/>
+          </a:ln>
+        </p:spPr>
+        <p:style>
+          <a:lnRef idx="1">
+            <a:schemeClr val="dk1"/>
+          </a:lnRef>
+          <a:fillRef idx="0">
+            <a:schemeClr val="dk1"/>
+          </a:fillRef>
+          <a:effectRef idx="0">
+            <a:schemeClr val="dk1"/>
+          </a:effectRef>
+          <a:fontRef idx="minor">
+            <a:schemeClr val="tx1"/>
+          </a:fontRef>
+        </p:style>
+      </p:cxnSp>
+      <p:sp>
+        <p:nvSpPr>
+          <p:cNvPr id="47" name="Rechteck 46"/>
+          <p:cNvSpPr/>
+          <p:nvPr/>
+        </p:nvSpPr>
+        <p:spPr>
+          <a:xfrm>
+            <a:off x="5220072" y="2218108"/>
+            <a:ext cx="144016" cy="180020"/>
+          </a:xfrm>
+          <a:prstGeom prst="rect">
+            <a:avLst/>
+          </a:prstGeom>
+          <a:noFill/>
+          <a:ln>
+            <a:noFill/>
+          </a:ln>
+        </p:spPr>
+        <p:style>
+          <a:lnRef idx="2">
+            <a:schemeClr val="accent1">
+              <a:shade val="50000"/>
+            </a:schemeClr>
+          </a:lnRef>
+          <a:fillRef idx="1">
+            <a:schemeClr val="accent1"/>
+          </a:fillRef>
+          <a:effectRef idx="0">
+            <a:schemeClr val="accent1"/>
+          </a:effectRef>
+          <a:fontRef idx="minor">
+            <a:schemeClr val="lt1"/>
+          </a:fontRef>
+        </p:style>
+        <p:txBody>
+          <a:bodyPr lIns="72000" rIns="72000" rtlCol="0" anchor="ctr"/>
+          <a:lstStyle/>
+          <a:p>
+            <a:pPr algn="ctr"/>
+            <a:endParaRPr lang="de-DE" sz="1600" dirty="0" smtClean="0">
+              <a:solidFill>
+                <a:schemeClr val="tx1"/>
+              </a:solidFill>
+            </a:endParaRPr>
+          </a:p>
+        </p:txBody>
+      </p:sp>
+      <p:sp>
+        <p:nvSpPr>
+          <p:cNvPr id="48" name="Rechteck 47"/>
+          <p:cNvSpPr/>
+          <p:nvPr/>
+        </p:nvSpPr>
+        <p:spPr>
+          <a:xfrm flipH="1">
+            <a:off x="3923928" y="2470136"/>
+            <a:ext cx="74286" cy="165237"/>
+          </a:xfrm>
+          <a:prstGeom prst="rect">
+            <a:avLst/>
+          </a:prstGeom>
+          <a:noFill/>
+          <a:ln>
+            <a:noFill/>
+          </a:ln>
+        </p:spPr>
+        <p:style>
+          <a:lnRef idx="2">
+            <a:schemeClr val="accent1">
+              <a:shade val="50000"/>
+            </a:schemeClr>
+          </a:lnRef>
+          <a:fillRef idx="1">
+            <a:schemeClr val="accent1"/>
+          </a:fillRef>
+          <a:effectRef idx="0">
+            <a:schemeClr val="accent1"/>
+          </a:effectRef>
+          <a:fontRef idx="minor">
+            <a:schemeClr val="lt1"/>
+          </a:fontRef>
+        </p:style>
+        <p:txBody>
+          <a:bodyPr lIns="72000" rIns="72000" rtlCol="0" anchor="ctr"/>
+          <a:lstStyle/>
+          <a:p>
+            <a:pPr algn="ctr"/>
+            <a:endParaRPr lang="de-DE" sz="1600" dirty="0" smtClean="0">
+              <a:solidFill>
+                <a:schemeClr val="tx1"/>
+              </a:solidFill>
+            </a:endParaRPr>
+          </a:p>
+        </p:txBody>
+      </p:sp>
+      <p:sp>
+        <p:nvSpPr>
+          <p:cNvPr id="49" name="Rechteck 48"/>
+          <p:cNvSpPr/>
+          <p:nvPr/>
+        </p:nvSpPr>
+        <p:spPr>
+          <a:xfrm>
+            <a:off x="5220072" y="2455353"/>
+            <a:ext cx="72008" cy="180020"/>
+          </a:xfrm>
+          <a:prstGeom prst="rect">
+            <a:avLst/>
+          </a:prstGeom>
+          <a:noFill/>
+          <a:ln>
+            <a:noFill/>
+          </a:ln>
+        </p:spPr>
+        <p:style>
+          <a:lnRef idx="2">
+            <a:schemeClr val="accent1">
+              <a:shade val="50000"/>
+            </a:schemeClr>
+          </a:lnRef>
+          <a:fillRef idx="1">
+            <a:schemeClr val="accent1"/>
+          </a:fillRef>
+          <a:effectRef idx="0">
+            <a:schemeClr val="accent1"/>
+          </a:effectRef>
+          <a:fontRef idx="minor">
+            <a:schemeClr val="lt1"/>
+          </a:fontRef>
+        </p:style>
+        <p:txBody>
+          <a:bodyPr lIns="72000" rIns="72000" rtlCol="0" anchor="ctr"/>
+          <a:lstStyle/>
+          <a:p>
+            <a:pPr algn="ctr"/>
+            <a:endParaRPr lang="de-DE" sz="1600" dirty="0" smtClean="0">
+              <a:solidFill>
+                <a:schemeClr val="tx1"/>
+              </a:solidFill>
+            </a:endParaRPr>
+          </a:p>
+        </p:txBody>
+      </p:sp>
+      <p:sp>
+        <p:nvSpPr>
+          <p:cNvPr id="50" name="Rechteck 49"/>
+          <p:cNvSpPr/>
+          <p:nvPr/>
+        </p:nvSpPr>
+        <p:spPr>
+          <a:xfrm>
+            <a:off x="4034433" y="3514252"/>
+            <a:ext cx="76135" cy="72008"/>
+          </a:xfrm>
+          <a:prstGeom prst="rect">
+            <a:avLst/>
+          </a:prstGeom>
+          <a:noFill/>
+          <a:ln>
+            <a:noFill/>
+          </a:ln>
+        </p:spPr>
+        <p:style>
+          <a:lnRef idx="2">
+            <a:schemeClr val="accent1">
+              <a:shade val="50000"/>
+            </a:schemeClr>
+          </a:lnRef>
+          <a:fillRef idx="1">
+            <a:schemeClr val="accent1"/>
+          </a:fillRef>
+          <a:effectRef idx="0">
+            <a:schemeClr val="accent1"/>
+          </a:effectRef>
+          <a:fontRef idx="minor">
+            <a:schemeClr val="lt1"/>
+          </a:fontRef>
+        </p:style>
+        <p:txBody>
+          <a:bodyPr lIns="72000" rIns="72000" rtlCol="0" anchor="ctr"/>
+          <a:lstStyle/>
+          <a:p>
+            <a:pPr algn="ctr"/>
+            <a:endParaRPr lang="de-DE" sz="1600" dirty="0" smtClean="0">
+              <a:solidFill>
+                <a:schemeClr val="tx1"/>
+              </a:solidFill>
+            </a:endParaRPr>
+          </a:p>
+        </p:txBody>
+      </p:sp>
+      <p:sp>
+        <p:nvSpPr>
+          <p:cNvPr id="51" name="Rechteck 50"/>
+          <p:cNvSpPr/>
+          <p:nvPr/>
+        </p:nvSpPr>
+        <p:spPr>
+          <a:xfrm>
+            <a:off x="4788024" y="3918582"/>
+            <a:ext cx="72008" cy="74027"/>
+          </a:xfrm>
+          <a:prstGeom prst="rect">
+            <a:avLst/>
+          </a:prstGeom>
+          <a:noFill/>
+          <a:ln>
+            <a:noFill/>
+          </a:ln>
+        </p:spPr>
+        <p:style>
+          <a:lnRef idx="2">
+            <a:schemeClr val="accent1">
+              <a:shade val="50000"/>
+            </a:schemeClr>
+          </a:lnRef>
+          <a:fillRef idx="1">
+            <a:schemeClr val="accent1"/>
+          </a:fillRef>
+          <a:effectRef idx="0">
+            <a:schemeClr val="accent1"/>
+          </a:effectRef>
+          <a:fontRef idx="minor">
+            <a:schemeClr val="lt1"/>
+          </a:fontRef>
+        </p:style>
+        <p:txBody>
+          <a:bodyPr lIns="72000" rIns="72000" rtlCol="0" anchor="ctr"/>
+          <a:lstStyle/>
+          <a:p>
+            <a:pPr algn="ctr"/>
+            <a:endParaRPr lang="de-DE" sz="1600" dirty="0" smtClean="0">
+              <a:solidFill>
+                <a:schemeClr val="tx1"/>
+              </a:solidFill>
+            </a:endParaRPr>
+          </a:p>
+        </p:txBody>
+      </p:sp>
+      <p:sp>
+        <p:nvSpPr>
+          <p:cNvPr id="52" name="Rechteck 51"/>
+          <p:cNvSpPr/>
+          <p:nvPr/>
+        </p:nvSpPr>
+        <p:spPr>
+          <a:xfrm>
+            <a:off x="3779912" y="5602484"/>
+            <a:ext cx="330656" cy="45719"/>
+          </a:xfrm>
+          <a:prstGeom prst="rect">
+            <a:avLst/>
+          </a:prstGeom>
+          <a:noFill/>
+          <a:ln>
+            <a:noFill/>
+          </a:ln>
+        </p:spPr>
+        <p:style>
+          <a:lnRef idx="2">
+            <a:schemeClr val="accent1">
+              <a:shade val="50000"/>
+            </a:schemeClr>
+          </a:lnRef>
+          <a:fillRef idx="1">
+            <a:schemeClr val="accent1"/>
+          </a:fillRef>
+          <a:effectRef idx="0">
+            <a:schemeClr val="accent1"/>
+          </a:effectRef>
+          <a:fontRef idx="minor">
+            <a:schemeClr val="lt1"/>
+          </a:fontRef>
+        </p:style>
+        <p:txBody>
+          <a:bodyPr lIns="72000" rIns="72000" rtlCol="0" anchor="ctr"/>
+          <a:lstStyle/>
+          <a:p>
+            <a:pPr algn="ctr"/>
+            <a:endParaRPr lang="de-DE" sz="1600" dirty="0" smtClean="0">
+              <a:solidFill>
+                <a:schemeClr val="tx1"/>
+              </a:solidFill>
+            </a:endParaRPr>
+          </a:p>
+        </p:txBody>
+      </p:sp>
+      <p:cxnSp>
+        <p:nvCxnSpPr>
+          <p:cNvPr id="53" name="Gerade Verbindung mit Pfeil 52"/>
+          <p:cNvCxnSpPr>
+            <a:stCxn id="64" idx="2"/>
+            <a:endCxn id="50" idx="0"/>
+          </p:cNvCxnSpPr>
+          <p:nvPr/>
+        </p:nvCxnSpPr>
+        <p:spPr>
+          <a:xfrm>
+            <a:off x="3527884" y="2096852"/>
+            <a:ext cx="544617" cy="1417400"/>
+          </a:xfrm>
+          <a:prstGeom prst="straightConnector1">
+            <a:avLst/>
+          </a:prstGeom>
+          <a:ln w="28575">
+            <a:solidFill>
+              <a:srgbClr val="1D9C72"/>
+            </a:solidFill>
+            <a:tailEnd type="arrow"/>
+          </a:ln>
+        </p:spPr>
+        <p:style>
+          <a:lnRef idx="1">
+            <a:schemeClr val="dk1"/>
+          </a:lnRef>
+          <a:fillRef idx="0">
+            <a:schemeClr val="dk1"/>
+          </a:fillRef>
+          <a:effectRef idx="0">
+            <a:schemeClr val="dk1"/>
+          </a:effectRef>
+          <a:fontRef idx="minor">
+            <a:schemeClr val="tx1"/>
+          </a:fontRef>
+        </p:style>
+      </p:cxnSp>
+      <p:cxnSp>
+        <p:nvCxnSpPr>
+          <p:cNvPr id="54" name="Gerade Verbindung mit Pfeil 53"/>
+          <p:cNvCxnSpPr>
+            <a:stCxn id="64" idx="2"/>
+            <a:endCxn id="51" idx="0"/>
+          </p:cNvCxnSpPr>
+          <p:nvPr/>
+        </p:nvCxnSpPr>
+        <p:spPr>
+          <a:xfrm>
+            <a:off x="3527884" y="2096852"/>
+            <a:ext cx="1296144" cy="1821730"/>
+          </a:xfrm>
+          <a:prstGeom prst="straightConnector1">
+            <a:avLst/>
+          </a:prstGeom>
+          <a:ln w="28575">
+            <a:solidFill>
+              <a:srgbClr val="1D9C72"/>
+            </a:solidFill>
+            <a:tailEnd type="arrow"/>
+          </a:ln>
+        </p:spPr>
+        <p:style>
+          <a:lnRef idx="1">
+            <a:schemeClr val="dk1"/>
+          </a:lnRef>
+          <a:fillRef idx="0">
+            <a:schemeClr val="dk1"/>
+          </a:fillRef>
+          <a:effectRef idx="0">
+            <a:schemeClr val="dk1"/>
+          </a:effectRef>
+          <a:fontRef idx="minor">
+            <a:schemeClr val="tx1"/>
+          </a:fontRef>
+        </p:style>
+      </p:cxnSp>
+      <p:cxnSp>
+        <p:nvCxnSpPr>
+          <p:cNvPr id="55" name="Gerade Verbindung mit Pfeil 54"/>
+          <p:cNvCxnSpPr>
+            <a:stCxn id="64" idx="2"/>
+            <a:endCxn id="52" idx="0"/>
+          </p:cNvCxnSpPr>
+          <p:nvPr/>
+        </p:nvCxnSpPr>
+        <p:spPr>
+          <a:xfrm>
+            <a:off x="3527884" y="2096852"/>
+            <a:ext cx="417356" cy="3505632"/>
+          </a:xfrm>
+          <a:prstGeom prst="straightConnector1">
+            <a:avLst/>
+          </a:prstGeom>
+          <a:ln w="28575">
+            <a:solidFill>
+              <a:srgbClr val="1D9C72"/>
+            </a:solidFill>
+            <a:tailEnd type="arrow"/>
+          </a:ln>
+        </p:spPr>
+        <p:style>
+          <a:lnRef idx="1">
+            <a:schemeClr val="dk1"/>
+          </a:lnRef>
+          <a:fillRef idx="0">
+            <a:schemeClr val="dk1"/>
+          </a:fillRef>
+          <a:effectRef idx="0">
+            <a:schemeClr val="dk1"/>
+          </a:effectRef>
+          <a:fontRef idx="minor">
+            <a:schemeClr val="tx1"/>
+          </a:fontRef>
+        </p:style>
+      </p:cxnSp>
+      <p:sp>
+        <p:nvSpPr>
+          <p:cNvPr id="64" name="Rechteck 63"/>
+          <p:cNvSpPr/>
+          <p:nvPr/>
+        </p:nvSpPr>
+        <p:spPr>
+          <a:xfrm>
+            <a:off x="2987824" y="1904091"/>
+            <a:ext cx="1080120" cy="192761"/>
+          </a:xfrm>
+          <a:prstGeom prst="rect">
+            <a:avLst/>
+          </a:prstGeom>
+          <a:solidFill>
+            <a:srgbClr val="1D9C72"/>
+          </a:solidFill>
+          <a:ln>
+            <a:solidFill>
+              <a:srgbClr val="1D9C72"/>
+            </a:solidFill>
+          </a:ln>
+        </p:spPr>
+        <p:style>
+          <a:lnRef idx="2">
+            <a:schemeClr val="accent2">
+              <a:shade val="50000"/>
+            </a:schemeClr>
+          </a:lnRef>
+          <a:fillRef idx="1">
+            <a:schemeClr val="accent2"/>
+          </a:fillRef>
+          <a:effectRef idx="0">
+            <a:schemeClr val="accent2"/>
+          </a:effectRef>
+          <a:fontRef idx="minor">
+            <a:schemeClr val="lt1"/>
+          </a:fontRef>
+        </p:style>
+        <p:txBody>
+          <a:bodyPr lIns="72000" rIns="72000" rtlCol="0" anchor="b"/>
+          <a:lstStyle/>
+          <a:p>
+            <a:pPr algn="ctr"/>
+            <a:endParaRPr lang="de-DE" sz="1000" i="1" dirty="0" smtClean="0">
+              <a:solidFill>
+                <a:schemeClr val="tx1"/>
+              </a:solidFill>
+            </a:endParaRPr>
+          </a:p>
+        </p:txBody>
+      </p:sp>
+      <p:pic>
+        <p:nvPicPr>
+          <p:cNvPr id="1032" name="Picture 8"/>
+          <p:cNvPicPr>
+            <a:picLocks noChangeAspect="1" noChangeArrowheads="1"/>
+          </p:cNvPicPr>
+          <p:nvPr/>
+        </p:nvPicPr>
+        <p:blipFill>
+          <a:blip r:embed="rId4" cstate="print">
+            <a:extLst>
+              <a:ext uri="{28A0092B-C50C-407E-A947-70E740481C1C}">
+                <a14:useLocalDpi xmlns:a14="http://schemas.microsoft.com/office/drawing/2010/main" val="0"/>
+              </a:ext>
+            </a:extLst>
+          </a:blip>
+          <a:srcRect/>
+          <a:stretch>
+            <a:fillRect/>
+          </a:stretch>
+        </p:blipFill>
+        <p:spPr bwMode="auto">
+          <a:xfrm>
+            <a:off x="3026321" y="1941899"/>
+            <a:ext cx="1008112" cy="109830"/>
+          </a:xfrm>
+          <a:prstGeom prst="rect">
+            <a:avLst/>
+          </a:prstGeom>
+          <a:noFill/>
+          <a:ln>
+            <a:noFill/>
+          </a:ln>
+          <a:extLst>
+            <a:ext uri="{909E8E84-426E-40DD-AFC4-6F175D3DCCD1}">
+              <a14:hiddenFill xmlns:a14="http://schemas.microsoft.com/office/drawing/2010/main">
+                <a:solidFill>
+                  <a:schemeClr val="accent1"/>
+                </a:solidFill>
+              </a14:hiddenFill>
+            </a:ext>
+            <a:ext uri="{91240B29-F687-4F45-9708-019B960494DF}">
+              <a14:hiddenLine xmlns:a14="http://schemas.microsoft.com/office/drawing/2010/main" w="9525">
+                <a:solidFill>
+                  <a:schemeClr val="tx1"/>
+                </a:solidFill>
+                <a:miter lim="800000"/>
+                <a:headEnd/>
+                <a:tailEnd/>
+              </a14:hiddenLine>
+            </a:ext>
+          </a:extLst>
+        </p:spPr>
+      </p:pic>
+      <p:sp>
+        <p:nvSpPr>
+          <p:cNvPr id="8" name="Foliennummernplatzhalter 7"/>
+          <p:cNvSpPr>
+            <a:spLocks noGrp="1"/>
+          </p:cNvSpPr>
+          <p:nvPr>
+            <p:ph type="sldNum" sz="quarter" idx="17"/>
+          </p:nvPr>
+        </p:nvSpPr>
+        <p:spPr/>
+        <p:txBody>
+          <a:bodyPr/>
+          <a:lstStyle/>
+          <a:p>
+            <a:pPr algn="r">
+              <a:buClr>
+                <a:schemeClr val="tx2"/>
+              </a:buClr>
+              <a:buSzPct val="100000"/>
+              <a:buFont typeface="Wingdings" pitchFamily="2" charset="2"/>
+              <a:buNone/>
+            </a:pPr>
+            <a:r>
+              <a:rPr lang="de-DE" dirty="0" smtClean="0"/>
+              <a:t>Seite </a:t>
+            </a:r>
+            <a:fld id="{26F0CC0A-7687-4B44-955F-AD67B8EF3E28}" type="slidenum">
+              <a:rPr lang="de-DE" smtClean="0"/>
+              <a:pPr algn="r">
+                <a:buClr>
+                  <a:schemeClr val="tx2"/>
+                </a:buClr>
+                <a:buSzPct val="100000"/>
+                <a:buFont typeface="Wingdings" pitchFamily="2" charset="2"/>
+                <a:buNone/>
+              </a:pPr>
+              <a:t>3</a:t>
+            </a:fld>
+            <a:endParaRPr lang="de-DE" dirty="0"/>
+          </a:p>
+        </p:txBody>
+      </p:sp>
+      <p:sp>
+        <p:nvSpPr>
+          <p:cNvPr id="168" name="Rechteck 167"/>
+          <p:cNvSpPr/>
+          <p:nvPr/>
+        </p:nvSpPr>
+        <p:spPr>
+          <a:xfrm>
+            <a:off x="-8612585" y="7772789"/>
+            <a:ext cx="6888792" cy="5082221"/>
+          </a:xfrm>
+          <a:prstGeom prst="rect">
+            <a:avLst/>
+          </a:prstGeom>
+          <a:solidFill>
+            <a:schemeClr val="accent1">
+              <a:lumMod val="20000"/>
+              <a:lumOff val="80000"/>
+            </a:schemeClr>
+          </a:solidFill>
+          <a:ln>
+            <a:noFill/>
+          </a:ln>
+        </p:spPr>
+        <p:style>
+          <a:lnRef idx="2">
+            <a:schemeClr val="accent1">
+              <a:shade val="50000"/>
+            </a:schemeClr>
+          </a:lnRef>
+          <a:fillRef idx="1">
+            <a:schemeClr val="accent1"/>
+          </a:fillRef>
+          <a:effectRef idx="0">
+            <a:schemeClr val="accent1"/>
+          </a:effectRef>
+          <a:fontRef idx="minor">
+            <a:schemeClr val="lt1"/>
+          </a:fontRef>
+        </p:style>
+        <p:txBody>
+          <a:bodyPr lIns="72000" rIns="72000" rtlCol="0" anchor="ctr"/>
+          <a:lstStyle/>
+          <a:p>
+            <a:pPr algn="ctr"/>
+            <a:endParaRPr lang="de-DE" sz="1600" dirty="0" smtClean="0">
+              <a:solidFill>
+                <a:schemeClr val="tx1"/>
+              </a:solidFill>
+            </a:endParaRPr>
+          </a:p>
+        </p:txBody>
+      </p:sp>
+      <p:sp>
+        <p:nvSpPr>
+          <p:cNvPr id="118" name="Rechteck 117"/>
+          <p:cNvSpPr/>
+          <p:nvPr/>
+        </p:nvSpPr>
+        <p:spPr>
+          <a:xfrm>
+            <a:off x="-12536" y="1628800"/>
+            <a:ext cx="9156536" cy="146978"/>
+          </a:xfrm>
+          <a:prstGeom prst="rect">
+            <a:avLst/>
+          </a:prstGeom>
+          <a:solidFill>
+            <a:schemeClr val="bg1"/>
+          </a:solidFill>
+          <a:ln>
+            <a:noFill/>
+          </a:ln>
+          <a:effectLst>
+            <a:outerShdw blurRad="50800" dist="38100" dir="5400000" algn="t" rotWithShape="0">
+              <a:prstClr val="black">
+                <a:alpha val="40000"/>
+              </a:prstClr>
+            </a:outerShdw>
+          </a:effectLst>
+        </p:spPr>
+        <p:style>
+          <a:lnRef idx="2">
+            <a:schemeClr val="accent1">
+              <a:shade val="50000"/>
+            </a:schemeClr>
+          </a:lnRef>
+          <a:fillRef idx="1">
+            <a:schemeClr val="accent1"/>
+          </a:fillRef>
+          <a:effectRef idx="0">
+            <a:schemeClr val="accent1"/>
+          </a:effectRef>
+          <a:fontRef idx="minor">
+            <a:schemeClr val="lt1"/>
+          </a:fontRef>
+        </p:style>
+        <p:txBody>
+          <a:bodyPr lIns="72000" rIns="72000" rtlCol="0" anchor="ctr"/>
+          <a:lstStyle/>
+          <a:p>
+            <a:pPr algn="ctr"/>
+            <a:endParaRPr lang="de-DE" sz="1600" dirty="0" smtClean="0">
+              <a:solidFill>
+                <a:schemeClr val="tx1"/>
+              </a:solidFill>
+            </a:endParaRPr>
+          </a:p>
+        </p:txBody>
+      </p:sp>
+      <p:sp>
+        <p:nvSpPr>
+          <p:cNvPr id="88" name="Rechteck 87"/>
+          <p:cNvSpPr/>
+          <p:nvPr/>
+        </p:nvSpPr>
+        <p:spPr>
+          <a:xfrm>
+            <a:off x="-468560" y="8181530"/>
+            <a:ext cx="5878128" cy="825866"/>
+          </a:xfrm>
+          <a:prstGeom prst="rect">
+            <a:avLst/>
+          </a:prstGeom>
+          <a:solidFill>
+            <a:schemeClr val="bg1"/>
+          </a:solidFill>
+          <a:ln>
+            <a:noFill/>
+          </a:ln>
+        </p:spPr>
+        <p:style>
+          <a:lnRef idx="2">
+            <a:schemeClr val="accent1">
+              <a:shade val="50000"/>
+            </a:schemeClr>
+          </a:lnRef>
+          <a:fillRef idx="1">
+            <a:schemeClr val="accent1"/>
+          </a:fillRef>
+          <a:effectRef idx="0">
+            <a:schemeClr val="accent1"/>
+          </a:effectRef>
+          <a:fontRef idx="minor">
+            <a:schemeClr val="lt1"/>
+          </a:fontRef>
+        </p:style>
+        <p:txBody>
+          <a:bodyPr lIns="72000" rIns="72000" rtlCol="0" anchor="ctr"/>
+          <a:lstStyle/>
+          <a:p>
+            <a:pPr algn="ctr"/>
+            <a:r>
+              <a:rPr lang="de-DE" sz="1600" b="1" dirty="0">
+                <a:solidFill>
+                  <a:schemeClr val="tx1"/>
+                </a:solidFill>
+                <a:latin typeface="FontAwesome" pitchFamily="50" charset="0"/>
+              </a:rPr>
+              <a:t></a:t>
+            </a:r>
+            <a:r>
+              <a:rPr lang="de-DE" sz="1600" b="1" dirty="0">
+                <a:solidFill>
+                  <a:schemeClr val="tx1"/>
+                </a:solidFill>
+              </a:rPr>
+              <a:t> </a:t>
+            </a:r>
+            <a:r>
+              <a:rPr lang="de-DE" sz="1600" b="1" dirty="0" smtClean="0">
+                <a:solidFill>
+                  <a:schemeClr val="tx1"/>
+                </a:solidFill>
+              </a:rPr>
+              <a:t>Font </a:t>
+            </a:r>
+            <a:r>
+              <a:rPr lang="de-DE" sz="1600" b="1" dirty="0" err="1" smtClean="0">
+                <a:solidFill>
+                  <a:schemeClr val="tx1"/>
+                </a:solidFill>
+              </a:rPr>
+              <a:t>Awesome</a:t>
+            </a:r>
+            <a:r>
+              <a:rPr lang="de-DE" sz="1600" b="1" dirty="0" smtClean="0">
+                <a:solidFill>
+                  <a:schemeClr val="tx1"/>
+                </a:solidFill>
+              </a:rPr>
+              <a:t> hat 519 Icons</a:t>
+            </a:r>
+          </a:p>
+        </p:txBody>
+      </p:sp>
+      <p:pic>
+        <p:nvPicPr>
+          <p:cNvPr id="172" name="Picture 10"/>
+          <p:cNvPicPr>
+            <a:picLocks noChangeAspect="1" noChangeArrowheads="1"/>
+          </p:cNvPicPr>
+          <p:nvPr/>
+        </p:nvPicPr>
+        <p:blipFill>
+          <a:blip r:embed="rId5">
+            <a:extLst>
+              <a:ext uri="{28A0092B-C50C-407E-A947-70E740481C1C}">
+                <a14:useLocalDpi xmlns:a14="http://schemas.microsoft.com/office/drawing/2010/main" val="0"/>
+              </a:ext>
+            </a:extLst>
+          </a:blip>
+          <a:srcRect/>
+          <a:stretch>
+            <a:fillRect/>
+          </a:stretch>
+        </p:blipFill>
+        <p:spPr bwMode="auto">
+          <a:xfrm>
+            <a:off x="-8040321" y="7859718"/>
+            <a:ext cx="5964345" cy="15175806"/>
+          </a:xfrm>
+          <a:prstGeom prst="rect">
+            <a:avLst/>
+          </a:prstGeom>
+          <a:noFill/>
+          <a:ln>
+            <a:noFill/>
+          </a:ln>
+          <a:effectLst/>
+          <a:extLst>
+            <a:ext uri="{909E8E84-426E-40DD-AFC4-6F175D3DCCD1}">
+              <a14:hiddenFill xmlns:a14="http://schemas.microsoft.com/office/drawing/2010/main">
+                <a:solidFill>
+                  <a:schemeClr val="accent1"/>
+                </a:solidFill>
+              </a14:hiddenFill>
+            </a:ext>
+            <a:ext uri="{91240B29-F687-4F45-9708-019B960494DF}">
+              <a14:hiddenLine xmlns:a14="http://schemas.microsoft.com/office/drawing/2010/main" w="9525">
+                <a:solidFill>
+                  <a:schemeClr val="tx1"/>
+                </a:solidFill>
+                <a:miter lim="800000"/>
+                <a:headEnd/>
+                <a:tailEnd/>
+              </a14:hiddenLine>
+            </a:ext>
+            <a:ext uri="{AF507438-7753-43E0-B8FC-AC1667EBCBE1}">
+              <a14:hiddenEffects xmlns:a14="http://schemas.microsoft.com/office/drawing/2010/main">
+                <a:effectLst>
+                  <a:outerShdw dist="35921" dir="2700000" algn="ctr" rotWithShape="0">
+                    <a:schemeClr val="bg2"/>
+                  </a:outerShdw>
+                </a:effectLst>
+              </a14:hiddenEffects>
+            </a:ext>
+          </a:extLst>
+        </p:spPr>
+      </p:pic>
+      <p:sp>
+        <p:nvSpPr>
+          <p:cNvPr id="126" name="Rechteck 125"/>
+          <p:cNvSpPr/>
+          <p:nvPr/>
+        </p:nvSpPr>
+        <p:spPr>
+          <a:xfrm>
+            <a:off x="11713796" y="7389440"/>
+            <a:ext cx="4176464" cy="216024"/>
+          </a:xfrm>
+          <a:prstGeom prst="rect">
+            <a:avLst/>
+          </a:prstGeom>
+          <a:noFill/>
+          <a:ln>
+            <a:noFill/>
+          </a:ln>
+        </p:spPr>
+        <p:style>
+          <a:lnRef idx="2">
+            <a:schemeClr val="accent1">
+              <a:shade val="50000"/>
+            </a:schemeClr>
+          </a:lnRef>
+          <a:fillRef idx="1">
+            <a:schemeClr val="accent1"/>
+          </a:fillRef>
+          <a:effectRef idx="0">
+            <a:schemeClr val="accent1"/>
+          </a:effectRef>
+          <a:fontRef idx="minor">
+            <a:schemeClr val="lt1"/>
+          </a:fontRef>
+        </p:style>
+        <p:txBody>
+          <a:bodyPr lIns="72000" rIns="72000" rtlCol="0" anchor="ctr"/>
+          <a:lstStyle/>
+          <a:p>
+            <a:pPr algn="ctr"/>
+            <a:r>
+              <a:rPr lang="de-DE" sz="1200" dirty="0" smtClean="0">
+                <a:solidFill>
+                  <a:schemeClr val="tx1"/>
+                </a:solidFill>
+              </a:rPr>
+              <a:t>Minimierung von vielen Imageicons zu einem Font + CSS Sheet</a:t>
+            </a:r>
+          </a:p>
+        </p:txBody>
+      </p:sp>
+      <p:sp>
+        <p:nvSpPr>
+          <p:cNvPr id="175" name="Rechteck 174"/>
+          <p:cNvSpPr/>
+          <p:nvPr/>
+        </p:nvSpPr>
+        <p:spPr>
+          <a:xfrm>
+            <a:off x="-4068960" y="1132729"/>
+            <a:ext cx="2823420" cy="5725271"/>
+          </a:xfrm>
+          <a:prstGeom prst="rect">
+            <a:avLst/>
+          </a:prstGeom>
+          <a:solidFill>
+            <a:schemeClr val="bg1"/>
+          </a:solidFill>
+          <a:ln>
+            <a:noFill/>
+          </a:ln>
+        </p:spPr>
+        <p:style>
+          <a:lnRef idx="2">
+            <a:schemeClr val="accent1">
+              <a:shade val="50000"/>
+            </a:schemeClr>
+          </a:lnRef>
+          <a:fillRef idx="1">
+            <a:schemeClr val="accent1"/>
+          </a:fillRef>
+          <a:effectRef idx="0">
+            <a:schemeClr val="accent1"/>
+          </a:effectRef>
+          <a:fontRef idx="minor">
+            <a:schemeClr val="lt1"/>
+          </a:fontRef>
+        </p:style>
+        <p:txBody>
+          <a:bodyPr lIns="72000" rIns="72000" rtlCol="0" anchor="ctr"/>
+          <a:lstStyle/>
+          <a:p>
+            <a:pPr algn="ctr"/>
+            <a:r>
+              <a:rPr lang="de-DE" sz="1600" b="1" dirty="0" smtClean="0">
+                <a:solidFill>
+                  <a:schemeClr val="tx1"/>
+                </a:solidFill>
+              </a:rPr>
+              <a:t>Mehr Icon Fonts</a:t>
+            </a:r>
+          </a:p>
+        </p:txBody>
+      </p:sp>
+      <p:pic>
+        <p:nvPicPr>
+          <p:cNvPr id="1035" name="Picture 11"/>
+          <p:cNvPicPr>
+            <a:picLocks noChangeAspect="1" noChangeArrowheads="1"/>
+          </p:cNvPicPr>
+          <p:nvPr/>
+        </p:nvPicPr>
+        <p:blipFill>
+          <a:blip r:embed="rId6">
+            <a:extLst>
+              <a:ext uri="{28A0092B-C50C-407E-A947-70E740481C1C}">
+                <a14:useLocalDpi xmlns:a14="http://schemas.microsoft.com/office/drawing/2010/main" val="0"/>
+              </a:ext>
+            </a:extLst>
+          </a:blip>
+          <a:stretch>
+            <a:fillRect/>
+          </a:stretch>
+        </p:blipFill>
+        <p:spPr bwMode="auto">
+          <a:xfrm>
+            <a:off x="-3198547" y="3251562"/>
+            <a:ext cx="1082594" cy="249446"/>
+          </a:xfrm>
+          <a:prstGeom prst="rect">
+            <a:avLst/>
+          </a:prstGeom>
+          <a:noFill/>
+          <a:ln>
+            <a:noFill/>
+          </a:ln>
+          <a:extLst>
+            <a:ext uri="{909E8E84-426E-40DD-AFC4-6F175D3DCCD1}">
+              <a14:hiddenFill xmlns:a14="http://schemas.microsoft.com/office/drawing/2010/main">
+                <a:solidFill>
+                  <a:schemeClr val="accent1"/>
+                </a:solidFill>
+              </a14:hiddenFill>
+            </a:ext>
+            <a:ext uri="{91240B29-F687-4F45-9708-019B960494DF}">
+              <a14:hiddenLine xmlns:a14="http://schemas.microsoft.com/office/drawing/2010/main" w="9525">
+                <a:solidFill>
+                  <a:schemeClr val="tx1"/>
+                </a:solidFill>
+                <a:miter lim="800000"/>
+                <a:headEnd/>
+                <a:tailEnd/>
+              </a14:hiddenLine>
+            </a:ext>
+          </a:extLst>
+        </p:spPr>
+      </p:pic>
+      <p:pic>
+        <p:nvPicPr>
+          <p:cNvPr id="1038" name="Picture 14"/>
+          <p:cNvPicPr>
+            <a:picLocks noChangeAspect="1" noChangeArrowheads="1"/>
+          </p:cNvPicPr>
+          <p:nvPr/>
+        </p:nvPicPr>
+        <p:blipFill>
+          <a:blip r:embed="rId7">
+            <a:extLst>
+              <a:ext uri="{28A0092B-C50C-407E-A947-70E740481C1C}">
+                <a14:useLocalDpi xmlns:a14="http://schemas.microsoft.com/office/drawing/2010/main" val="0"/>
+              </a:ext>
+            </a:extLst>
+          </a:blip>
+          <a:srcRect/>
+          <a:stretch>
+            <a:fillRect/>
+          </a:stretch>
+        </p:blipFill>
+        <p:spPr bwMode="auto">
+          <a:xfrm>
+            <a:off x="-2999726" y="4509120"/>
+            <a:ext cx="684951" cy="324837"/>
+          </a:xfrm>
+          <a:prstGeom prst="rect">
+            <a:avLst/>
+          </a:prstGeom>
+          <a:noFill/>
+          <a:ln>
+            <a:noFill/>
+          </a:ln>
+          <a:effectLst/>
+          <a:extLst>
+            <a:ext uri="{909E8E84-426E-40DD-AFC4-6F175D3DCCD1}">
+              <a14:hiddenFill xmlns:a14="http://schemas.microsoft.com/office/drawing/2010/main">
+                <a:solidFill>
+                  <a:schemeClr val="accent1"/>
+                </a:solidFill>
+              </a14:hiddenFill>
+            </a:ext>
+            <a:ext uri="{91240B29-F687-4F45-9708-019B960494DF}">
+              <a14:hiddenLine xmlns:a14="http://schemas.microsoft.com/office/drawing/2010/main" w="9525">
+                <a:solidFill>
+                  <a:schemeClr val="tx1"/>
+                </a:solidFill>
+                <a:miter lim="800000"/>
+                <a:headEnd/>
+                <a:tailEnd/>
+              </a14:hiddenLine>
+            </a:ext>
+            <a:ext uri="{AF507438-7753-43E0-B8FC-AC1667EBCBE1}">
+              <a14:hiddenEffects xmlns:a14="http://schemas.microsoft.com/office/drawing/2010/main">
+                <a:effectLst>
+                  <a:outerShdw dist="35921" dir="2700000" algn="ctr" rotWithShape="0">
+                    <a:schemeClr val="bg2"/>
+                  </a:outerShdw>
+                </a:effectLst>
+              </a14:hiddenEffects>
+            </a:ext>
+          </a:extLst>
+        </p:spPr>
+      </p:pic>
+      <p:pic>
+        <p:nvPicPr>
+          <p:cNvPr id="1040" name="Picture 16"/>
+          <p:cNvPicPr>
+            <a:picLocks noChangeAspect="1" noChangeArrowheads="1"/>
+          </p:cNvPicPr>
+          <p:nvPr/>
+        </p:nvPicPr>
+        <p:blipFill>
+          <a:blip r:embed="rId8" cstate="print">
+            <a:extLst>
+              <a:ext uri="{28A0092B-C50C-407E-A947-70E740481C1C}">
+                <a14:useLocalDpi xmlns:a14="http://schemas.microsoft.com/office/drawing/2010/main" val="0"/>
+              </a:ext>
+            </a:extLst>
+          </a:blip>
+          <a:srcRect/>
+          <a:stretch>
+            <a:fillRect/>
+          </a:stretch>
+        </p:blipFill>
+        <p:spPr bwMode="auto">
+          <a:xfrm>
+            <a:off x="-3147827" y="2519951"/>
+            <a:ext cx="981153" cy="260977"/>
+          </a:xfrm>
+          <a:prstGeom prst="rect">
+            <a:avLst/>
+          </a:prstGeom>
+          <a:noFill/>
+          <a:ln>
+            <a:noFill/>
+          </a:ln>
+          <a:effectLst/>
+          <a:extLst>
+            <a:ext uri="{909E8E84-426E-40DD-AFC4-6F175D3DCCD1}">
+              <a14:hiddenFill xmlns:a14="http://schemas.microsoft.com/office/drawing/2010/main">
+                <a:solidFill>
+                  <a:schemeClr val="accent1"/>
+                </a:solidFill>
+              </a14:hiddenFill>
+            </a:ext>
+            <a:ext uri="{91240B29-F687-4F45-9708-019B960494DF}">
+              <a14:hiddenLine xmlns:a14="http://schemas.microsoft.com/office/drawing/2010/main" w="9525">
+                <a:solidFill>
+                  <a:schemeClr val="tx1"/>
+                </a:solidFill>
+                <a:miter lim="800000"/>
+                <a:headEnd/>
+                <a:tailEnd/>
+              </a14:hiddenLine>
+            </a:ext>
+            <a:ext uri="{AF507438-7753-43E0-B8FC-AC1667EBCBE1}">
+              <a14:hiddenEffects xmlns:a14="http://schemas.microsoft.com/office/drawing/2010/main">
+                <a:effectLst>
+                  <a:outerShdw dist="35921" dir="2700000" algn="ctr" rotWithShape="0">
+                    <a:schemeClr val="bg2"/>
+                  </a:outerShdw>
+                </a:effectLst>
+              </a14:hiddenEffects>
+            </a:ext>
+          </a:extLst>
+        </p:spPr>
+      </p:pic>
+      <p:pic>
+        <p:nvPicPr>
+          <p:cNvPr id="1041" name="Picture 17"/>
+          <p:cNvPicPr>
+            <a:picLocks noChangeAspect="1" noChangeArrowheads="1"/>
+          </p:cNvPicPr>
+          <p:nvPr/>
+        </p:nvPicPr>
+        <p:blipFill>
+          <a:blip r:embed="rId9" cstate="print">
+            <a:extLst>
+              <a:ext uri="{28A0092B-C50C-407E-A947-70E740481C1C}">
+                <a14:useLocalDpi xmlns:a14="http://schemas.microsoft.com/office/drawing/2010/main" val="0"/>
+              </a:ext>
+            </a:extLst>
+          </a:blip>
+          <a:srcRect/>
+          <a:stretch>
+            <a:fillRect/>
+          </a:stretch>
+        </p:blipFill>
+        <p:spPr bwMode="auto">
+          <a:xfrm>
+            <a:off x="-3291238" y="5354953"/>
+            <a:ext cx="1267976" cy="162279"/>
+          </a:xfrm>
+          <a:prstGeom prst="rect">
+            <a:avLst/>
+          </a:prstGeom>
+          <a:noFill/>
+          <a:ln>
+            <a:noFill/>
+          </a:ln>
+          <a:extLst>
+            <a:ext uri="{909E8E84-426E-40DD-AFC4-6F175D3DCCD1}">
+              <a14:hiddenFill xmlns:a14="http://schemas.microsoft.com/office/drawing/2010/main">
+                <a:solidFill>
+                  <a:schemeClr val="accent1"/>
+                </a:solidFill>
+              </a14:hiddenFill>
+            </a:ext>
+            <a:ext uri="{91240B29-F687-4F45-9708-019B960494DF}">
+              <a14:hiddenLine xmlns:a14="http://schemas.microsoft.com/office/drawing/2010/main" w="9525">
+                <a:solidFill>
+                  <a:schemeClr val="tx1"/>
+                </a:solidFill>
+                <a:miter lim="800000"/>
+                <a:headEnd/>
+                <a:tailEnd/>
+              </a14:hiddenLine>
+            </a:ext>
+          </a:extLst>
+        </p:spPr>
+      </p:pic>
+      <p:sp>
+        <p:nvSpPr>
+          <p:cNvPr id="87" name="Rechteck 86"/>
+          <p:cNvSpPr/>
+          <p:nvPr/>
+        </p:nvSpPr>
+        <p:spPr>
+          <a:xfrm>
+            <a:off x="-12536" y="-442991"/>
+            <a:ext cx="9156536" cy="1927775"/>
+          </a:xfrm>
+          <a:prstGeom prst="rect">
+            <a:avLst/>
+          </a:prstGeom>
+          <a:solidFill>
+            <a:schemeClr val="bg1"/>
+          </a:solidFill>
+          <a:ln>
+            <a:noFill/>
+          </a:ln>
+        </p:spPr>
+        <p:style>
+          <a:lnRef idx="2">
+            <a:schemeClr val="accent1">
+              <a:shade val="50000"/>
+            </a:schemeClr>
+          </a:lnRef>
+          <a:fillRef idx="1">
+            <a:schemeClr val="accent1"/>
+          </a:fillRef>
+          <a:effectRef idx="0">
+            <a:schemeClr val="accent1"/>
+          </a:effectRef>
+          <a:fontRef idx="minor">
+            <a:schemeClr val="lt1"/>
+          </a:fontRef>
+        </p:style>
+        <p:txBody>
+          <a:bodyPr lIns="72000" rIns="72000" rtlCol="0" anchor="ctr"/>
+          <a:lstStyle/>
+          <a:p>
+            <a:pPr algn="ctr"/>
+            <a:endParaRPr lang="de-DE" sz="1600" dirty="0" smtClean="0">
+              <a:solidFill>
+                <a:schemeClr val="tx1"/>
+              </a:solidFill>
+            </a:endParaRPr>
+          </a:p>
+        </p:txBody>
+      </p:sp>
+      <p:sp>
+        <p:nvSpPr>
+          <p:cNvPr id="3" name="Titel 2"/>
+          <p:cNvSpPr>
+            <a:spLocks noGrp="1"/>
+          </p:cNvSpPr>
+          <p:nvPr>
+            <p:ph type="title"/>
+          </p:nvPr>
+        </p:nvSpPr>
+        <p:spPr/>
+        <p:txBody>
+          <a:bodyPr/>
+          <a:lstStyle/>
+          <a:p>
+            <a:r>
+              <a:rPr lang="de-DE" dirty="0" smtClean="0"/>
+              <a:t>Optimierung…</a:t>
+            </a:r>
+            <a:endParaRPr lang="de-DE" dirty="0"/>
+          </a:p>
+        </p:txBody>
+      </p:sp>
+      <p:sp>
+        <p:nvSpPr>
+          <p:cNvPr id="5" name="Textplatzhalter 4"/>
+          <p:cNvSpPr>
+            <a:spLocks noGrp="1"/>
+          </p:cNvSpPr>
+          <p:nvPr>
+            <p:ph type="body" sz="quarter" idx="13"/>
+          </p:nvPr>
+        </p:nvSpPr>
+        <p:spPr/>
+        <p:txBody>
+          <a:bodyPr/>
+          <a:lstStyle/>
+          <a:p>
+            <a:r>
+              <a:rPr lang="de-DE" dirty="0" smtClean="0"/>
+              <a:t>Indem </a:t>
+            </a:r>
+            <a:r>
+              <a:rPr lang="de-DE" dirty="0"/>
+              <a:t>man </a:t>
+            </a:r>
+            <a:r>
+              <a:rPr lang="de-DE" dirty="0" smtClean="0"/>
+              <a:t>Icon-Fonts einsetzt</a:t>
+            </a:r>
+            <a:endParaRPr lang="de-DE" dirty="0"/>
+          </a:p>
+        </p:txBody>
+      </p:sp>
+      <p:cxnSp>
+        <p:nvCxnSpPr>
+          <p:cNvPr id="170" name="Gerade Verbindung 169"/>
+          <p:cNvCxnSpPr>
+            <a:cxnSpLocks/>
+          </p:cNvCxnSpPr>
+          <p:nvPr/>
+        </p:nvCxnSpPr>
+        <p:spPr>
+          <a:xfrm>
+            <a:off x="249124" y="946045"/>
+            <a:ext cx="8640762" cy="0"/>
+          </a:xfrm>
+          <a:prstGeom prst="line">
+            <a:avLst/>
+          </a:prstGeom>
+          <a:ln w="12700">
+            <a:solidFill>
+              <a:schemeClr val="accent3"/>
+            </a:solidFill>
+            <a:tailEnd type="none" w="lg" len="lg"/>
+          </a:ln>
+        </p:spPr>
+        <p:style>
+          <a:lnRef idx="1">
+            <a:schemeClr val="accent1"/>
+          </a:lnRef>
+          <a:fillRef idx="0">
+            <a:schemeClr val="accent1"/>
+          </a:fillRef>
+          <a:effectRef idx="0">
+            <a:schemeClr val="accent1"/>
+          </a:effectRef>
+          <a:fontRef idx="minor">
+            <a:schemeClr val="tx1"/>
+          </a:fontRef>
+        </p:style>
+      </p:cxnSp>
+      <p:sp>
+        <p:nvSpPr>
+          <p:cNvPr id="2" name="Inhaltsplatzhalter 1"/>
+          <p:cNvSpPr>
+            <a:spLocks noGrp="1"/>
+          </p:cNvSpPr>
+          <p:nvPr>
+            <p:ph idx="1"/>
+          </p:nvPr>
+        </p:nvSpPr>
+        <p:spPr>
+          <a:xfrm>
+            <a:off x="249735" y="1196975"/>
+            <a:ext cx="8640762" cy="431825"/>
+          </a:xfrm>
+        </p:spPr>
+        <p:txBody>
+          <a:bodyPr/>
+          <a:lstStyle/>
+          <a:p>
+            <a:pPr marL="0" indent="0" algn="ctr">
+              <a:buNone/>
+            </a:pPr>
+            <a:r>
+              <a:rPr lang="de-DE" dirty="0"/>
+              <a:t>Grundidee: Einzelne Image-Icons werden gegen Icon-Fonts wie Font </a:t>
+            </a:r>
+            <a:r>
+              <a:rPr lang="de-DE" dirty="0" err="1"/>
+              <a:t>Awesome</a:t>
+            </a:r>
+            <a:r>
+              <a:rPr lang="de-DE" dirty="0"/>
+              <a:t> ersetzt</a:t>
+            </a:r>
+          </a:p>
+        </p:txBody>
+      </p:sp>
+      <p:pic>
+        <p:nvPicPr>
+          <p:cNvPr id="1043" name="Picture 19"/>
+          <p:cNvPicPr>
+            <a:picLocks noChangeAspect="1" noChangeArrowheads="1"/>
+          </p:cNvPicPr>
+          <p:nvPr/>
+        </p:nvPicPr>
+        <p:blipFill>
+          <a:blip r:embed="rId10" cstate="print">
+            <a:extLst>
+              <a:ext uri="{28A0092B-C50C-407E-A947-70E740481C1C}">
+                <a14:useLocalDpi xmlns:a14="http://schemas.microsoft.com/office/drawing/2010/main" val="0"/>
+              </a:ext>
+            </a:extLst>
+          </a:blip>
+          <a:srcRect/>
+          <a:stretch>
+            <a:fillRect/>
+          </a:stretch>
+        </p:blipFill>
+        <p:spPr bwMode="auto">
+          <a:xfrm>
+            <a:off x="15949264" y="5805264"/>
+            <a:ext cx="902759" cy="3762464"/>
+          </a:xfrm>
+          <a:prstGeom prst="rect">
+            <a:avLst/>
+          </a:prstGeom>
+          <a:noFill/>
+          <a:ln>
+            <a:noFill/>
+          </a:ln>
+          <a:effectLst/>
+          <a:extLst>
+            <a:ext uri="{909E8E84-426E-40DD-AFC4-6F175D3DCCD1}">
+              <a14:hiddenFill xmlns:a14="http://schemas.microsoft.com/office/drawing/2010/main">
+                <a:solidFill>
+                  <a:schemeClr val="accent1"/>
+                </a:solidFill>
+              </a14:hiddenFill>
+            </a:ext>
+            <a:ext uri="{91240B29-F687-4F45-9708-019B960494DF}">
+              <a14:hiddenLine xmlns:a14="http://schemas.microsoft.com/office/drawing/2010/main" w="9525">
+                <a:solidFill>
+                  <a:schemeClr val="tx1"/>
+                </a:solidFill>
+                <a:miter lim="800000"/>
+                <a:headEnd/>
+                <a:tailEnd/>
+              </a14:hiddenLine>
+            </a:ext>
+            <a:ext uri="{AF507438-7753-43E0-B8FC-AC1667EBCBE1}">
+              <a14:hiddenEffects xmlns:a14="http://schemas.microsoft.com/office/drawing/2010/main">
+                <a:effectLst>
+                  <a:outerShdw dist="35921" dir="2700000" algn="ctr" rotWithShape="0">
+                    <a:schemeClr val="bg2"/>
+                  </a:outerShdw>
+                </a:effectLst>
+              </a14:hiddenEffects>
+            </a:ext>
+          </a:extLst>
+        </p:spPr>
+      </p:pic>
+      <p:pic>
+        <p:nvPicPr>
+          <p:cNvPr id="1026" name="Picture 2"/>
+          <p:cNvPicPr>
+            <a:picLocks noChangeAspect="1" noChangeArrowheads="1"/>
+          </p:cNvPicPr>
+          <p:nvPr/>
+        </p:nvPicPr>
+        <p:blipFill>
+          <a:blip r:embed="rId11">
+            <a:extLst>
+              <a:ext uri="{28A0092B-C50C-407E-A947-70E740481C1C}">
+                <a14:useLocalDpi xmlns:a14="http://schemas.microsoft.com/office/drawing/2010/main" val="0"/>
+              </a:ext>
+            </a:extLst>
+          </a:blip>
+          <a:srcRect/>
+          <a:stretch>
+            <a:fillRect/>
+          </a:stretch>
+        </p:blipFill>
+        <p:spPr bwMode="auto">
+          <a:xfrm>
+            <a:off x="10692680" y="5450766"/>
+            <a:ext cx="902758" cy="4746986"/>
+          </a:xfrm>
+          <a:prstGeom prst="rect">
+            <a:avLst/>
+          </a:prstGeom>
+          <a:noFill/>
+          <a:ln>
+            <a:noFill/>
+          </a:ln>
+          <a:effectLst/>
+          <a:extLst>
+            <a:ext uri="{909E8E84-426E-40DD-AFC4-6F175D3DCCD1}">
+              <a14:hiddenFill xmlns:a14="http://schemas.microsoft.com/office/drawing/2010/main">
+                <a:solidFill>
+                  <a:schemeClr val="accent1"/>
+                </a:solidFill>
+              </a14:hiddenFill>
+            </a:ext>
+            <a:ext uri="{91240B29-F687-4F45-9708-019B960494DF}">
+              <a14:hiddenLine xmlns:a14="http://schemas.microsoft.com/office/drawing/2010/main" w="9525">
+                <a:solidFill>
+                  <a:schemeClr val="tx1"/>
+                </a:solidFill>
+                <a:miter lim="800000"/>
+                <a:headEnd/>
+                <a:tailEnd/>
+              </a14:hiddenLine>
+            </a:ext>
+            <a:ext uri="{AF507438-7753-43E0-B8FC-AC1667EBCBE1}">
+              <a14:hiddenEffects xmlns:a14="http://schemas.microsoft.com/office/drawing/2010/main">
+                <a:effectLst>
+                  <a:outerShdw dist="35921" dir="2700000" algn="ctr" rotWithShape="0">
+                    <a:schemeClr val="bg2"/>
+                  </a:outerShdw>
+                </a:effectLst>
+              </a14:hiddenEffects>
+            </a:ext>
+          </a:extLst>
+        </p:spPr>
+      </p:pic>
+    </p:spTree>
+    <p:extLst>
+      <p:ext uri="{BB962C8B-B14F-4D97-AF65-F5344CB8AC3E}">
+        <p14:creationId xmlns:p14="http://schemas.microsoft.com/office/powerpoint/2010/main" val="977598337"/>
+      </p:ext>
+    </p:extLst>
+  </p:cSld>
+  <p:clrMapOvr>
+    <a:masterClrMapping/>
+  </p:clrMapOvr>
+  <mc:AlternateContent xmlns:mc="http://schemas.openxmlformats.org/markup-compatibility/2006" xmlns:p14="http://schemas.microsoft.com/office/powerpoint/2010/main">
+    <mc:Choice Requires="p14">
+      <p:transition spd="med" p14:dur="700">
+        <p:fade/>
+      </p:transition>
+    </mc:Choice>
+    <mc:Fallback xmlns="">
+      <p:transition spd="med">
+        <p:fade/>
+      </p:transition>
+    </mc:Fallback>
+  </mc:AlternateContent>
+  <p:timing>
+    <p:tnLst>
+      <p:par>
+        <p:cTn id="1" dur="indefinite" restart="never" nodeType="tmRoot">
+          <p:childTnLst>
+            <p:seq concurrent="1" nextAc="seek">
+              <p:cTn id="2" dur="indefinite" nodeType="mainSeq">
+                <p:childTnLst>
+                  <p:par>
+                    <p:cTn id="3" fill="hold">
+                      <p:stCondLst>
+                        <p:cond delay="indefinite"/>
+                      </p:stCondLst>
+                      <p:childTnLst>
+                        <p:par>
+                          <p:cTn id="4" fill="hold">
+                            <p:stCondLst>
+                              <p:cond delay="0"/>
+                            </p:stCondLst>
+                            <p:childTnLst>
+                              <p:par>
+                                <p:cTn id="5" presetID="42" presetClass="path" presetSubtype="0" decel="100000" fill="hold" nodeType="clickEffect">
+                                  <p:stCondLst>
+                                    <p:cond delay="0"/>
+                                  </p:stCondLst>
+                                  <p:childTnLst>
+                                    <p:animMotion origin="layout" path="M 1.19011 -0.87454 L 1.18698 -0.10417 " pathEditMode="fixed" rAng="0" ptsTypes="AA">
+                                      <p:cBhvr>
+                                        <p:cTn id="6" dur="1500" spd="-100000" fill="hold"/>
+                                        <p:tgtEl>
+                                          <p:spTgt spid="172"/>
+                                        </p:tgtEl>
+                                        <p:attrNameLst>
+                                          <p:attrName>ppt_x</p:attrName>
+                                          <p:attrName>ppt_y</p:attrName>
+                                        </p:attrNameLst>
+                                      </p:cBhvr>
+                                      <p:rCtr x="-156" y="38519"/>
+                                    </p:animMotion>
+                                  </p:childTnLst>
+                                </p:cTn>
+                              </p:par>
+                            </p:childTnLst>
+                          </p:cTn>
+                        </p:par>
+                        <p:par>
+                          <p:cTn id="7" fill="hold">
+                            <p:stCondLst>
+                              <p:cond delay="1500"/>
+                            </p:stCondLst>
+                            <p:childTnLst>
+                              <p:par>
+                                <p:cTn id="8" presetID="1" presetClass="exit" presetSubtype="0" fill="hold" nodeType="afterEffect">
+                                  <p:stCondLst>
+                                    <p:cond delay="0"/>
+                                  </p:stCondLst>
+                                  <p:childTnLst>
+                                    <p:set>
+                                      <p:cBhvr>
+                                        <p:cTn id="9" dur="1" fill="hold">
+                                          <p:stCondLst>
+                                            <p:cond delay="0"/>
+                                          </p:stCondLst>
+                                        </p:cTn>
+                                        <p:tgtEl>
+                                          <p:spTgt spid="2050"/>
+                                        </p:tgtEl>
+                                        <p:attrNameLst>
+                                          <p:attrName>style.visibility</p:attrName>
+                                        </p:attrNameLst>
+                                      </p:cBhvr>
+                                      <p:to>
+                                        <p:strVal val="hidden"/>
+                                      </p:to>
+                                    </p:set>
+                                  </p:childTnLst>
+                                </p:cTn>
+                              </p:par>
+                              <p:par>
+                                <p:cTn id="10" presetID="1" presetClass="exit" presetSubtype="0" fill="hold" grpId="0" nodeType="withEffect">
+                                  <p:stCondLst>
+                                    <p:cond delay="0"/>
+                                  </p:stCondLst>
+                                  <p:childTnLst>
+                                    <p:set>
+                                      <p:cBhvr>
+                                        <p:cTn id="11" dur="1" fill="hold">
+                                          <p:stCondLst>
+                                            <p:cond delay="0"/>
+                                          </p:stCondLst>
+                                        </p:cTn>
+                                        <p:tgtEl>
+                                          <p:spTgt spid="2048"/>
+                                        </p:tgtEl>
+                                        <p:attrNameLst>
+                                          <p:attrName>style.visibility</p:attrName>
+                                        </p:attrNameLst>
+                                      </p:cBhvr>
+                                      <p:to>
+                                        <p:strVal val="hidden"/>
+                                      </p:to>
+                                    </p:set>
+                                  </p:childTnLst>
+                                </p:cTn>
+                              </p:par>
+                              <p:par>
+                                <p:cTn id="12" presetID="1" presetClass="exit" presetSubtype="0" fill="hold" nodeType="withEffect">
+                                  <p:stCondLst>
+                                    <p:cond delay="0"/>
+                                  </p:stCondLst>
+                                  <p:childTnLst>
+                                    <p:set>
+                                      <p:cBhvr>
+                                        <p:cTn id="13" dur="1" fill="hold">
+                                          <p:stCondLst>
+                                            <p:cond delay="0"/>
+                                          </p:stCondLst>
+                                        </p:cTn>
+                                        <p:tgtEl>
+                                          <p:spTgt spid="45"/>
+                                        </p:tgtEl>
+                                        <p:attrNameLst>
+                                          <p:attrName>style.visibility</p:attrName>
+                                        </p:attrNameLst>
+                                      </p:cBhvr>
+                                      <p:to>
+                                        <p:strVal val="hidden"/>
+                                      </p:to>
+                                    </p:set>
+                                  </p:childTnLst>
+                                </p:cTn>
+                              </p:par>
+                              <p:par>
+                                <p:cTn id="14" presetID="1" presetClass="exit" presetSubtype="0" fill="hold" nodeType="withEffect">
+                                  <p:stCondLst>
+                                    <p:cond delay="0"/>
+                                  </p:stCondLst>
+                                  <p:childTnLst>
+                                    <p:set>
+                                      <p:cBhvr>
+                                        <p:cTn id="15" dur="1" fill="hold">
+                                          <p:stCondLst>
+                                            <p:cond delay="0"/>
+                                          </p:stCondLst>
+                                        </p:cTn>
+                                        <p:tgtEl>
+                                          <p:spTgt spid="46"/>
+                                        </p:tgtEl>
+                                        <p:attrNameLst>
+                                          <p:attrName>style.visibility</p:attrName>
+                                        </p:attrNameLst>
+                                      </p:cBhvr>
+                                      <p:to>
+                                        <p:strVal val="hidden"/>
+                                      </p:to>
+                                    </p:set>
+                                  </p:childTnLst>
+                                </p:cTn>
+                              </p:par>
+                              <p:par>
+                                <p:cTn id="16" presetID="1" presetClass="exit" presetSubtype="0" fill="hold" nodeType="withEffect">
+                                  <p:stCondLst>
+                                    <p:cond delay="0"/>
+                                  </p:stCondLst>
+                                  <p:childTnLst>
+                                    <p:set>
+                                      <p:cBhvr>
+                                        <p:cTn id="17" dur="1" fill="hold">
+                                          <p:stCondLst>
+                                            <p:cond delay="0"/>
+                                          </p:stCondLst>
+                                        </p:cTn>
+                                        <p:tgtEl>
+                                          <p:spTgt spid="44"/>
+                                        </p:tgtEl>
+                                        <p:attrNameLst>
+                                          <p:attrName>style.visibility</p:attrName>
+                                        </p:attrNameLst>
+                                      </p:cBhvr>
+                                      <p:to>
+                                        <p:strVal val="hidden"/>
+                                      </p:to>
+                                    </p:set>
+                                  </p:childTnLst>
+                                </p:cTn>
+                              </p:par>
+                              <p:par>
+                                <p:cTn id="18" presetID="1" presetClass="exit" presetSubtype="0" fill="hold" nodeType="withEffect">
+                                  <p:stCondLst>
+                                    <p:cond delay="0"/>
+                                  </p:stCondLst>
+                                  <p:childTnLst>
+                                    <p:set>
+                                      <p:cBhvr>
+                                        <p:cTn id="19" dur="1" fill="hold">
+                                          <p:stCondLst>
+                                            <p:cond delay="0"/>
+                                          </p:stCondLst>
+                                        </p:cTn>
+                                        <p:tgtEl>
+                                          <p:spTgt spid="53"/>
+                                        </p:tgtEl>
+                                        <p:attrNameLst>
+                                          <p:attrName>style.visibility</p:attrName>
+                                        </p:attrNameLst>
+                                      </p:cBhvr>
+                                      <p:to>
+                                        <p:strVal val="hidden"/>
+                                      </p:to>
+                                    </p:set>
+                                  </p:childTnLst>
+                                </p:cTn>
+                              </p:par>
+                              <p:par>
+                                <p:cTn id="20" presetID="1" presetClass="exit" presetSubtype="0" fill="hold" nodeType="withEffect">
+                                  <p:stCondLst>
+                                    <p:cond delay="0"/>
+                                  </p:stCondLst>
+                                  <p:childTnLst>
+                                    <p:set>
+                                      <p:cBhvr>
+                                        <p:cTn id="21" dur="1" fill="hold">
+                                          <p:stCondLst>
+                                            <p:cond delay="0"/>
+                                          </p:stCondLst>
+                                        </p:cTn>
+                                        <p:tgtEl>
+                                          <p:spTgt spid="54"/>
+                                        </p:tgtEl>
+                                        <p:attrNameLst>
+                                          <p:attrName>style.visibility</p:attrName>
+                                        </p:attrNameLst>
+                                      </p:cBhvr>
+                                      <p:to>
+                                        <p:strVal val="hidden"/>
+                                      </p:to>
+                                    </p:set>
+                                  </p:childTnLst>
+                                </p:cTn>
+                              </p:par>
+                              <p:par>
+                                <p:cTn id="22" presetID="1" presetClass="exit" presetSubtype="0" fill="hold" nodeType="withEffect">
+                                  <p:stCondLst>
+                                    <p:cond delay="0"/>
+                                  </p:stCondLst>
+                                  <p:childTnLst>
+                                    <p:set>
+                                      <p:cBhvr>
+                                        <p:cTn id="23" dur="1" fill="hold">
+                                          <p:stCondLst>
+                                            <p:cond delay="0"/>
+                                          </p:stCondLst>
+                                        </p:cTn>
+                                        <p:tgtEl>
+                                          <p:spTgt spid="55"/>
+                                        </p:tgtEl>
+                                        <p:attrNameLst>
+                                          <p:attrName>style.visibility</p:attrName>
+                                        </p:attrNameLst>
+                                      </p:cBhvr>
+                                      <p:to>
+                                        <p:strVal val="hidden"/>
+                                      </p:to>
+                                    </p:set>
+                                  </p:childTnLst>
+                                </p:cTn>
+                              </p:par>
+                              <p:par>
+                                <p:cTn id="24" presetID="1" presetClass="exit" presetSubtype="0" fill="hold" grpId="0" nodeType="withEffect" nodePh="1">
+                                  <p:stCondLst>
+                                    <p:cond delay="0"/>
+                                  </p:stCondLst>
+                                  <p:endCondLst>
+                                    <p:cond evt="begin" delay="0">
+                                      <p:tn val="24"/>
+                                    </p:cond>
+                                  </p:endCondLst>
+                                  <p:childTnLst>
+                                    <p:set>
+                                      <p:cBhvr>
+                                        <p:cTn id="25" dur="1" fill="hold">
+                                          <p:stCondLst>
+                                            <p:cond delay="0"/>
+                                          </p:stCondLst>
+                                        </p:cTn>
+                                        <p:tgtEl>
+                                          <p:spTgt spid="47"/>
+                                        </p:tgtEl>
+                                        <p:attrNameLst>
+                                          <p:attrName>style.visibility</p:attrName>
+                                        </p:attrNameLst>
+                                      </p:cBhvr>
+                                      <p:to>
+                                        <p:strVal val="hidden"/>
+                                      </p:to>
+                                    </p:set>
+                                  </p:childTnLst>
+                                </p:cTn>
+                              </p:par>
+                              <p:par>
+                                <p:cTn id="26" presetID="1" presetClass="exit" presetSubtype="0" fill="hold" grpId="0" nodeType="withEffect" nodePh="1">
+                                  <p:stCondLst>
+                                    <p:cond delay="0"/>
+                                  </p:stCondLst>
+                                  <p:endCondLst>
+                                    <p:cond evt="begin" delay="0">
+                                      <p:tn val="26"/>
+                                    </p:cond>
+                                  </p:endCondLst>
+                                  <p:childTnLst>
+                                    <p:set>
+                                      <p:cBhvr>
+                                        <p:cTn id="27" dur="1" fill="hold">
+                                          <p:stCondLst>
+                                            <p:cond delay="0"/>
+                                          </p:stCondLst>
+                                        </p:cTn>
+                                        <p:tgtEl>
+                                          <p:spTgt spid="48"/>
+                                        </p:tgtEl>
+                                        <p:attrNameLst>
+                                          <p:attrName>style.visibility</p:attrName>
+                                        </p:attrNameLst>
+                                      </p:cBhvr>
+                                      <p:to>
+                                        <p:strVal val="hidden"/>
+                                      </p:to>
+                                    </p:set>
+                                  </p:childTnLst>
+                                </p:cTn>
+                              </p:par>
+                              <p:par>
+                                <p:cTn id="28" presetID="1" presetClass="exit" presetSubtype="0" fill="hold" grpId="0" nodeType="withEffect" nodePh="1">
+                                  <p:stCondLst>
+                                    <p:cond delay="0"/>
+                                  </p:stCondLst>
+                                  <p:endCondLst>
+                                    <p:cond evt="begin" delay="0">
+                                      <p:tn val="28"/>
+                                    </p:cond>
+                                  </p:endCondLst>
+                                  <p:childTnLst>
+                                    <p:set>
+                                      <p:cBhvr>
+                                        <p:cTn id="29" dur="1" fill="hold">
+                                          <p:stCondLst>
+                                            <p:cond delay="0"/>
+                                          </p:stCondLst>
+                                        </p:cTn>
+                                        <p:tgtEl>
+                                          <p:spTgt spid="49"/>
+                                        </p:tgtEl>
+                                        <p:attrNameLst>
+                                          <p:attrName>style.visibility</p:attrName>
+                                        </p:attrNameLst>
+                                      </p:cBhvr>
+                                      <p:to>
+                                        <p:strVal val="hidden"/>
+                                      </p:to>
+                                    </p:set>
+                                  </p:childTnLst>
+                                </p:cTn>
+                              </p:par>
+                              <p:par>
+                                <p:cTn id="30" presetID="1" presetClass="exit" presetSubtype="0" fill="hold" grpId="0" nodeType="withEffect" nodePh="1">
+                                  <p:stCondLst>
+                                    <p:cond delay="0"/>
+                                  </p:stCondLst>
+                                  <p:endCondLst>
+                                    <p:cond evt="begin" delay="0">
+                                      <p:tn val="30"/>
+                                    </p:cond>
+                                  </p:endCondLst>
+                                  <p:childTnLst>
+                                    <p:set>
+                                      <p:cBhvr>
+                                        <p:cTn id="31" dur="1" fill="hold">
+                                          <p:stCondLst>
+                                            <p:cond delay="0"/>
+                                          </p:stCondLst>
+                                        </p:cTn>
+                                        <p:tgtEl>
+                                          <p:spTgt spid="50"/>
+                                        </p:tgtEl>
+                                        <p:attrNameLst>
+                                          <p:attrName>style.visibility</p:attrName>
+                                        </p:attrNameLst>
+                                      </p:cBhvr>
+                                      <p:to>
+                                        <p:strVal val="hidden"/>
+                                      </p:to>
+                                    </p:set>
+                                  </p:childTnLst>
+                                </p:cTn>
+                              </p:par>
+                              <p:par>
+                                <p:cTn id="32" presetID="1" presetClass="exit" presetSubtype="0" fill="hold" grpId="0" nodeType="withEffect" nodePh="1">
+                                  <p:stCondLst>
+                                    <p:cond delay="0"/>
+                                  </p:stCondLst>
+                                  <p:endCondLst>
+                                    <p:cond evt="begin" delay="0">
+                                      <p:tn val="32"/>
+                                    </p:cond>
+                                  </p:endCondLst>
+                                  <p:childTnLst>
+                                    <p:set>
+                                      <p:cBhvr>
+                                        <p:cTn id="33" dur="1" fill="hold">
+                                          <p:stCondLst>
+                                            <p:cond delay="0"/>
+                                          </p:stCondLst>
+                                        </p:cTn>
+                                        <p:tgtEl>
+                                          <p:spTgt spid="51"/>
+                                        </p:tgtEl>
+                                        <p:attrNameLst>
+                                          <p:attrName>style.visibility</p:attrName>
+                                        </p:attrNameLst>
+                                      </p:cBhvr>
+                                      <p:to>
+                                        <p:strVal val="hidden"/>
+                                      </p:to>
+                                    </p:set>
+                                  </p:childTnLst>
+                                </p:cTn>
+                              </p:par>
+                              <p:par>
+                                <p:cTn id="34" presetID="1" presetClass="exit" presetSubtype="0" fill="hold" grpId="0" nodeType="withEffect">
+                                  <p:stCondLst>
+                                    <p:cond delay="0"/>
+                                  </p:stCondLst>
+                                  <p:childTnLst>
+                                    <p:set>
+                                      <p:cBhvr>
+                                        <p:cTn id="35" dur="1" fill="hold">
+                                          <p:stCondLst>
+                                            <p:cond delay="0"/>
+                                          </p:stCondLst>
+                                        </p:cTn>
+                                        <p:tgtEl>
+                                          <p:spTgt spid="64"/>
+                                        </p:tgtEl>
+                                        <p:attrNameLst>
+                                          <p:attrName>style.visibility</p:attrName>
+                                        </p:attrNameLst>
+                                      </p:cBhvr>
+                                      <p:to>
+                                        <p:strVal val="hidden"/>
+                                      </p:to>
+                                    </p:set>
+                                  </p:childTnLst>
+                                </p:cTn>
+                              </p:par>
+                              <p:par>
+                                <p:cTn id="36" presetID="1" presetClass="exit" presetSubtype="0" fill="hold" nodeType="withEffect">
+                                  <p:stCondLst>
+                                    <p:cond delay="0"/>
+                                  </p:stCondLst>
+                                  <p:childTnLst>
+                                    <p:set>
+                                      <p:cBhvr>
+                                        <p:cTn id="37" dur="1" fill="hold">
+                                          <p:stCondLst>
+                                            <p:cond delay="0"/>
+                                          </p:stCondLst>
+                                        </p:cTn>
+                                        <p:tgtEl>
+                                          <p:spTgt spid="1032"/>
+                                        </p:tgtEl>
+                                        <p:attrNameLst>
+                                          <p:attrName>style.visibility</p:attrName>
+                                        </p:attrNameLst>
+                                      </p:cBhvr>
+                                      <p:to>
+                                        <p:strVal val="hidden"/>
+                                      </p:to>
+                                    </p:set>
+                                  </p:childTnLst>
+                                </p:cTn>
+                              </p:par>
+                            </p:childTnLst>
+                          </p:cTn>
+                        </p:par>
+                        <p:par>
+                          <p:cTn id="38" fill="hold">
+                            <p:stCondLst>
+                              <p:cond delay="1500"/>
+                            </p:stCondLst>
+                            <p:childTnLst>
+                              <p:par>
+                                <p:cTn id="39" presetID="42" presetClass="path" presetSubtype="0" decel="50000" fill="hold" nodeType="afterEffect">
+                                  <p:stCondLst>
+                                    <p:cond delay="0"/>
+                                  </p:stCondLst>
+                                  <p:childTnLst>
+                                    <p:animMotion origin="layout" path="M 1.19011 -0.87454 L 1.18698 -2.67662 " pathEditMode="fixed" rAng="0" ptsTypes="AA">
+                                      <p:cBhvr>
+                                        <p:cTn id="40" dur="2000" fill="hold"/>
+                                        <p:tgtEl>
+                                          <p:spTgt spid="172"/>
+                                        </p:tgtEl>
+                                        <p:attrNameLst>
+                                          <p:attrName>ppt_x</p:attrName>
+                                          <p:attrName>ppt_y</p:attrName>
+                                        </p:attrNameLst>
+                                      </p:cBhvr>
+                                      <p:rCtr x="-156" y="-90116"/>
+                                    </p:animMotion>
+                                  </p:childTnLst>
+                                </p:cTn>
+                              </p:par>
+                              <p:par>
+                                <p:cTn id="41" presetID="42" presetClass="path" presetSubtype="0" decel="100000" fill="hold" grpId="0" nodeType="withEffect">
+                                  <p:stCondLst>
+                                    <p:cond delay="0"/>
+                                  </p:stCondLst>
+                                  <p:childTnLst>
+                                    <p:animMotion origin="layout" path="M 0.36371 -0.17569 L 0.36371 -0.57477 " pathEditMode="fixed" rAng="0" ptsTypes="AA">
+                                      <p:cBhvr>
+                                        <p:cTn id="42" dur="300" fill="hold"/>
+                                        <p:tgtEl>
+                                          <p:spTgt spid="88"/>
+                                        </p:tgtEl>
+                                        <p:attrNameLst>
+                                          <p:attrName>ppt_x</p:attrName>
+                                          <p:attrName>ppt_y</p:attrName>
+                                        </p:attrNameLst>
+                                      </p:cBhvr>
+                                      <p:rCtr x="0" y="-19954"/>
+                                    </p:animMotion>
+                                  </p:childTnLst>
+                                </p:cTn>
+                              </p:par>
+                            </p:childTnLst>
+                          </p:cTn>
+                        </p:par>
+                      </p:childTnLst>
+                    </p:cTn>
+                  </p:par>
+                  <p:par>
+                    <p:cTn id="43" fill="hold">
+                      <p:stCondLst>
+                        <p:cond delay="indefinite"/>
+                      </p:stCondLst>
+                      <p:childTnLst>
+                        <p:par>
+                          <p:cTn id="44" fill="hold">
+                            <p:stCondLst>
+                              <p:cond delay="0"/>
+                            </p:stCondLst>
+                            <p:childTnLst>
+                              <p:par>
+                                <p:cTn id="45" presetID="42" presetClass="path" presetSubtype="0" decel="100000" fill="hold" grpId="0" nodeType="clickEffect">
+                                  <p:stCondLst>
+                                    <p:cond delay="0"/>
+                                  </p:stCondLst>
+                                  <p:childTnLst>
+                                    <p:animMotion origin="layout" path="M 0.44496 -0.0007 L 0.07395 0.00646 " pathEditMode="fixed" rAng="0" ptsTypes="AA">
+                                      <p:cBhvr>
+                                        <p:cTn id="46" dur="300" spd="-100000" fill="hold"/>
+                                        <p:tgtEl>
+                                          <p:spTgt spid="175"/>
+                                        </p:tgtEl>
+                                        <p:attrNameLst>
+                                          <p:attrName>ppt_x</p:attrName>
+                                          <p:attrName>ppt_y</p:attrName>
+                                        </p:attrNameLst>
+                                      </p:cBhvr>
+                                      <p:rCtr x="-18542" y="347"/>
+                                    </p:animMotion>
+                                  </p:childTnLst>
+                                </p:cTn>
+                              </p:par>
+                            </p:childTnLst>
+                          </p:cTn>
+                        </p:par>
+                        <p:par>
+                          <p:cTn id="47" fill="hold">
+                            <p:stCondLst>
+                              <p:cond delay="300"/>
+                            </p:stCondLst>
+                            <p:childTnLst>
+                              <p:par>
+                                <p:cTn id="48" presetID="42" presetClass="path" presetSubtype="0" decel="100000" fill="hold" nodeType="afterEffect">
+                                  <p:stCondLst>
+                                    <p:cond delay="0"/>
+                                  </p:stCondLst>
+                                  <p:childTnLst>
+                                    <p:animMotion origin="layout" path="M 0.44427 -0.00833 L 0.44479 0.09097 " pathEditMode="fixed" rAng="0" ptsTypes="AA">
+                                      <p:cBhvr>
+                                        <p:cTn id="49" dur="300" spd="-100000" fill="hold"/>
+                                        <p:tgtEl>
+                                          <p:spTgt spid="1035"/>
+                                        </p:tgtEl>
+                                        <p:attrNameLst>
+                                          <p:attrName>ppt_x</p:attrName>
+                                          <p:attrName>ppt_y</p:attrName>
+                                        </p:attrNameLst>
+                                      </p:cBhvr>
+                                      <p:rCtr x="17" y="4954"/>
+                                    </p:animMotion>
+                                  </p:childTnLst>
+                                </p:cTn>
+                              </p:par>
+                              <p:par>
+                                <p:cTn id="50" presetID="53" presetClass="entr" presetSubtype="16" fill="hold" nodeType="withEffect">
+                                  <p:stCondLst>
+                                    <p:cond delay="0"/>
+                                  </p:stCondLst>
+                                  <p:childTnLst>
+                                    <p:set>
+                                      <p:cBhvr>
+                                        <p:cTn id="51" dur="1" fill="hold">
+                                          <p:stCondLst>
+                                            <p:cond delay="0"/>
+                                          </p:stCondLst>
+                                        </p:cTn>
+                                        <p:tgtEl>
+                                          <p:spTgt spid="1035"/>
+                                        </p:tgtEl>
+                                        <p:attrNameLst>
+                                          <p:attrName>style.visibility</p:attrName>
+                                        </p:attrNameLst>
+                                      </p:cBhvr>
+                                      <p:to>
+                                        <p:strVal val="visible"/>
+                                      </p:to>
+                                    </p:set>
+                                    <p:anim calcmode="lin" valueType="num">
+                                      <p:cBhvr>
+                                        <p:cTn id="52" dur="300" fill="hold"/>
+                                        <p:tgtEl>
+                                          <p:spTgt spid="1035"/>
+                                        </p:tgtEl>
+                                        <p:attrNameLst>
+                                          <p:attrName>ppt_w</p:attrName>
+                                        </p:attrNameLst>
+                                      </p:cBhvr>
+                                      <p:tavLst>
+                                        <p:tav tm="0">
+                                          <p:val>
+                                            <p:fltVal val="0"/>
+                                          </p:val>
+                                        </p:tav>
+                                        <p:tav tm="100000">
+                                          <p:val>
+                                            <p:strVal val="#ppt_w"/>
+                                          </p:val>
+                                        </p:tav>
+                                      </p:tavLst>
+                                    </p:anim>
+                                    <p:anim calcmode="lin" valueType="num">
+                                      <p:cBhvr>
+                                        <p:cTn id="53" dur="300" fill="hold"/>
+                                        <p:tgtEl>
+                                          <p:spTgt spid="1035"/>
+                                        </p:tgtEl>
+                                        <p:attrNameLst>
+                                          <p:attrName>ppt_h</p:attrName>
+                                        </p:attrNameLst>
+                                      </p:cBhvr>
+                                      <p:tavLst>
+                                        <p:tav tm="0">
+                                          <p:val>
+                                            <p:fltVal val="0"/>
+                                          </p:val>
+                                        </p:tav>
+                                        <p:tav tm="100000">
+                                          <p:val>
+                                            <p:strVal val="#ppt_h"/>
+                                          </p:val>
+                                        </p:tav>
+                                      </p:tavLst>
+                                    </p:anim>
+                                    <p:animEffect transition="in" filter="fade">
+                                      <p:cBhvr>
+                                        <p:cTn id="54" dur="300"/>
+                                        <p:tgtEl>
+                                          <p:spTgt spid="1035"/>
+                                        </p:tgtEl>
+                                      </p:cBhvr>
+                                    </p:animEffect>
+                                  </p:childTnLst>
+                                </p:cTn>
+                              </p:par>
+                            </p:childTnLst>
+                          </p:cTn>
+                        </p:par>
+                        <p:par>
+                          <p:cTn id="55" fill="hold">
+                            <p:stCondLst>
+                              <p:cond delay="600"/>
+                            </p:stCondLst>
+                            <p:childTnLst>
+                              <p:par>
+                                <p:cTn id="56" presetID="42" presetClass="path" presetSubtype="0" decel="100000" fill="hold" nodeType="afterEffect">
+                                  <p:stCondLst>
+                                    <p:cond delay="0"/>
+                                  </p:stCondLst>
+                                  <p:childTnLst>
+                                    <p:animMotion origin="layout" path="M 0.44357 -0.00115 L 0.4441 -0.10718 " pathEditMode="fixed" rAng="0" ptsTypes="AA">
+                                      <p:cBhvr>
+                                        <p:cTn id="57" dur="300" spd="-100000" fill="hold"/>
+                                        <p:tgtEl>
+                                          <p:spTgt spid="1038"/>
+                                        </p:tgtEl>
+                                        <p:attrNameLst>
+                                          <p:attrName>ppt_x</p:attrName>
+                                          <p:attrName>ppt_y</p:attrName>
+                                        </p:attrNameLst>
+                                      </p:cBhvr>
+                                      <p:rCtr x="17" y="-5301"/>
+                                    </p:animMotion>
+                                  </p:childTnLst>
+                                </p:cTn>
+                              </p:par>
+                              <p:par>
+                                <p:cTn id="58" presetID="53" presetClass="entr" presetSubtype="16" fill="hold" nodeType="withEffect">
+                                  <p:stCondLst>
+                                    <p:cond delay="0"/>
+                                  </p:stCondLst>
+                                  <p:childTnLst>
+                                    <p:set>
+                                      <p:cBhvr>
+                                        <p:cTn id="59" dur="1" fill="hold">
+                                          <p:stCondLst>
+                                            <p:cond delay="0"/>
+                                          </p:stCondLst>
+                                        </p:cTn>
+                                        <p:tgtEl>
+                                          <p:spTgt spid="1038"/>
+                                        </p:tgtEl>
+                                        <p:attrNameLst>
+                                          <p:attrName>style.visibility</p:attrName>
+                                        </p:attrNameLst>
+                                      </p:cBhvr>
+                                      <p:to>
+                                        <p:strVal val="visible"/>
+                                      </p:to>
+                                    </p:set>
+                                    <p:anim calcmode="lin" valueType="num">
+                                      <p:cBhvr>
+                                        <p:cTn id="60" dur="300" fill="hold"/>
+                                        <p:tgtEl>
+                                          <p:spTgt spid="1038"/>
+                                        </p:tgtEl>
+                                        <p:attrNameLst>
+                                          <p:attrName>ppt_w</p:attrName>
+                                        </p:attrNameLst>
+                                      </p:cBhvr>
+                                      <p:tavLst>
+                                        <p:tav tm="0">
+                                          <p:val>
+                                            <p:fltVal val="0"/>
+                                          </p:val>
+                                        </p:tav>
+                                        <p:tav tm="100000">
+                                          <p:val>
+                                            <p:strVal val="#ppt_w"/>
+                                          </p:val>
+                                        </p:tav>
+                                      </p:tavLst>
+                                    </p:anim>
+                                    <p:anim calcmode="lin" valueType="num">
+                                      <p:cBhvr>
+                                        <p:cTn id="61" dur="300" fill="hold"/>
+                                        <p:tgtEl>
+                                          <p:spTgt spid="1038"/>
+                                        </p:tgtEl>
+                                        <p:attrNameLst>
+                                          <p:attrName>ppt_h</p:attrName>
+                                        </p:attrNameLst>
+                                      </p:cBhvr>
+                                      <p:tavLst>
+                                        <p:tav tm="0">
+                                          <p:val>
+                                            <p:fltVal val="0"/>
+                                          </p:val>
+                                        </p:tav>
+                                        <p:tav tm="100000">
+                                          <p:val>
+                                            <p:strVal val="#ppt_h"/>
+                                          </p:val>
+                                        </p:tav>
+                                      </p:tavLst>
+                                    </p:anim>
+                                    <p:animEffect transition="in" filter="fade">
+                                      <p:cBhvr>
+                                        <p:cTn id="62" dur="300"/>
+                                        <p:tgtEl>
+                                          <p:spTgt spid="1038"/>
+                                        </p:tgtEl>
+                                      </p:cBhvr>
+                                    </p:animEffect>
+                                  </p:childTnLst>
+                                </p:cTn>
+                              </p:par>
+                            </p:childTnLst>
+                          </p:cTn>
+                        </p:par>
+                        <p:par>
+                          <p:cTn id="63" fill="hold">
+                            <p:stCondLst>
+                              <p:cond delay="900"/>
+                            </p:stCondLst>
+                            <p:childTnLst>
+                              <p:par>
+                                <p:cTn id="64" presetID="42" presetClass="path" presetSubtype="0" decel="100000" fill="hold" nodeType="afterEffect">
+                                  <p:stCondLst>
+                                    <p:cond delay="0"/>
+                                  </p:stCondLst>
+                                  <p:childTnLst>
+                                    <p:animMotion origin="layout" path="M 0.44445 -0.00324 L 0.44497 0.19653 " pathEditMode="fixed" rAng="0" ptsTypes="AA">
+                                      <p:cBhvr>
+                                        <p:cTn id="65" dur="300" spd="-100000" fill="hold"/>
+                                        <p:tgtEl>
+                                          <p:spTgt spid="1040"/>
+                                        </p:tgtEl>
+                                        <p:attrNameLst>
+                                          <p:attrName>ppt_x</p:attrName>
+                                          <p:attrName>ppt_y</p:attrName>
+                                        </p:attrNameLst>
+                                      </p:cBhvr>
+                                      <p:rCtr x="17" y="9977"/>
+                                    </p:animMotion>
+                                  </p:childTnLst>
+                                </p:cTn>
+                              </p:par>
+                              <p:par>
+                                <p:cTn id="66" presetID="53" presetClass="entr" presetSubtype="16" fill="hold" nodeType="withEffect">
+                                  <p:stCondLst>
+                                    <p:cond delay="0"/>
+                                  </p:stCondLst>
+                                  <p:childTnLst>
+                                    <p:set>
+                                      <p:cBhvr>
+                                        <p:cTn id="67" dur="1" fill="hold">
+                                          <p:stCondLst>
+                                            <p:cond delay="0"/>
+                                          </p:stCondLst>
+                                        </p:cTn>
+                                        <p:tgtEl>
+                                          <p:spTgt spid="1040"/>
+                                        </p:tgtEl>
+                                        <p:attrNameLst>
+                                          <p:attrName>style.visibility</p:attrName>
+                                        </p:attrNameLst>
+                                      </p:cBhvr>
+                                      <p:to>
+                                        <p:strVal val="visible"/>
+                                      </p:to>
+                                    </p:set>
+                                    <p:anim calcmode="lin" valueType="num">
+                                      <p:cBhvr>
+                                        <p:cTn id="68" dur="300" fill="hold"/>
+                                        <p:tgtEl>
+                                          <p:spTgt spid="1040"/>
+                                        </p:tgtEl>
+                                        <p:attrNameLst>
+                                          <p:attrName>ppt_w</p:attrName>
+                                        </p:attrNameLst>
+                                      </p:cBhvr>
+                                      <p:tavLst>
+                                        <p:tav tm="0">
+                                          <p:val>
+                                            <p:fltVal val="0"/>
+                                          </p:val>
+                                        </p:tav>
+                                        <p:tav tm="100000">
+                                          <p:val>
+                                            <p:strVal val="#ppt_w"/>
+                                          </p:val>
+                                        </p:tav>
+                                      </p:tavLst>
+                                    </p:anim>
+                                    <p:anim calcmode="lin" valueType="num">
+                                      <p:cBhvr>
+                                        <p:cTn id="69" dur="300" fill="hold"/>
+                                        <p:tgtEl>
+                                          <p:spTgt spid="1040"/>
+                                        </p:tgtEl>
+                                        <p:attrNameLst>
+                                          <p:attrName>ppt_h</p:attrName>
+                                        </p:attrNameLst>
+                                      </p:cBhvr>
+                                      <p:tavLst>
+                                        <p:tav tm="0">
+                                          <p:val>
+                                            <p:fltVal val="0"/>
+                                          </p:val>
+                                        </p:tav>
+                                        <p:tav tm="100000">
+                                          <p:val>
+                                            <p:strVal val="#ppt_h"/>
+                                          </p:val>
+                                        </p:tav>
+                                      </p:tavLst>
+                                    </p:anim>
+                                    <p:animEffect transition="in" filter="fade">
+                                      <p:cBhvr>
+                                        <p:cTn id="70" dur="300"/>
+                                        <p:tgtEl>
+                                          <p:spTgt spid="1040"/>
+                                        </p:tgtEl>
+                                      </p:cBhvr>
+                                    </p:animEffect>
+                                  </p:childTnLst>
+                                </p:cTn>
+                              </p:par>
+                            </p:childTnLst>
+                          </p:cTn>
+                        </p:par>
+                        <p:par>
+                          <p:cTn id="71" fill="hold">
+                            <p:stCondLst>
+                              <p:cond delay="1200"/>
+                            </p:stCondLst>
+                            <p:childTnLst>
+                              <p:par>
+                                <p:cTn id="72" presetID="42" presetClass="path" presetSubtype="0" decel="100000" fill="hold" nodeType="afterEffect">
+                                  <p:stCondLst>
+                                    <p:cond delay="0"/>
+                                  </p:stCondLst>
+                                  <p:childTnLst>
+                                    <p:animMotion origin="layout" path="M 0.44357 -0.00116 L 0.44445 -0.22362 " pathEditMode="fixed" rAng="0" ptsTypes="AA">
+                                      <p:cBhvr>
+                                        <p:cTn id="73" dur="300" spd="-100000" fill="hold"/>
+                                        <p:tgtEl>
+                                          <p:spTgt spid="1041"/>
+                                        </p:tgtEl>
+                                        <p:attrNameLst>
+                                          <p:attrName>ppt_x</p:attrName>
+                                          <p:attrName>ppt_y</p:attrName>
+                                        </p:attrNameLst>
+                                      </p:cBhvr>
+                                      <p:rCtr x="35" y="-11134"/>
+                                    </p:animMotion>
+                                  </p:childTnLst>
+                                </p:cTn>
+                              </p:par>
+                              <p:par>
+                                <p:cTn id="74" presetID="53" presetClass="entr" presetSubtype="16" fill="hold" nodeType="withEffect">
+                                  <p:stCondLst>
+                                    <p:cond delay="0"/>
+                                  </p:stCondLst>
+                                  <p:childTnLst>
+                                    <p:set>
+                                      <p:cBhvr>
+                                        <p:cTn id="75" dur="1" fill="hold">
+                                          <p:stCondLst>
+                                            <p:cond delay="0"/>
+                                          </p:stCondLst>
+                                        </p:cTn>
+                                        <p:tgtEl>
+                                          <p:spTgt spid="1041"/>
+                                        </p:tgtEl>
+                                        <p:attrNameLst>
+                                          <p:attrName>style.visibility</p:attrName>
+                                        </p:attrNameLst>
+                                      </p:cBhvr>
+                                      <p:to>
+                                        <p:strVal val="visible"/>
+                                      </p:to>
+                                    </p:set>
+                                    <p:anim calcmode="lin" valueType="num">
+                                      <p:cBhvr>
+                                        <p:cTn id="76" dur="300" fill="hold"/>
+                                        <p:tgtEl>
+                                          <p:spTgt spid="1041"/>
+                                        </p:tgtEl>
+                                        <p:attrNameLst>
+                                          <p:attrName>ppt_w</p:attrName>
+                                        </p:attrNameLst>
+                                      </p:cBhvr>
+                                      <p:tavLst>
+                                        <p:tav tm="0">
+                                          <p:val>
+                                            <p:fltVal val="0"/>
+                                          </p:val>
+                                        </p:tav>
+                                        <p:tav tm="100000">
+                                          <p:val>
+                                            <p:strVal val="#ppt_w"/>
+                                          </p:val>
+                                        </p:tav>
+                                      </p:tavLst>
+                                    </p:anim>
+                                    <p:anim calcmode="lin" valueType="num">
+                                      <p:cBhvr>
+                                        <p:cTn id="77" dur="300" fill="hold"/>
+                                        <p:tgtEl>
+                                          <p:spTgt spid="1041"/>
+                                        </p:tgtEl>
+                                        <p:attrNameLst>
+                                          <p:attrName>ppt_h</p:attrName>
+                                        </p:attrNameLst>
+                                      </p:cBhvr>
+                                      <p:tavLst>
+                                        <p:tav tm="0">
+                                          <p:val>
+                                            <p:fltVal val="0"/>
+                                          </p:val>
+                                        </p:tav>
+                                        <p:tav tm="100000">
+                                          <p:val>
+                                            <p:strVal val="#ppt_h"/>
+                                          </p:val>
+                                        </p:tav>
+                                      </p:tavLst>
+                                    </p:anim>
+                                    <p:animEffect transition="in" filter="fade">
+                                      <p:cBhvr>
+                                        <p:cTn id="78" dur="300"/>
+                                        <p:tgtEl>
+                                          <p:spTgt spid="1041"/>
+                                        </p:tgtEl>
+                                      </p:cBhvr>
+                                    </p:animEffect>
+                                  </p:childTnLst>
+                                </p:cTn>
+                              </p:par>
+                            </p:childTnLst>
+                          </p:cTn>
+                        </p:par>
+                      </p:childTnLst>
+                    </p:cTn>
+                  </p:par>
+                  <p:par>
+                    <p:cTn id="79" fill="hold">
+                      <p:stCondLst>
+                        <p:cond delay="indefinite"/>
+                      </p:stCondLst>
+                      <p:childTnLst>
+                        <p:par>
+                          <p:cTn id="80" fill="hold">
+                            <p:stCondLst>
+                              <p:cond delay="0"/>
+                            </p:stCondLst>
+                            <p:childTnLst>
+                              <p:par>
+                                <p:cTn id="81" presetID="2" presetClass="exit" presetSubtype="1" decel="100000" fill="hold" nodeType="clickEffect">
+                                  <p:stCondLst>
+                                    <p:cond delay="0"/>
+                                  </p:stCondLst>
+                                  <p:childTnLst>
+                                    <p:anim calcmode="lin" valueType="num">
+                                      <p:cBhvr additive="base">
+                                        <p:cTn id="82" dur="300"/>
+                                        <p:tgtEl>
+                                          <p:spTgt spid="172"/>
+                                        </p:tgtEl>
+                                        <p:attrNameLst>
+                                          <p:attrName>ppt_x</p:attrName>
+                                        </p:attrNameLst>
+                                      </p:cBhvr>
+                                      <p:tavLst>
+                                        <p:tav tm="0">
+                                          <p:val>
+                                            <p:strVal val="ppt_x"/>
+                                          </p:val>
+                                        </p:tav>
+                                        <p:tav tm="100000">
+                                          <p:val>
+                                            <p:strVal val="ppt_x"/>
+                                          </p:val>
+                                        </p:tav>
+                                      </p:tavLst>
+                                    </p:anim>
+                                    <p:anim calcmode="lin" valueType="num">
+                                      <p:cBhvr additive="base">
+                                        <p:cTn id="83" dur="300"/>
+                                        <p:tgtEl>
+                                          <p:spTgt spid="172"/>
+                                        </p:tgtEl>
+                                        <p:attrNameLst>
+                                          <p:attrName>ppt_y</p:attrName>
+                                        </p:attrNameLst>
+                                      </p:cBhvr>
+                                      <p:tavLst>
+                                        <p:tav tm="0">
+                                          <p:val>
+                                            <p:strVal val="ppt_y"/>
+                                          </p:val>
+                                        </p:tav>
+                                        <p:tav tm="100000">
+                                          <p:val>
+                                            <p:strVal val="0-ppt_h/2"/>
+                                          </p:val>
+                                        </p:tav>
+                                      </p:tavLst>
+                                    </p:anim>
+                                    <p:set>
+                                      <p:cBhvr>
+                                        <p:cTn id="84" dur="1" fill="hold">
+                                          <p:stCondLst>
+                                            <p:cond delay="299"/>
+                                          </p:stCondLst>
+                                        </p:cTn>
+                                        <p:tgtEl>
+                                          <p:spTgt spid="172"/>
+                                        </p:tgtEl>
+                                        <p:attrNameLst>
+                                          <p:attrName>style.visibility</p:attrName>
+                                        </p:attrNameLst>
+                                      </p:cBhvr>
+                                      <p:to>
+                                        <p:strVal val="hidden"/>
+                                      </p:to>
+                                    </p:set>
+                                  </p:childTnLst>
+                                </p:cTn>
+                              </p:par>
+                              <p:par>
+                                <p:cTn id="85" presetID="2" presetClass="exit" presetSubtype="1" decel="100000" fill="hold" grpId="1" nodeType="withEffect">
+                                  <p:stCondLst>
+                                    <p:cond delay="0"/>
+                                  </p:stCondLst>
+                                  <p:childTnLst>
+                                    <p:anim calcmode="lin" valueType="num">
+                                      <p:cBhvr additive="base">
+                                        <p:cTn id="86" dur="300"/>
+                                        <p:tgtEl>
+                                          <p:spTgt spid="88"/>
+                                        </p:tgtEl>
+                                        <p:attrNameLst>
+                                          <p:attrName>ppt_x</p:attrName>
+                                        </p:attrNameLst>
+                                      </p:cBhvr>
+                                      <p:tavLst>
+                                        <p:tav tm="0">
+                                          <p:val>
+                                            <p:strVal val="ppt_x"/>
+                                          </p:val>
+                                        </p:tav>
+                                        <p:tav tm="100000">
+                                          <p:val>
+                                            <p:strVal val="ppt_x"/>
+                                          </p:val>
+                                        </p:tav>
+                                      </p:tavLst>
+                                    </p:anim>
+                                    <p:anim calcmode="lin" valueType="num">
+                                      <p:cBhvr additive="base">
+                                        <p:cTn id="87" dur="300"/>
+                                        <p:tgtEl>
+                                          <p:spTgt spid="88"/>
+                                        </p:tgtEl>
+                                        <p:attrNameLst>
+                                          <p:attrName>ppt_y</p:attrName>
+                                        </p:attrNameLst>
+                                      </p:cBhvr>
+                                      <p:tavLst>
+                                        <p:tav tm="0">
+                                          <p:val>
+                                            <p:strVal val="ppt_y"/>
+                                          </p:val>
+                                        </p:tav>
+                                        <p:tav tm="100000">
+                                          <p:val>
+                                            <p:strVal val="0-ppt_h/2"/>
+                                          </p:val>
+                                        </p:tav>
+                                      </p:tavLst>
+                                    </p:anim>
+                                    <p:set>
+                                      <p:cBhvr>
+                                        <p:cTn id="88" dur="1" fill="hold">
+                                          <p:stCondLst>
+                                            <p:cond delay="299"/>
+                                          </p:stCondLst>
+                                        </p:cTn>
+                                        <p:tgtEl>
+                                          <p:spTgt spid="88"/>
+                                        </p:tgtEl>
+                                        <p:attrNameLst>
+                                          <p:attrName>style.visibility</p:attrName>
+                                        </p:attrNameLst>
+                                      </p:cBhvr>
+                                      <p:to>
+                                        <p:strVal val="hidden"/>
+                                      </p:to>
+                                    </p:set>
+                                  </p:childTnLst>
+                                </p:cTn>
+                              </p:par>
+                              <p:par>
+                                <p:cTn id="89" presetID="2" presetClass="exit" presetSubtype="1" decel="100000" fill="hold" grpId="1" nodeType="withEffect">
+                                  <p:stCondLst>
+                                    <p:cond delay="0"/>
+                                  </p:stCondLst>
+                                  <p:childTnLst>
+                                    <p:anim calcmode="lin" valueType="num">
+                                      <p:cBhvr additive="base">
+                                        <p:cTn id="90" dur="300"/>
+                                        <p:tgtEl>
+                                          <p:spTgt spid="175"/>
+                                        </p:tgtEl>
+                                        <p:attrNameLst>
+                                          <p:attrName>ppt_x</p:attrName>
+                                        </p:attrNameLst>
+                                      </p:cBhvr>
+                                      <p:tavLst>
+                                        <p:tav tm="0">
+                                          <p:val>
+                                            <p:strVal val="ppt_x"/>
+                                          </p:val>
+                                        </p:tav>
+                                        <p:tav tm="100000">
+                                          <p:val>
+                                            <p:strVal val="ppt_x"/>
+                                          </p:val>
+                                        </p:tav>
+                                      </p:tavLst>
+                                    </p:anim>
+                                    <p:anim calcmode="lin" valueType="num">
+                                      <p:cBhvr additive="base">
+                                        <p:cTn id="91" dur="300"/>
+                                        <p:tgtEl>
+                                          <p:spTgt spid="175"/>
+                                        </p:tgtEl>
+                                        <p:attrNameLst>
+                                          <p:attrName>ppt_y</p:attrName>
+                                        </p:attrNameLst>
+                                      </p:cBhvr>
+                                      <p:tavLst>
+                                        <p:tav tm="0">
+                                          <p:val>
+                                            <p:strVal val="ppt_y"/>
+                                          </p:val>
+                                        </p:tav>
+                                        <p:tav tm="100000">
+                                          <p:val>
+                                            <p:strVal val="0-ppt_h/2"/>
+                                          </p:val>
+                                        </p:tav>
+                                      </p:tavLst>
+                                    </p:anim>
+                                    <p:set>
+                                      <p:cBhvr>
+                                        <p:cTn id="92" dur="1" fill="hold">
+                                          <p:stCondLst>
+                                            <p:cond delay="299"/>
+                                          </p:stCondLst>
+                                        </p:cTn>
+                                        <p:tgtEl>
+                                          <p:spTgt spid="175"/>
+                                        </p:tgtEl>
+                                        <p:attrNameLst>
+                                          <p:attrName>style.visibility</p:attrName>
+                                        </p:attrNameLst>
+                                      </p:cBhvr>
+                                      <p:to>
+                                        <p:strVal val="hidden"/>
+                                      </p:to>
+                                    </p:set>
+                                  </p:childTnLst>
+                                </p:cTn>
+                              </p:par>
+                              <p:par>
+                                <p:cTn id="93" presetID="2" presetClass="exit" presetSubtype="1" decel="100000" fill="hold" nodeType="withEffect">
+                                  <p:stCondLst>
+                                    <p:cond delay="0"/>
+                                  </p:stCondLst>
+                                  <p:childTnLst>
+                                    <p:anim calcmode="lin" valueType="num">
+                                      <p:cBhvr additive="base">
+                                        <p:cTn id="94" dur="300"/>
+                                        <p:tgtEl>
+                                          <p:spTgt spid="1035"/>
+                                        </p:tgtEl>
+                                        <p:attrNameLst>
+                                          <p:attrName>ppt_x</p:attrName>
+                                        </p:attrNameLst>
+                                      </p:cBhvr>
+                                      <p:tavLst>
+                                        <p:tav tm="0">
+                                          <p:val>
+                                            <p:strVal val="ppt_x"/>
+                                          </p:val>
+                                        </p:tav>
+                                        <p:tav tm="100000">
+                                          <p:val>
+                                            <p:strVal val="ppt_x"/>
+                                          </p:val>
+                                        </p:tav>
+                                      </p:tavLst>
+                                    </p:anim>
+                                    <p:anim calcmode="lin" valueType="num">
+                                      <p:cBhvr additive="base">
+                                        <p:cTn id="95" dur="300"/>
+                                        <p:tgtEl>
+                                          <p:spTgt spid="1035"/>
+                                        </p:tgtEl>
+                                        <p:attrNameLst>
+                                          <p:attrName>ppt_y</p:attrName>
+                                        </p:attrNameLst>
+                                      </p:cBhvr>
+                                      <p:tavLst>
+                                        <p:tav tm="0">
+                                          <p:val>
+                                            <p:strVal val="ppt_y"/>
+                                          </p:val>
+                                        </p:tav>
+                                        <p:tav tm="100000">
+                                          <p:val>
+                                            <p:strVal val="0-ppt_h/2"/>
+                                          </p:val>
+                                        </p:tav>
+                                      </p:tavLst>
+                                    </p:anim>
+                                    <p:set>
+                                      <p:cBhvr>
+                                        <p:cTn id="96" dur="1" fill="hold">
+                                          <p:stCondLst>
+                                            <p:cond delay="299"/>
+                                          </p:stCondLst>
+                                        </p:cTn>
+                                        <p:tgtEl>
+                                          <p:spTgt spid="1035"/>
+                                        </p:tgtEl>
+                                        <p:attrNameLst>
+                                          <p:attrName>style.visibility</p:attrName>
+                                        </p:attrNameLst>
+                                      </p:cBhvr>
+                                      <p:to>
+                                        <p:strVal val="hidden"/>
+                                      </p:to>
+                                    </p:set>
+                                  </p:childTnLst>
+                                </p:cTn>
+                              </p:par>
+                              <p:par>
+                                <p:cTn id="97" presetID="2" presetClass="exit" presetSubtype="1" decel="100000" fill="hold" nodeType="withEffect">
+                                  <p:stCondLst>
+                                    <p:cond delay="0"/>
+                                  </p:stCondLst>
+                                  <p:childTnLst>
+                                    <p:anim calcmode="lin" valueType="num">
+                                      <p:cBhvr additive="base">
+                                        <p:cTn id="98" dur="300"/>
+                                        <p:tgtEl>
+                                          <p:spTgt spid="1038"/>
+                                        </p:tgtEl>
+                                        <p:attrNameLst>
+                                          <p:attrName>ppt_x</p:attrName>
+                                        </p:attrNameLst>
+                                      </p:cBhvr>
+                                      <p:tavLst>
+                                        <p:tav tm="0">
+                                          <p:val>
+                                            <p:strVal val="ppt_x"/>
+                                          </p:val>
+                                        </p:tav>
+                                        <p:tav tm="100000">
+                                          <p:val>
+                                            <p:strVal val="ppt_x"/>
+                                          </p:val>
+                                        </p:tav>
+                                      </p:tavLst>
+                                    </p:anim>
+                                    <p:anim calcmode="lin" valueType="num">
+                                      <p:cBhvr additive="base">
+                                        <p:cTn id="99" dur="300"/>
+                                        <p:tgtEl>
+                                          <p:spTgt spid="1038"/>
+                                        </p:tgtEl>
+                                        <p:attrNameLst>
+                                          <p:attrName>ppt_y</p:attrName>
+                                        </p:attrNameLst>
+                                      </p:cBhvr>
+                                      <p:tavLst>
+                                        <p:tav tm="0">
+                                          <p:val>
+                                            <p:strVal val="ppt_y"/>
+                                          </p:val>
+                                        </p:tav>
+                                        <p:tav tm="100000">
+                                          <p:val>
+                                            <p:strVal val="0-ppt_h/2"/>
+                                          </p:val>
+                                        </p:tav>
+                                      </p:tavLst>
+                                    </p:anim>
+                                    <p:set>
+                                      <p:cBhvr>
+                                        <p:cTn id="100" dur="1" fill="hold">
+                                          <p:stCondLst>
+                                            <p:cond delay="299"/>
+                                          </p:stCondLst>
+                                        </p:cTn>
+                                        <p:tgtEl>
+                                          <p:spTgt spid="1038"/>
+                                        </p:tgtEl>
+                                        <p:attrNameLst>
+                                          <p:attrName>style.visibility</p:attrName>
+                                        </p:attrNameLst>
+                                      </p:cBhvr>
+                                      <p:to>
+                                        <p:strVal val="hidden"/>
+                                      </p:to>
+                                    </p:set>
+                                  </p:childTnLst>
+                                </p:cTn>
+                              </p:par>
+                              <p:par>
+                                <p:cTn id="101" presetID="2" presetClass="exit" presetSubtype="1" decel="100000" fill="hold" nodeType="withEffect">
+                                  <p:stCondLst>
+                                    <p:cond delay="0"/>
+                                  </p:stCondLst>
+                                  <p:childTnLst>
+                                    <p:anim calcmode="lin" valueType="num">
+                                      <p:cBhvr additive="base">
+                                        <p:cTn id="102" dur="300"/>
+                                        <p:tgtEl>
+                                          <p:spTgt spid="1040"/>
+                                        </p:tgtEl>
+                                        <p:attrNameLst>
+                                          <p:attrName>ppt_x</p:attrName>
+                                        </p:attrNameLst>
+                                      </p:cBhvr>
+                                      <p:tavLst>
+                                        <p:tav tm="0">
+                                          <p:val>
+                                            <p:strVal val="ppt_x"/>
+                                          </p:val>
+                                        </p:tav>
+                                        <p:tav tm="100000">
+                                          <p:val>
+                                            <p:strVal val="ppt_x"/>
+                                          </p:val>
+                                        </p:tav>
+                                      </p:tavLst>
+                                    </p:anim>
+                                    <p:anim calcmode="lin" valueType="num">
+                                      <p:cBhvr additive="base">
+                                        <p:cTn id="103" dur="300"/>
+                                        <p:tgtEl>
+                                          <p:spTgt spid="1040"/>
+                                        </p:tgtEl>
+                                        <p:attrNameLst>
+                                          <p:attrName>ppt_y</p:attrName>
+                                        </p:attrNameLst>
+                                      </p:cBhvr>
+                                      <p:tavLst>
+                                        <p:tav tm="0">
+                                          <p:val>
+                                            <p:strVal val="ppt_y"/>
+                                          </p:val>
+                                        </p:tav>
+                                        <p:tav tm="100000">
+                                          <p:val>
+                                            <p:strVal val="0-ppt_h/2"/>
+                                          </p:val>
+                                        </p:tav>
+                                      </p:tavLst>
+                                    </p:anim>
+                                    <p:set>
+                                      <p:cBhvr>
+                                        <p:cTn id="104" dur="1" fill="hold">
+                                          <p:stCondLst>
+                                            <p:cond delay="299"/>
+                                          </p:stCondLst>
+                                        </p:cTn>
+                                        <p:tgtEl>
+                                          <p:spTgt spid="1040"/>
+                                        </p:tgtEl>
+                                        <p:attrNameLst>
+                                          <p:attrName>style.visibility</p:attrName>
+                                        </p:attrNameLst>
+                                      </p:cBhvr>
+                                      <p:to>
+                                        <p:strVal val="hidden"/>
+                                      </p:to>
+                                    </p:set>
+                                  </p:childTnLst>
+                                </p:cTn>
+                              </p:par>
+                              <p:par>
+                                <p:cTn id="105" presetID="2" presetClass="exit" presetSubtype="1" decel="100000" fill="hold" nodeType="withEffect">
+                                  <p:stCondLst>
+                                    <p:cond delay="0"/>
+                                  </p:stCondLst>
+                                  <p:childTnLst>
+                                    <p:anim calcmode="lin" valueType="num">
+                                      <p:cBhvr additive="base">
+                                        <p:cTn id="106" dur="300"/>
+                                        <p:tgtEl>
+                                          <p:spTgt spid="1041"/>
+                                        </p:tgtEl>
+                                        <p:attrNameLst>
+                                          <p:attrName>ppt_x</p:attrName>
+                                        </p:attrNameLst>
+                                      </p:cBhvr>
+                                      <p:tavLst>
+                                        <p:tav tm="0">
+                                          <p:val>
+                                            <p:strVal val="ppt_x"/>
+                                          </p:val>
+                                        </p:tav>
+                                        <p:tav tm="100000">
+                                          <p:val>
+                                            <p:strVal val="ppt_x"/>
+                                          </p:val>
+                                        </p:tav>
+                                      </p:tavLst>
+                                    </p:anim>
+                                    <p:anim calcmode="lin" valueType="num">
+                                      <p:cBhvr additive="base">
+                                        <p:cTn id="107" dur="300"/>
+                                        <p:tgtEl>
+                                          <p:spTgt spid="1041"/>
+                                        </p:tgtEl>
+                                        <p:attrNameLst>
+                                          <p:attrName>ppt_y</p:attrName>
+                                        </p:attrNameLst>
+                                      </p:cBhvr>
+                                      <p:tavLst>
+                                        <p:tav tm="0">
+                                          <p:val>
+                                            <p:strVal val="ppt_y"/>
+                                          </p:val>
+                                        </p:tav>
+                                        <p:tav tm="100000">
+                                          <p:val>
+                                            <p:strVal val="0-ppt_h/2"/>
+                                          </p:val>
+                                        </p:tav>
+                                      </p:tavLst>
+                                    </p:anim>
+                                    <p:set>
+                                      <p:cBhvr>
+                                        <p:cTn id="108" dur="1" fill="hold">
+                                          <p:stCondLst>
+                                            <p:cond delay="299"/>
+                                          </p:stCondLst>
+                                        </p:cTn>
+                                        <p:tgtEl>
+                                          <p:spTgt spid="1041"/>
+                                        </p:tgtEl>
+                                        <p:attrNameLst>
+                                          <p:attrName>style.visibility</p:attrName>
+                                        </p:attrNameLst>
+                                      </p:cBhvr>
+                                      <p:to>
+                                        <p:strVal val="hidden"/>
+                                      </p:to>
+                                    </p:set>
+                                  </p:childTnLst>
+                                </p:cTn>
+                              </p:par>
+                              <p:par>
+                                <p:cTn id="109" presetID="42" presetClass="path" presetSubtype="0" decel="100000" fill="hold" nodeType="withEffect">
+                                  <p:stCondLst>
+                                    <p:cond delay="0"/>
+                                  </p:stCondLst>
+                                  <p:childTnLst>
+                                    <p:animMotion origin="layout" path="M -0.37257 0.94676 L -0.37257 0.00185 " pathEditMode="relative" rAng="0" ptsTypes="AA">
+                                      <p:cBhvr>
+                                        <p:cTn id="110" dur="300" fill="hold"/>
+                                        <p:tgtEl>
+                                          <p:spTgt spid="2050"/>
+                                        </p:tgtEl>
+                                        <p:attrNameLst>
+                                          <p:attrName>ppt_x</p:attrName>
+                                          <p:attrName>ppt_y</p:attrName>
+                                        </p:attrNameLst>
+                                      </p:cBhvr>
+                                      <p:rCtr x="0" y="-47245"/>
+                                    </p:animMotion>
+                                  </p:childTnLst>
+                                </p:cTn>
+                              </p:par>
+                              <p:par>
+                                <p:cTn id="111" presetID="1" presetClass="entr" presetSubtype="0" fill="hold" nodeType="withEffect">
+                                  <p:stCondLst>
+                                    <p:cond delay="0"/>
+                                  </p:stCondLst>
+                                  <p:childTnLst>
+                                    <p:set>
+                                      <p:cBhvr>
+                                        <p:cTn id="112" dur="1" fill="hold">
+                                          <p:stCondLst>
+                                            <p:cond delay="0"/>
+                                          </p:stCondLst>
+                                        </p:cTn>
+                                        <p:tgtEl>
+                                          <p:spTgt spid="2050"/>
+                                        </p:tgtEl>
+                                        <p:attrNameLst>
+                                          <p:attrName>style.visibility</p:attrName>
+                                        </p:attrNameLst>
+                                      </p:cBhvr>
+                                      <p:to>
+                                        <p:strVal val="visible"/>
+                                      </p:to>
+                                    </p:set>
+                                  </p:childTnLst>
+                                </p:cTn>
+                              </p:par>
+                              <p:par>
+                                <p:cTn id="113" presetID="2" presetClass="entr" presetSubtype="4" decel="100000" fill="hold" grpId="0" nodeType="withEffect">
+                                  <p:stCondLst>
+                                    <p:cond delay="0"/>
+                                  </p:stCondLst>
+                                  <p:childTnLst>
+                                    <p:set>
+                                      <p:cBhvr>
+                                        <p:cTn id="114" dur="1" fill="hold">
+                                          <p:stCondLst>
+                                            <p:cond delay="0"/>
+                                          </p:stCondLst>
+                                        </p:cTn>
+                                        <p:tgtEl>
+                                          <p:spTgt spid="118"/>
+                                        </p:tgtEl>
+                                        <p:attrNameLst>
+                                          <p:attrName>style.visibility</p:attrName>
+                                        </p:attrNameLst>
+                                      </p:cBhvr>
+                                      <p:to>
+                                        <p:strVal val="visible"/>
+                                      </p:to>
+                                    </p:set>
+                                    <p:anim calcmode="lin" valueType="num">
+                                      <p:cBhvr additive="base">
+                                        <p:cTn id="115" dur="300" fill="hold"/>
+                                        <p:tgtEl>
+                                          <p:spTgt spid="118"/>
+                                        </p:tgtEl>
+                                        <p:attrNameLst>
+                                          <p:attrName>ppt_x</p:attrName>
+                                        </p:attrNameLst>
+                                      </p:cBhvr>
+                                      <p:tavLst>
+                                        <p:tav tm="0">
+                                          <p:val>
+                                            <p:strVal val="#ppt_x"/>
+                                          </p:val>
+                                        </p:tav>
+                                        <p:tav tm="100000">
+                                          <p:val>
+                                            <p:strVal val="#ppt_x"/>
+                                          </p:val>
+                                        </p:tav>
+                                      </p:tavLst>
+                                    </p:anim>
+                                    <p:anim calcmode="lin" valueType="num">
+                                      <p:cBhvr additive="base">
+                                        <p:cTn id="116" dur="300" fill="hold"/>
+                                        <p:tgtEl>
+                                          <p:spTgt spid="118"/>
+                                        </p:tgtEl>
+                                        <p:attrNameLst>
+                                          <p:attrName>ppt_y</p:attrName>
+                                        </p:attrNameLst>
+                                      </p:cBhvr>
+                                      <p:tavLst>
+                                        <p:tav tm="0">
+                                          <p:val>
+                                            <p:strVal val="1+#ppt_h/2"/>
+                                          </p:val>
+                                        </p:tav>
+                                        <p:tav tm="100000">
+                                          <p:val>
+                                            <p:strVal val="#ppt_y"/>
+                                          </p:val>
+                                        </p:tav>
+                                      </p:tavLst>
+                                    </p:anim>
+                                  </p:childTnLst>
+                                </p:cTn>
+                              </p:par>
+                              <p:par>
+                                <p:cTn id="117" presetID="2" presetClass="entr" presetSubtype="4" decel="100000" fill="hold" grpId="0" nodeType="withEffect">
+                                  <p:stCondLst>
+                                    <p:cond delay="0"/>
+                                  </p:stCondLst>
+                                  <p:childTnLst>
+                                    <p:set>
+                                      <p:cBhvr>
+                                        <p:cTn id="118" dur="1" fill="hold">
+                                          <p:stCondLst>
+                                            <p:cond delay="0"/>
+                                          </p:stCondLst>
+                                        </p:cTn>
+                                        <p:tgtEl>
+                                          <p:spTgt spid="2049"/>
+                                        </p:tgtEl>
+                                        <p:attrNameLst>
+                                          <p:attrName>style.visibility</p:attrName>
+                                        </p:attrNameLst>
+                                      </p:cBhvr>
+                                      <p:to>
+                                        <p:strVal val="visible"/>
+                                      </p:to>
+                                    </p:set>
+                                    <p:anim calcmode="lin" valueType="num">
+                                      <p:cBhvr additive="base">
+                                        <p:cTn id="119" dur="300" fill="hold"/>
+                                        <p:tgtEl>
+                                          <p:spTgt spid="2049"/>
+                                        </p:tgtEl>
+                                        <p:attrNameLst>
+                                          <p:attrName>ppt_x</p:attrName>
+                                        </p:attrNameLst>
+                                      </p:cBhvr>
+                                      <p:tavLst>
+                                        <p:tav tm="0">
+                                          <p:val>
+                                            <p:strVal val="#ppt_x"/>
+                                          </p:val>
+                                        </p:tav>
+                                        <p:tav tm="100000">
+                                          <p:val>
+                                            <p:strVal val="#ppt_x"/>
+                                          </p:val>
+                                        </p:tav>
+                                      </p:tavLst>
+                                    </p:anim>
+                                    <p:anim calcmode="lin" valueType="num">
+                                      <p:cBhvr additive="base">
+                                        <p:cTn id="120" dur="300" fill="hold"/>
+                                        <p:tgtEl>
+                                          <p:spTgt spid="2049"/>
+                                        </p:tgtEl>
+                                        <p:attrNameLst>
+                                          <p:attrName>ppt_y</p:attrName>
+                                        </p:attrNameLst>
+                                      </p:cBhvr>
+                                      <p:tavLst>
+                                        <p:tav tm="0">
+                                          <p:val>
+                                            <p:strVal val="1+#ppt_h/2"/>
+                                          </p:val>
+                                        </p:tav>
+                                        <p:tav tm="100000">
+                                          <p:val>
+                                            <p:strVal val="#ppt_y"/>
+                                          </p:val>
+                                        </p:tav>
+                                      </p:tavLst>
+                                    </p:anim>
+                                  </p:childTnLst>
+                                </p:cTn>
+                              </p:par>
+                              <p:par>
+                                <p:cTn id="121" presetID="2" presetClass="entr" presetSubtype="4" decel="100000" fill="hold" grpId="0" nodeType="withEffect">
+                                  <p:stCondLst>
+                                    <p:cond delay="0"/>
+                                  </p:stCondLst>
+                                  <p:childTnLst>
+                                    <p:set>
+                                      <p:cBhvr>
+                                        <p:cTn id="122" dur="1" fill="hold">
+                                          <p:stCondLst>
+                                            <p:cond delay="0"/>
+                                          </p:stCondLst>
+                                        </p:cTn>
+                                        <p:tgtEl>
+                                          <p:spTgt spid="117"/>
+                                        </p:tgtEl>
+                                        <p:attrNameLst>
+                                          <p:attrName>style.visibility</p:attrName>
+                                        </p:attrNameLst>
+                                      </p:cBhvr>
+                                      <p:to>
+                                        <p:strVal val="visible"/>
+                                      </p:to>
+                                    </p:set>
+                                    <p:anim calcmode="lin" valueType="num">
+                                      <p:cBhvr additive="base">
+                                        <p:cTn id="123" dur="300" fill="hold"/>
+                                        <p:tgtEl>
+                                          <p:spTgt spid="117"/>
+                                        </p:tgtEl>
+                                        <p:attrNameLst>
+                                          <p:attrName>ppt_x</p:attrName>
+                                        </p:attrNameLst>
+                                      </p:cBhvr>
+                                      <p:tavLst>
+                                        <p:tav tm="0">
+                                          <p:val>
+                                            <p:strVal val="#ppt_x"/>
+                                          </p:val>
+                                        </p:tav>
+                                        <p:tav tm="100000">
+                                          <p:val>
+                                            <p:strVal val="#ppt_x"/>
+                                          </p:val>
+                                        </p:tav>
+                                      </p:tavLst>
+                                    </p:anim>
+                                    <p:anim calcmode="lin" valueType="num">
+                                      <p:cBhvr additive="base">
+                                        <p:cTn id="124" dur="300" fill="hold"/>
+                                        <p:tgtEl>
+                                          <p:spTgt spid="117"/>
+                                        </p:tgtEl>
+                                        <p:attrNameLst>
+                                          <p:attrName>ppt_y</p:attrName>
+                                        </p:attrNameLst>
+                                      </p:cBhvr>
+                                      <p:tavLst>
+                                        <p:tav tm="0">
+                                          <p:val>
+                                            <p:strVal val="1+#ppt_h/2"/>
+                                          </p:val>
+                                        </p:tav>
+                                        <p:tav tm="100000">
+                                          <p:val>
+                                            <p:strVal val="#ppt_y"/>
+                                          </p:val>
+                                        </p:tav>
+                                      </p:tavLst>
+                                    </p:anim>
+                                  </p:childTnLst>
+                                </p:cTn>
+                              </p:par>
+                              <p:par>
+                                <p:cTn id="125" presetID="2" presetClass="exit" presetSubtype="2" decel="100000" fill="hold" grpId="1" nodeType="withEffect">
+                                  <p:stCondLst>
+                                    <p:cond delay="0"/>
+                                  </p:stCondLst>
+                                  <p:childTnLst>
+                                    <p:anim calcmode="lin" valueType="num">
+                                      <p:cBhvr additive="base">
+                                        <p:cTn id="126" dur="300"/>
+                                        <p:tgtEl>
+                                          <p:spTgt spid="2048"/>
+                                        </p:tgtEl>
+                                        <p:attrNameLst>
+                                          <p:attrName>ppt_x</p:attrName>
+                                        </p:attrNameLst>
+                                      </p:cBhvr>
+                                      <p:tavLst>
+                                        <p:tav tm="0">
+                                          <p:val>
+                                            <p:strVal val="ppt_x"/>
+                                          </p:val>
+                                        </p:tav>
+                                        <p:tav tm="100000">
+                                          <p:val>
+                                            <p:strVal val="1+ppt_w/2"/>
+                                          </p:val>
+                                        </p:tav>
+                                      </p:tavLst>
+                                    </p:anim>
+                                    <p:anim calcmode="lin" valueType="num">
+                                      <p:cBhvr additive="base">
+                                        <p:cTn id="127" dur="300"/>
+                                        <p:tgtEl>
+                                          <p:spTgt spid="2048"/>
+                                        </p:tgtEl>
+                                        <p:attrNameLst>
+                                          <p:attrName>ppt_y</p:attrName>
+                                        </p:attrNameLst>
+                                      </p:cBhvr>
+                                      <p:tavLst>
+                                        <p:tav tm="0">
+                                          <p:val>
+                                            <p:strVal val="ppt_y"/>
+                                          </p:val>
+                                        </p:tav>
+                                        <p:tav tm="100000">
+                                          <p:val>
+                                            <p:strVal val="ppt_y"/>
+                                          </p:val>
+                                        </p:tav>
+                                      </p:tavLst>
+                                    </p:anim>
+                                    <p:set>
+                                      <p:cBhvr>
+                                        <p:cTn id="128" dur="1" fill="hold">
+                                          <p:stCondLst>
+                                            <p:cond delay="299"/>
+                                          </p:stCondLst>
+                                        </p:cTn>
+                                        <p:tgtEl>
+                                          <p:spTgt spid="2048"/>
+                                        </p:tgtEl>
+                                        <p:attrNameLst>
+                                          <p:attrName>style.visibility</p:attrName>
+                                        </p:attrNameLst>
+                                      </p:cBhvr>
+                                      <p:to>
+                                        <p:strVal val="hidden"/>
+                                      </p:to>
+                                    </p:set>
+                                  </p:childTnLst>
+                                </p:cTn>
+                              </p:par>
+                            </p:childTnLst>
+                          </p:cTn>
+                        </p:par>
+                        <p:par>
+                          <p:cTn id="129" fill="hold">
+                            <p:stCondLst>
+                              <p:cond delay="300"/>
+                            </p:stCondLst>
+                            <p:childTnLst>
+                              <p:par>
+                                <p:cTn id="130" presetID="42" presetClass="path" presetSubtype="0" decel="100000" fill="hold" grpId="0" nodeType="afterEffect">
+                                  <p:stCondLst>
+                                    <p:cond delay="0"/>
+                                  </p:stCondLst>
+                                  <p:childTnLst>
+                                    <p:animMotion origin="layout" path="M -0.88195 -0.51435 L -0.12743 -0.3831 " pathEditMode="fixed" rAng="0" ptsTypes="AA">
+                                      <p:cBhvr>
+                                        <p:cTn id="131" dur="300" spd="-100000" fill="hold"/>
+                                        <p:tgtEl>
+                                          <p:spTgt spid="126"/>
+                                        </p:tgtEl>
+                                        <p:attrNameLst>
+                                          <p:attrName>ppt_x</p:attrName>
+                                          <p:attrName>ppt_y</p:attrName>
+                                        </p:attrNameLst>
+                                      </p:cBhvr>
+                                      <p:rCtr x="37726" y="6551"/>
+                                    </p:animMotion>
+                                  </p:childTnLst>
+                                </p:cTn>
+                              </p:par>
+                              <p:par>
+                                <p:cTn id="132" presetID="42" presetClass="path" presetSubtype="0" decel="100000" fill="hold" grpId="0" nodeType="withEffect">
+                                  <p:stCondLst>
+                                    <p:cond delay="0"/>
+                                  </p:stCondLst>
+                                  <p:childTnLst>
+                                    <p:animMotion origin="layout" path="M -0.88195 -0.51435 L 0.11215 -0.38843 " pathEditMode="fixed" rAng="0" ptsTypes="AA">
+                                      <p:cBhvr>
+                                        <p:cTn id="133" dur="300" spd="-100000" fill="hold"/>
+                                        <p:tgtEl>
+                                          <p:spTgt spid="123"/>
+                                        </p:tgtEl>
+                                        <p:attrNameLst>
+                                          <p:attrName>ppt_x</p:attrName>
+                                          <p:attrName>ppt_y</p:attrName>
+                                        </p:attrNameLst>
+                                      </p:cBhvr>
+                                      <p:rCtr x="49705" y="6296"/>
+                                    </p:animMotion>
+                                  </p:childTnLst>
+                                </p:cTn>
+                              </p:par>
+                              <p:par>
+                                <p:cTn id="134" presetID="42" presetClass="path" presetSubtype="0" decel="100000" fill="hold" nodeType="withEffect">
+                                  <p:stCondLst>
+                                    <p:cond delay="0"/>
+                                  </p:stCondLst>
+                                  <p:childTnLst>
+                                    <p:animMotion origin="layout" path="M -0.88195 -0.55117 L -0.13385 -0.39884 " pathEditMode="fixed" rAng="0" ptsTypes="AA">
+                                      <p:cBhvr>
+                                        <p:cTn id="135" dur="300" spd="-100000" fill="hold"/>
+                                        <p:tgtEl>
+                                          <p:spTgt spid="124"/>
+                                        </p:tgtEl>
+                                        <p:attrNameLst>
+                                          <p:attrName>ppt_x</p:attrName>
+                                          <p:attrName>ppt_y</p:attrName>
+                                        </p:attrNameLst>
+                                      </p:cBhvr>
+                                      <p:rCtr x="37396" y="7616"/>
+                                    </p:animMotion>
+                                  </p:childTnLst>
+                                </p:cTn>
+                              </p:par>
+                              <p:par>
+                                <p:cTn id="136" presetID="42" presetClass="path" presetSubtype="0" decel="100000" fill="hold" grpId="0" nodeType="withEffect">
+                                  <p:stCondLst>
+                                    <p:cond delay="0"/>
+                                  </p:stCondLst>
+                                  <p:childTnLst>
+                                    <p:animMotion origin="layout" path="M -0.88195 -0.51435 L -0.11944 -0.3412 " pathEditMode="fixed" rAng="0" ptsTypes="AA">
+                                      <p:cBhvr>
+                                        <p:cTn id="137" dur="300" spd="-100000" fill="hold"/>
+                                        <p:tgtEl>
+                                          <p:spTgt spid="127"/>
+                                        </p:tgtEl>
+                                        <p:attrNameLst>
+                                          <p:attrName>ppt_x</p:attrName>
+                                          <p:attrName>ppt_y</p:attrName>
+                                        </p:attrNameLst>
+                                      </p:cBhvr>
+                                      <p:rCtr x="38125" y="8657"/>
+                                    </p:animMotion>
+                                  </p:childTnLst>
+                                </p:cTn>
+                              </p:par>
+                              <p:par>
+                                <p:cTn id="138" presetID="42" presetClass="path" presetSubtype="0" decel="100000" fill="hold" nodeType="withEffect">
+                                  <p:stCondLst>
+                                    <p:cond delay="0"/>
+                                  </p:stCondLst>
+                                  <p:childTnLst>
+                                    <p:animMotion origin="layout" path="M -0.87848 -0.51598 L -0.40017 -0.41783 " pathEditMode="fixed" rAng="0" ptsTypes="AA">
+                                      <p:cBhvr>
+                                        <p:cTn id="139" dur="300" spd="-100000" fill="hold"/>
+                                        <p:tgtEl>
+                                          <p:spTgt spid="1043"/>
+                                        </p:tgtEl>
+                                        <p:attrNameLst>
+                                          <p:attrName>ppt_x</p:attrName>
+                                          <p:attrName>ppt_y</p:attrName>
+                                        </p:attrNameLst>
+                                      </p:cBhvr>
+                                      <p:rCtr x="23906" y="4907"/>
+                                    </p:animMotion>
+                                  </p:childTnLst>
+                                </p:cTn>
+                              </p:par>
+                              <p:par>
+                                <p:cTn id="140" presetID="42" presetClass="path" presetSubtype="0" decel="100000" fill="hold" nodeType="withEffect">
+                                  <p:stCondLst>
+                                    <p:cond delay="0"/>
+                                  </p:stCondLst>
+                                  <p:childTnLst>
+                                    <p:animMotion origin="layout" path="M -0.88212 -0.51458 L 0.16319 -0.44143 " pathEditMode="fixed" rAng="0" ptsTypes="AA">
+                                      <p:cBhvr>
+                                        <p:cTn id="141" dur="300" spd="-100000" fill="hold"/>
+                                        <p:tgtEl>
+                                          <p:spTgt spid="1026"/>
+                                        </p:tgtEl>
+                                        <p:attrNameLst>
+                                          <p:attrName>ppt_x</p:attrName>
+                                          <p:attrName>ppt_y</p:attrName>
+                                        </p:attrNameLst>
+                                      </p:cBhvr>
+                                      <p:rCtr x="52257" y="3657"/>
+                                    </p:animMotion>
+                                  </p:childTnLst>
+                                </p:cTn>
+                              </p:par>
+                            </p:childTnLst>
+                          </p:cTn>
+                        </p:par>
+                      </p:childTnLst>
+                    </p:cTn>
+                  </p:par>
+                </p:childTnLst>
+              </p:cTn>
+              <p:prevCondLst>
+                <p:cond evt="onPrev" delay="0">
+                  <p:tgtEl>
+                    <p:sldTgt/>
+                  </p:tgtEl>
+                </p:cond>
+              </p:prevCondLst>
+              <p:nextCondLst>
+                <p:cond evt="onNext" delay="0">
+                  <p:tgtEl>
+                    <p:sldTgt/>
+                  </p:tgtEl>
+                </p:cond>
+              </p:nextCondLst>
+            </p:seq>
+          </p:childTnLst>
+        </p:cTn>
+      </p:par>
+    </p:tnLst>
+    <p:bldLst>
+      <p:bldP spid="117" grpId="0" animBg="1"/>
+      <p:bldP spid="2049" grpId="0" animBg="1"/>
+      <p:bldP spid="2048" grpId="0"/>
+      <p:bldP spid="2048" grpId="1"/>
+      <p:bldP spid="123" grpId="0" animBg="1"/>
+      <p:bldP spid="127" grpId="0" animBg="1"/>
+      <p:bldP spid="47" grpId="0"/>
+      <p:bldP spid="48" grpId="0"/>
+      <p:bldP spid="49" grpId="0"/>
+      <p:bldP spid="50" grpId="0"/>
+      <p:bldP spid="51" grpId="0"/>
+      <p:bldP spid="64" grpId="0" animBg="1"/>
+      <p:bldP spid="118" grpId="0" animBg="1"/>
+      <p:bldP spid="88" grpId="0" animBg="1"/>
+      <p:bldP spid="88" grpId="1" animBg="1"/>
+      <p:bldP spid="126" grpId="0"/>
+      <p:bldP spid="175" grpId="0" animBg="1"/>
+      <p:bldP spid="175" grpId="1" animBg="1"/>
+    </p:bldLst>
+  </p:timing>
+</p:sld>
+</file>
+
+<file path=ppt/slides/slide4.xml><?xml version="1.0" encoding="utf-8"?>
 <p:sld xmlns:a="http://schemas.openxmlformats.org/drawingml/2006/main" xmlns:r="http://schemas.openxmlformats.org/officeDocument/2006/relationships" xmlns:p="http://schemas.openxmlformats.org/presentationml/2006/main" show="0">
   <p:cSld>
     <p:spTree>
@@ -21469,7 +25822,7 @@
                 <a:buFont typeface="Wingdings" pitchFamily="2" charset="2"/>
                 <a:buNone/>
               </a:pPr>
-              <a:t>3</a:t>
+              <a:t>4</a:t>
             </a:fld>
             <a:endParaRPr lang="de-DE" dirty="0"/>
           </a:p>
@@ -21636,7 +25989,7 @@
 </p:sld>
 </file>
 
-<file path=ppt/slides/slide4.xml><?xml version="1.0" encoding="utf-8"?>
+<file path=ppt/slides/slide5.xml><?xml version="1.0" encoding="utf-8"?>
 <p:sld xmlns:a="http://schemas.openxmlformats.org/drawingml/2006/main" xmlns:r="http://schemas.openxmlformats.org/officeDocument/2006/relationships" xmlns:p="http://schemas.openxmlformats.org/presentationml/2006/main">
   <p:cSld>
     <p:spTree>
@@ -21840,7 +26193,7 @@
                 <a:buFont typeface="Wingdings" pitchFamily="2" charset="2"/>
                 <a:buNone/>
               </a:pPr>
-              <a:t>4</a:t>
+              <a:t>5</a:t>
             </a:fld>
             <a:endParaRPr lang="de-DE" dirty="0"/>
           </a:p>
@@ -22743,7 +27096,7 @@
 </p:sld>
 </file>
 
-<file path=ppt/slides/slide5.xml><?xml version="1.0" encoding="utf-8"?>
+<file path=ppt/slides/slide6.xml><?xml version="1.0" encoding="utf-8"?>
 <p:sld xmlns:a="http://schemas.openxmlformats.org/drawingml/2006/main" xmlns:r="http://schemas.openxmlformats.org/officeDocument/2006/relationships" xmlns:p="http://schemas.openxmlformats.org/presentationml/2006/main" show="0">
   <p:cSld>
     <p:spTree>
@@ -22920,7 +27273,7 @@
                 <a:buFont typeface="Wingdings" pitchFamily="2" charset="2"/>
                 <a:buNone/>
               </a:pPr>
-              <a:t>5</a:t>
+              <a:t>6</a:t>
             </a:fld>
             <a:endParaRPr lang="de-DE" dirty="0"/>
           </a:p>

</xml_diff>